<commit_message>
Stable Edit Routine  - can add new routine name and date to database
Signed-off-by: Tamir Mishali <Tamirmishali@gmail.com>
</commit_message>
<xml_diff>
--- a/ClassArrangments.pptx
+++ b/ClassArrangments.pptx
@@ -10,11 +10,14 @@
     <p:sldId id="258" r:id="rId4"/>
     <p:sldId id="259" r:id="rId5"/>
     <p:sldId id="260" r:id="rId6"/>
-    <p:sldId id="261" r:id="rId7"/>
-    <p:sldId id="262" r:id="rId8"/>
-    <p:sldId id="263" r:id="rId9"/>
-    <p:sldId id="264" r:id="rId10"/>
-    <p:sldId id="265" r:id="rId11"/>
+    <p:sldId id="268" r:id="rId7"/>
+    <p:sldId id="261" r:id="rId8"/>
+    <p:sldId id="262" r:id="rId9"/>
+    <p:sldId id="267" r:id="rId10"/>
+    <p:sldId id="266" r:id="rId11"/>
+    <p:sldId id="263" r:id="rId12"/>
+    <p:sldId id="264" r:id="rId13"/>
+    <p:sldId id="265" r:id="rId14"/>
   </p:sldIdLst>
   <p:sldSz cx="12192000" cy="6858000"/>
   <p:notesSz cx="6858000" cy="9144000"/>
@@ -252,7 +255,7 @@
           <a:p>
             <a:fld id="{244BBE53-A23C-433C-8B4F-282DFA43F4D8}" type="datetimeFigureOut">
               <a:rPr lang="he-IL" smtClean="0"/>
-              <a:t>כ"ט/כסלו/תשע"ט</a:t>
+              <a:t>כ"ד/אדר א/תשע"ט</a:t>
             </a:fld>
             <a:endParaRPr lang="he-IL"/>
           </a:p>
@@ -422,7 +425,7 @@
           <a:p>
             <a:fld id="{244BBE53-A23C-433C-8B4F-282DFA43F4D8}" type="datetimeFigureOut">
               <a:rPr lang="he-IL" smtClean="0"/>
-              <a:t>כ"ט/כסלו/תשע"ט</a:t>
+              <a:t>כ"ד/אדר א/תשע"ט</a:t>
             </a:fld>
             <a:endParaRPr lang="he-IL"/>
           </a:p>
@@ -602,7 +605,7 @@
           <a:p>
             <a:fld id="{244BBE53-A23C-433C-8B4F-282DFA43F4D8}" type="datetimeFigureOut">
               <a:rPr lang="he-IL" smtClean="0"/>
-              <a:t>כ"ט/כסלו/תשע"ט</a:t>
+              <a:t>כ"ד/אדר א/תשע"ט</a:t>
             </a:fld>
             <a:endParaRPr lang="he-IL"/>
           </a:p>
@@ -772,7 +775,7 @@
           <a:p>
             <a:fld id="{244BBE53-A23C-433C-8B4F-282DFA43F4D8}" type="datetimeFigureOut">
               <a:rPr lang="he-IL" smtClean="0"/>
-              <a:t>כ"ט/כסלו/תשע"ט</a:t>
+              <a:t>כ"ד/אדר א/תשע"ט</a:t>
             </a:fld>
             <a:endParaRPr lang="he-IL"/>
           </a:p>
@@ -1018,7 +1021,7 @@
           <a:p>
             <a:fld id="{244BBE53-A23C-433C-8B4F-282DFA43F4D8}" type="datetimeFigureOut">
               <a:rPr lang="he-IL" smtClean="0"/>
-              <a:t>כ"ט/כסלו/תשע"ט</a:t>
+              <a:t>כ"ד/אדר א/תשע"ט</a:t>
             </a:fld>
             <a:endParaRPr lang="he-IL"/>
           </a:p>
@@ -1250,7 +1253,7 @@
           <a:p>
             <a:fld id="{244BBE53-A23C-433C-8B4F-282DFA43F4D8}" type="datetimeFigureOut">
               <a:rPr lang="he-IL" smtClean="0"/>
-              <a:t>כ"ט/כסלו/תשע"ט</a:t>
+              <a:t>כ"ד/אדר א/תשע"ט</a:t>
             </a:fld>
             <a:endParaRPr lang="he-IL"/>
           </a:p>
@@ -1617,7 +1620,7 @@
           <a:p>
             <a:fld id="{244BBE53-A23C-433C-8B4F-282DFA43F4D8}" type="datetimeFigureOut">
               <a:rPr lang="he-IL" smtClean="0"/>
-              <a:t>כ"ט/כסלו/תשע"ט</a:t>
+              <a:t>כ"ד/אדר א/תשע"ט</a:t>
             </a:fld>
             <a:endParaRPr lang="he-IL"/>
           </a:p>
@@ -1735,7 +1738,7 @@
           <a:p>
             <a:fld id="{244BBE53-A23C-433C-8B4F-282DFA43F4D8}" type="datetimeFigureOut">
               <a:rPr lang="he-IL" smtClean="0"/>
-              <a:t>כ"ט/כסלו/תשע"ט</a:t>
+              <a:t>כ"ד/אדר א/תשע"ט</a:t>
             </a:fld>
             <a:endParaRPr lang="he-IL"/>
           </a:p>
@@ -1830,7 +1833,7 @@
           <a:p>
             <a:fld id="{244BBE53-A23C-433C-8B4F-282DFA43F4D8}" type="datetimeFigureOut">
               <a:rPr lang="he-IL" smtClean="0"/>
-              <a:t>כ"ט/כסלו/תשע"ט</a:t>
+              <a:t>כ"ד/אדר א/תשע"ט</a:t>
             </a:fld>
             <a:endParaRPr lang="he-IL"/>
           </a:p>
@@ -2107,7 +2110,7 @@
           <a:p>
             <a:fld id="{244BBE53-A23C-433C-8B4F-282DFA43F4D8}" type="datetimeFigureOut">
               <a:rPr lang="he-IL" smtClean="0"/>
-              <a:t>כ"ט/כסלו/תשע"ט</a:t>
+              <a:t>כ"ד/אדר א/תשע"ט</a:t>
             </a:fld>
             <a:endParaRPr lang="he-IL"/>
           </a:p>
@@ -2360,7 +2363,7 @@
           <a:p>
             <a:fld id="{244BBE53-A23C-433C-8B4F-282DFA43F4D8}" type="datetimeFigureOut">
               <a:rPr lang="he-IL" smtClean="0"/>
-              <a:t>כ"ט/כסלו/תשע"ט</a:t>
+              <a:t>כ"ד/אדר א/תשע"ט</a:t>
             </a:fld>
             <a:endParaRPr lang="he-IL"/>
           </a:p>
@@ -2573,7 +2576,7 @@
           <a:p>
             <a:fld id="{244BBE53-A23C-433C-8B4F-282DFA43F4D8}" type="datetimeFigureOut">
               <a:rPr lang="he-IL" smtClean="0"/>
-              <a:t>כ"ט/כסלו/תשע"ט</a:t>
+              <a:t>כ"ד/אדר א/תשע"ט</a:t>
             </a:fld>
             <a:endParaRPr lang="he-IL"/>
           </a:p>
@@ -3061,9 +3064,17 @@
             <a:pPr algn="l" rtl="0"/>
             <a:r>
               <a:rPr lang="en-US" sz="4000" dirty="0" smtClean="0"/>
-              <a:t>List&lt;Workout&gt; 	workouts</a:t>
-            </a:r>
-            <a:endParaRPr lang="he-IL" sz="4000" dirty="0"/>
+              <a:t>List&lt;Workout&gt; </a:t>
+            </a:r>
+            <a:r>
+              <a:rPr lang="en-US" sz="4000" smtClean="0"/>
+              <a:t>	</a:t>
+            </a:r>
+            <a:r>
+              <a:rPr lang="en-US" sz="4000" smtClean="0"/>
+              <a:t>workouts</a:t>
+            </a:r>
+            <a:endParaRPr lang="en-US" sz="4000" dirty="0" smtClean="0"/>
           </a:p>
         </p:txBody>
       </p:sp>
@@ -3116,8 +3127,8 @@
         </p:nvSpPr>
         <p:spPr>
           <a:xfrm>
-            <a:off x="3899329" y="57665"/>
-            <a:ext cx="5110033" cy="849141"/>
+            <a:off x="4347003" y="0"/>
+            <a:ext cx="3695700" cy="849141"/>
           </a:xfrm>
         </p:spPr>
         <p:txBody>
@@ -3128,12 +3139,8 @@
           <a:p>
             <a:pPr rtl="0"/>
             <a:r>
-              <a:rPr lang="en-US" dirty="0" err="1"/>
-              <a:t>w</a:t>
-            </a:r>
-            <a:r>
               <a:rPr lang="en-US" dirty="0" err="1" smtClean="0"/>
-              <a:t>orkout_history</a:t>
+              <a:t>NewExercise</a:t>
             </a:r>
             <a:endParaRPr lang="he-IL" dirty="0"/>
           </a:p>
@@ -3141,16 +3148,16 @@
       </p:sp>
       <p:sp>
         <p:nvSpPr>
-          <p:cNvPr id="9" name="מלבן 8"/>
+          <p:cNvPr id="8" name="מלבן מעוגל 7"/>
           <p:cNvSpPr/>
           <p:nvPr/>
         </p:nvSpPr>
         <p:spPr>
           <a:xfrm>
-            <a:off x="1820562" y="1326292"/>
-            <a:ext cx="9267568" cy="5000367"/>
-          </a:xfrm>
-          <a:prstGeom prst="rect">
+            <a:off x="4617307" y="959706"/>
+            <a:ext cx="3204519" cy="4246607"/>
+          </a:xfrm>
+          <a:prstGeom prst="roundRect">
             <a:avLst/>
           </a:prstGeom>
         </p:spPr>
@@ -3174,6 +3181,619 @@
           <a:bodyPr rtlCol="1" anchor="t"/>
           <a:lstStyle/>
           <a:p>
+            <a:pPr rtl="0"/>
+            <a:r>
+              <a:rPr lang="he-IL" dirty="0" smtClean="0"/>
+              <a:t>שם תרגיל:</a:t>
+            </a:r>
+          </a:p>
+          <a:p>
+            <a:pPr rtl="0"/>
+            <a:r>
+              <a:rPr lang="he-IL" dirty="0" smtClean="0"/>
+              <a:t>_________________</a:t>
+            </a:r>
+            <a:endParaRPr lang="en-US" dirty="0" smtClean="0"/>
+          </a:p>
+          <a:p>
+            <a:pPr rtl="0"/>
+            <a:endParaRPr lang="he-IL" dirty="0" smtClean="0"/>
+          </a:p>
+          <a:p>
+            <a:pPr rtl="0"/>
+            <a:r>
+              <a:rPr lang="he-IL" dirty="0" smtClean="0"/>
+              <a:t>שריר:</a:t>
+            </a:r>
+          </a:p>
+          <a:p>
+            <a:pPr rtl="0"/>
+            <a:r>
+              <a:rPr lang="he-IL" dirty="0" smtClean="0"/>
+              <a:t>_________________</a:t>
+            </a:r>
+          </a:p>
+          <a:p>
+            <a:pPr rtl="0"/>
+            <a:endParaRPr lang="he-IL" dirty="0" smtClean="0"/>
+          </a:p>
+          <a:p>
+            <a:pPr rtl="0"/>
+            <a:r>
+              <a:rPr lang="he-IL" dirty="0" smtClean="0"/>
+              <a:t>פירוט:</a:t>
+            </a:r>
+          </a:p>
+          <a:p>
+            <a:pPr rtl="0"/>
+            <a:r>
+              <a:rPr lang="he-IL" dirty="0" smtClean="0"/>
+              <a:t>_________________</a:t>
+            </a:r>
+            <a:endParaRPr lang="en-US" dirty="0" smtClean="0"/>
+          </a:p>
+        </p:txBody>
+      </p:sp>
+      <p:sp>
+        <p:nvSpPr>
+          <p:cNvPr id="4" name="מלבן 3"/>
+          <p:cNvSpPr/>
+          <p:nvPr/>
+        </p:nvSpPr>
+        <p:spPr>
+          <a:xfrm>
+            <a:off x="4876800" y="4427833"/>
+            <a:ext cx="934994" cy="589010"/>
+          </a:xfrm>
+          <a:prstGeom prst="rect">
+            <a:avLst/>
+          </a:prstGeom>
+          <a:ln>
+            <a:solidFill>
+              <a:schemeClr val="tx1"/>
+            </a:solidFill>
+          </a:ln>
+        </p:spPr>
+        <p:style>
+          <a:lnRef idx="2">
+            <a:schemeClr val="accent1">
+              <a:shade val="50000"/>
+            </a:schemeClr>
+          </a:lnRef>
+          <a:fillRef idx="1">
+            <a:schemeClr val="accent1"/>
+          </a:fillRef>
+          <a:effectRef idx="0">
+            <a:schemeClr val="accent1"/>
+          </a:effectRef>
+          <a:fontRef idx="minor">
+            <a:schemeClr val="lt1"/>
+          </a:fontRef>
+        </p:style>
+        <p:txBody>
+          <a:bodyPr rtlCol="1" anchor="ctr"/>
+          <a:lstStyle/>
+          <a:p>
+            <a:pPr algn="ctr"/>
+            <a:r>
+              <a:rPr lang="en-US" dirty="0" smtClean="0"/>
+              <a:t>Save</a:t>
+            </a:r>
+          </a:p>
+          <a:p>
+            <a:pPr algn="ctr"/>
+            <a:r>
+              <a:rPr lang="en-US" dirty="0" smtClean="0"/>
+              <a:t>button</a:t>
+            </a:r>
+            <a:endParaRPr lang="he-IL" dirty="0"/>
+          </a:p>
+        </p:txBody>
+      </p:sp>
+    </p:spTree>
+    <p:extLst>
+      <p:ext uri="{BB962C8B-B14F-4D97-AF65-F5344CB8AC3E}">
+        <p14:creationId xmlns:p14="http://schemas.microsoft.com/office/powerpoint/2010/main" val="2641639846"/>
+      </p:ext>
+    </p:extLst>
+  </p:cSld>
+  <p:clrMapOvr>
+    <a:masterClrMapping/>
+  </p:clrMapOvr>
+  <p:timing>
+    <p:tnLst>
+      <p:par>
+        <p:cTn id="1" dur="indefinite" restart="never" nodeType="tmRoot"/>
+      </p:par>
+    </p:tnLst>
+  </p:timing>
+</p:sld>
+</file>
+
+<file path=ppt/slides/slide11.xml><?xml version="1.0" encoding="utf-8"?>
+<p:sld xmlns:a="http://schemas.openxmlformats.org/drawingml/2006/main" xmlns:r="http://schemas.openxmlformats.org/officeDocument/2006/relationships" xmlns:p="http://schemas.openxmlformats.org/presentationml/2006/main">
+  <p:cSld>
+    <p:spTree>
+      <p:nvGrpSpPr>
+        <p:cNvPr id="1" name=""/>
+        <p:cNvGrpSpPr/>
+        <p:nvPr/>
+      </p:nvGrpSpPr>
+      <p:grpSpPr>
+        <a:xfrm>
+          <a:off x="0" y="0"/>
+          <a:ext cx="0" cy="0"/>
+          <a:chOff x="0" y="0"/>
+          <a:chExt cx="0" cy="0"/>
+        </a:xfrm>
+      </p:grpSpPr>
+      <p:sp>
+        <p:nvSpPr>
+          <p:cNvPr id="2" name="כותרת 1"/>
+          <p:cNvSpPr>
+            <a:spLocks noGrp="1"/>
+          </p:cNvSpPr>
+          <p:nvPr>
+            <p:ph type="ctrTitle"/>
+          </p:nvPr>
+        </p:nvSpPr>
+        <p:spPr>
+          <a:xfrm>
+            <a:off x="4384074" y="295918"/>
+            <a:ext cx="3695700" cy="849141"/>
+          </a:xfrm>
+        </p:spPr>
+        <p:txBody>
+          <a:bodyPr>
+            <a:normAutofit fontScale="90000"/>
+          </a:bodyPr>
+          <a:lstStyle/>
+          <a:p>
+            <a:pPr rtl="0"/>
+            <a:r>
+              <a:rPr lang="en-US" dirty="0" smtClean="0"/>
+              <a:t>Database</a:t>
+            </a:r>
+            <a:endParaRPr lang="he-IL" dirty="0"/>
+          </a:p>
+        </p:txBody>
+      </p:sp>
+      <p:sp>
+        <p:nvSpPr>
+          <p:cNvPr id="9" name="מלבן 8"/>
+          <p:cNvSpPr/>
+          <p:nvPr/>
+        </p:nvSpPr>
+        <p:spPr>
+          <a:xfrm>
+            <a:off x="844378" y="1425147"/>
+            <a:ext cx="4304271" cy="1276864"/>
+          </a:xfrm>
+          <a:prstGeom prst="rect">
+            <a:avLst/>
+          </a:prstGeom>
+        </p:spPr>
+        <p:style>
+          <a:lnRef idx="2">
+            <a:schemeClr val="accent1">
+              <a:shade val="50000"/>
+            </a:schemeClr>
+          </a:lnRef>
+          <a:fillRef idx="1">
+            <a:schemeClr val="accent1"/>
+          </a:fillRef>
+          <a:effectRef idx="0">
+            <a:schemeClr val="accent1"/>
+          </a:effectRef>
+          <a:fontRef idx="minor">
+            <a:schemeClr val="lt1"/>
+          </a:fontRef>
+        </p:style>
+        <p:txBody>
+          <a:bodyPr rtlCol="1" anchor="t"/>
+          <a:lstStyle/>
+          <a:p>
+            <a:pPr algn="ctr" rtl="0"/>
+            <a:r>
+              <a:rPr lang="en-US" sz="4000" dirty="0" err="1" smtClean="0"/>
+              <a:t>routine_table</a:t>
+            </a:r>
+            <a:endParaRPr lang="en-US" sz="4000" dirty="0" smtClean="0"/>
+          </a:p>
+          <a:p>
+            <a:pPr algn="l" rtl="0"/>
+            <a:r>
+              <a:rPr lang="en-US" sz="2400" dirty="0" smtClean="0"/>
+              <a:t>id</a:t>
+            </a:r>
+            <a:endParaRPr lang="he-IL" sz="2400" dirty="0"/>
+          </a:p>
+        </p:txBody>
+      </p:sp>
+      <p:sp>
+        <p:nvSpPr>
+          <p:cNvPr id="11" name="מלבן 10"/>
+          <p:cNvSpPr/>
+          <p:nvPr/>
+        </p:nvSpPr>
+        <p:spPr>
+          <a:xfrm>
+            <a:off x="6044513" y="1425148"/>
+            <a:ext cx="4326925" cy="1276864"/>
+          </a:xfrm>
+          <a:prstGeom prst="rect">
+            <a:avLst/>
+          </a:prstGeom>
+        </p:spPr>
+        <p:style>
+          <a:lnRef idx="2">
+            <a:schemeClr val="accent1">
+              <a:shade val="50000"/>
+            </a:schemeClr>
+          </a:lnRef>
+          <a:fillRef idx="1">
+            <a:schemeClr val="accent1"/>
+          </a:fillRef>
+          <a:effectRef idx="0">
+            <a:schemeClr val="accent1"/>
+          </a:effectRef>
+          <a:fontRef idx="minor">
+            <a:schemeClr val="lt1"/>
+          </a:fontRef>
+        </p:style>
+        <p:txBody>
+          <a:bodyPr rtlCol="1" anchor="t"/>
+          <a:lstStyle/>
+          <a:p>
+            <a:pPr algn="ctr" rtl="0"/>
+            <a:r>
+              <a:rPr lang="en-US" sz="4000" dirty="0" err="1" smtClean="0"/>
+              <a:t>workout_table</a:t>
+            </a:r>
+            <a:endParaRPr lang="en-US" sz="4000" dirty="0" smtClean="0"/>
+          </a:p>
+          <a:p>
+            <a:pPr algn="l" rtl="0"/>
+            <a:r>
+              <a:rPr lang="en-US" sz="2400" dirty="0" smtClean="0"/>
+              <a:t>id        </a:t>
+            </a:r>
+            <a:r>
+              <a:rPr lang="en-US" sz="2400" dirty="0" err="1" smtClean="0"/>
+              <a:t>Id_routine</a:t>
+            </a:r>
+            <a:endParaRPr lang="he-IL" sz="2000" dirty="0"/>
+          </a:p>
+        </p:txBody>
+      </p:sp>
+      <p:sp>
+        <p:nvSpPr>
+          <p:cNvPr id="13" name="מלבן 12"/>
+          <p:cNvSpPr/>
+          <p:nvPr/>
+        </p:nvSpPr>
+        <p:spPr>
+          <a:xfrm>
+            <a:off x="593124" y="1145059"/>
+            <a:ext cx="11277600" cy="4522573"/>
+          </a:xfrm>
+          <a:prstGeom prst="rect">
+            <a:avLst/>
+          </a:prstGeom>
+          <a:noFill/>
+        </p:spPr>
+        <p:style>
+          <a:lnRef idx="2">
+            <a:schemeClr val="accent1">
+              <a:shade val="50000"/>
+            </a:schemeClr>
+          </a:lnRef>
+          <a:fillRef idx="1">
+            <a:schemeClr val="accent1"/>
+          </a:fillRef>
+          <a:effectRef idx="0">
+            <a:schemeClr val="accent1"/>
+          </a:effectRef>
+          <a:fontRef idx="minor">
+            <a:schemeClr val="lt1"/>
+          </a:fontRef>
+        </p:style>
+        <p:txBody>
+          <a:bodyPr rtlCol="1" anchor="t"/>
+          <a:lstStyle/>
+          <a:p>
+            <a:pPr algn="l" rtl="0"/>
+            <a:endParaRPr lang="he-IL" sz="4000" dirty="0"/>
+          </a:p>
+        </p:txBody>
+      </p:sp>
+      <p:cxnSp>
+        <p:nvCxnSpPr>
+          <p:cNvPr id="6" name="מחבר מרפקי 5"/>
+          <p:cNvCxnSpPr/>
+          <p:nvPr/>
+        </p:nvCxnSpPr>
+        <p:spPr>
+          <a:xfrm>
+            <a:off x="1079157" y="2702011"/>
+            <a:ext cx="6326659" cy="436605"/>
+          </a:xfrm>
+          <a:prstGeom prst="bentConnector3">
+            <a:avLst>
+              <a:gd name="adj1" fmla="val -391"/>
+            </a:avLst>
+          </a:prstGeom>
+          <a:ln>
+            <a:tailEnd type="triangle"/>
+          </a:ln>
+        </p:spPr>
+        <p:style>
+          <a:lnRef idx="1">
+            <a:schemeClr val="accent1"/>
+          </a:lnRef>
+          <a:fillRef idx="0">
+            <a:schemeClr val="accent1"/>
+          </a:fillRef>
+          <a:effectRef idx="0">
+            <a:schemeClr val="accent1"/>
+          </a:effectRef>
+          <a:fontRef idx="minor">
+            <a:schemeClr val="tx1"/>
+          </a:fontRef>
+        </p:style>
+      </p:cxnSp>
+      <p:cxnSp>
+        <p:nvCxnSpPr>
+          <p:cNvPr id="10" name="מחבר חץ ישר 9"/>
+          <p:cNvCxnSpPr/>
+          <p:nvPr/>
+        </p:nvCxnSpPr>
+        <p:spPr>
+          <a:xfrm flipH="1" flipV="1">
+            <a:off x="7405816" y="2702011"/>
+            <a:ext cx="8238" cy="436605"/>
+          </a:xfrm>
+          <a:prstGeom prst="straightConnector1">
+            <a:avLst/>
+          </a:prstGeom>
+          <a:ln>
+            <a:tailEnd type="triangle"/>
+          </a:ln>
+        </p:spPr>
+        <p:style>
+          <a:lnRef idx="1">
+            <a:schemeClr val="accent1"/>
+          </a:lnRef>
+          <a:fillRef idx="0">
+            <a:schemeClr val="accent1"/>
+          </a:fillRef>
+          <a:effectRef idx="0">
+            <a:schemeClr val="accent1"/>
+          </a:effectRef>
+          <a:fontRef idx="minor">
+            <a:schemeClr val="tx1"/>
+          </a:fontRef>
+        </p:style>
+      </p:cxnSp>
+    </p:spTree>
+    <p:extLst>
+      <p:ext uri="{BB962C8B-B14F-4D97-AF65-F5344CB8AC3E}">
+        <p14:creationId xmlns:p14="http://schemas.microsoft.com/office/powerpoint/2010/main" val="777559622"/>
+      </p:ext>
+    </p:extLst>
+  </p:cSld>
+  <p:clrMapOvr>
+    <a:masterClrMapping/>
+  </p:clrMapOvr>
+  <p:timing>
+    <p:tnLst>
+      <p:par>
+        <p:cTn id="1" dur="indefinite" restart="never" nodeType="tmRoot"/>
+      </p:par>
+    </p:tnLst>
+  </p:timing>
+</p:sld>
+</file>
+
+<file path=ppt/slides/slide12.xml><?xml version="1.0" encoding="utf-8"?>
+<p:sld xmlns:a="http://schemas.openxmlformats.org/drawingml/2006/main" xmlns:r="http://schemas.openxmlformats.org/officeDocument/2006/relationships" xmlns:p="http://schemas.openxmlformats.org/presentationml/2006/main">
+  <p:cSld>
+    <p:spTree>
+      <p:nvGrpSpPr>
+        <p:cNvPr id="1" name=""/>
+        <p:cNvGrpSpPr/>
+        <p:nvPr/>
+      </p:nvGrpSpPr>
+      <p:grpSpPr>
+        <a:xfrm>
+          <a:off x="0" y="0"/>
+          <a:ext cx="0" cy="0"/>
+          <a:chOff x="0" y="0"/>
+          <a:chExt cx="0" cy="0"/>
+        </a:xfrm>
+      </p:grpSpPr>
+      <p:sp>
+        <p:nvSpPr>
+          <p:cNvPr id="2" name="כותרת 1"/>
+          <p:cNvSpPr>
+            <a:spLocks noGrp="1"/>
+          </p:cNvSpPr>
+          <p:nvPr>
+            <p:ph type="ctrTitle"/>
+          </p:nvPr>
+        </p:nvSpPr>
+        <p:spPr>
+          <a:xfrm>
+            <a:off x="3915804" y="0"/>
+            <a:ext cx="5077083" cy="849141"/>
+          </a:xfrm>
+        </p:spPr>
+        <p:txBody>
+          <a:bodyPr>
+            <a:normAutofit fontScale="90000"/>
+          </a:bodyPr>
+          <a:lstStyle/>
+          <a:p>
+            <a:pPr rtl="0"/>
+            <a:r>
+              <a:rPr lang="en-US" dirty="0" err="1" smtClean="0"/>
+              <a:t>routine_table</a:t>
+            </a:r>
+            <a:endParaRPr lang="he-IL" dirty="0"/>
+          </a:p>
+        </p:txBody>
+      </p:sp>
+      <p:sp>
+        <p:nvSpPr>
+          <p:cNvPr id="9" name="מלבן 8"/>
+          <p:cNvSpPr/>
+          <p:nvPr/>
+        </p:nvSpPr>
+        <p:spPr>
+          <a:xfrm>
+            <a:off x="1820562" y="1326292"/>
+            <a:ext cx="9267568" cy="5000367"/>
+          </a:xfrm>
+          <a:prstGeom prst="rect">
+            <a:avLst/>
+          </a:prstGeom>
+        </p:spPr>
+        <p:style>
+          <a:lnRef idx="2">
+            <a:schemeClr val="accent1">
+              <a:shade val="50000"/>
+            </a:schemeClr>
+          </a:lnRef>
+          <a:fillRef idx="1">
+            <a:schemeClr val="accent1"/>
+          </a:fillRef>
+          <a:effectRef idx="0">
+            <a:schemeClr val="accent1"/>
+          </a:effectRef>
+          <a:fontRef idx="minor">
+            <a:schemeClr val="lt1"/>
+          </a:fontRef>
+        </p:style>
+        <p:txBody>
+          <a:bodyPr rtlCol="1" anchor="t"/>
+          <a:lstStyle/>
+          <a:p>
+            <a:pPr algn="l" rtl="0"/>
+            <a:r>
+              <a:rPr lang="en-US" sz="4000" dirty="0" smtClean="0"/>
+              <a:t>			    Id		      date			</a:t>
+            </a:r>
+            <a:endParaRPr lang="he-IL" sz="4000" dirty="0"/>
+          </a:p>
+        </p:txBody>
+      </p:sp>
+    </p:spTree>
+    <p:extLst>
+      <p:ext uri="{BB962C8B-B14F-4D97-AF65-F5344CB8AC3E}">
+        <p14:creationId xmlns:p14="http://schemas.microsoft.com/office/powerpoint/2010/main" val="763200124"/>
+      </p:ext>
+    </p:extLst>
+  </p:cSld>
+  <p:clrMapOvr>
+    <a:masterClrMapping/>
+  </p:clrMapOvr>
+  <p:timing>
+    <p:tnLst>
+      <p:par>
+        <p:cTn id="1" dur="indefinite" restart="never" nodeType="tmRoot"/>
+      </p:par>
+    </p:tnLst>
+  </p:timing>
+</p:sld>
+</file>
+
+<file path=ppt/slides/slide13.xml><?xml version="1.0" encoding="utf-8"?>
+<p:sld xmlns:a="http://schemas.openxmlformats.org/drawingml/2006/main" xmlns:r="http://schemas.openxmlformats.org/officeDocument/2006/relationships" xmlns:p="http://schemas.openxmlformats.org/presentationml/2006/main">
+  <p:cSld>
+    <p:spTree>
+      <p:nvGrpSpPr>
+        <p:cNvPr id="1" name=""/>
+        <p:cNvGrpSpPr/>
+        <p:nvPr/>
+      </p:nvGrpSpPr>
+      <p:grpSpPr>
+        <a:xfrm>
+          <a:off x="0" y="0"/>
+          <a:ext cx="0" cy="0"/>
+          <a:chOff x="0" y="0"/>
+          <a:chExt cx="0" cy="0"/>
+        </a:xfrm>
+      </p:grpSpPr>
+      <p:sp>
+        <p:nvSpPr>
+          <p:cNvPr id="2" name="כותרת 1"/>
+          <p:cNvSpPr>
+            <a:spLocks noGrp="1"/>
+          </p:cNvSpPr>
+          <p:nvPr>
+            <p:ph type="ctrTitle"/>
+          </p:nvPr>
+        </p:nvSpPr>
+        <p:spPr>
+          <a:xfrm>
+            <a:off x="3899329" y="57665"/>
+            <a:ext cx="5110033" cy="849141"/>
+          </a:xfrm>
+        </p:spPr>
+        <p:txBody>
+          <a:bodyPr>
+            <a:normAutofit fontScale="90000"/>
+          </a:bodyPr>
+          <a:lstStyle/>
+          <a:p>
+            <a:pPr rtl="0"/>
+            <a:r>
+              <a:rPr lang="en-US" dirty="0" err="1"/>
+              <a:t>w</a:t>
+            </a:r>
+            <a:r>
+              <a:rPr lang="en-US" dirty="0" err="1" smtClean="0"/>
+              <a:t>orkout_history</a:t>
+            </a:r>
+            <a:endParaRPr lang="he-IL" dirty="0"/>
+          </a:p>
+        </p:txBody>
+      </p:sp>
+      <p:sp>
+        <p:nvSpPr>
+          <p:cNvPr id="9" name="מלבן 8"/>
+          <p:cNvSpPr/>
+          <p:nvPr/>
+        </p:nvSpPr>
+        <p:spPr>
+          <a:xfrm>
+            <a:off x="1820562" y="1326292"/>
+            <a:ext cx="9267568" cy="5000367"/>
+          </a:xfrm>
+          <a:prstGeom prst="rect">
+            <a:avLst/>
+          </a:prstGeom>
+        </p:spPr>
+        <p:style>
+          <a:lnRef idx="2">
+            <a:schemeClr val="accent1">
+              <a:shade val="50000"/>
+            </a:schemeClr>
+          </a:lnRef>
+          <a:fillRef idx="1">
+            <a:schemeClr val="accent1"/>
+          </a:fillRef>
+          <a:effectRef idx="0">
+            <a:schemeClr val="accent1"/>
+          </a:effectRef>
+          <a:fontRef idx="minor">
+            <a:schemeClr val="lt1"/>
+          </a:fontRef>
+        </p:style>
+        <p:txBody>
+          <a:bodyPr rtlCol="1" anchor="t"/>
+          <a:lstStyle/>
+          <a:p>
             <a:pPr algn="l" rtl="0"/>
             <a:r>
               <a:rPr lang="en-US" sz="4000" dirty="0" smtClean="0"/>
@@ -3187,7 +3807,6 @@
               <a:rPr lang="en-US" sz="4000" dirty="0" smtClean="0"/>
               <a:t>	type	date	workout</a:t>
             </a:r>
-            <a:endParaRPr lang="en-US" sz="4000" dirty="0" smtClean="0"/>
           </a:p>
           <a:p>
             <a:pPr algn="l" rtl="0"/>
@@ -3303,7 +3922,19 @@
             <a:pPr algn="l" rtl="0"/>
             <a:r>
               <a:rPr lang="en-US" sz="4000" dirty="0" smtClean="0"/>
-              <a:t>String				name</a:t>
+              <a:t>String				name=</a:t>
+            </a:r>
+            <a:r>
+              <a:rPr lang="en-US" sz="4000" dirty="0" err="1" smtClean="0"/>
+              <a:t>mussleGroups</a:t>
+            </a:r>
+            <a:endParaRPr lang="en-US" sz="4000" dirty="0" smtClean="0"/>
+          </a:p>
+          <a:p>
+            <a:pPr algn="l" rtl="0"/>
+            <a:r>
+              <a:rPr lang="en-US" sz="4000" dirty="0" smtClean="0"/>
+              <a:t>Date				date</a:t>
             </a:r>
           </a:p>
           <a:p>
@@ -3401,8 +4032,8 @@
         </p:nvSpPr>
         <p:spPr>
           <a:xfrm>
-            <a:off x="1820562" y="1326292"/>
-            <a:ext cx="9267568" cy="5000367"/>
+            <a:off x="1820562" y="849142"/>
+            <a:ext cx="9267568" cy="5477518"/>
           </a:xfrm>
           <a:prstGeom prst="rect">
             <a:avLst/>
@@ -3429,6 +4060,17 @@
           <a:lstStyle/>
           <a:p>
             <a:pPr algn="l" rtl="0"/>
+            <a:endParaRPr lang="en-US" sz="4000" dirty="0" smtClean="0"/>
+          </a:p>
+          <a:p>
+            <a:pPr algn="l" rtl="0"/>
+            <a:r>
+              <a:rPr lang="en-US" sz="4000" dirty="0" smtClean="0"/>
+              <a:t>String					name</a:t>
+            </a:r>
+          </a:p>
+          <a:p>
+            <a:pPr algn="l" rtl="0"/>
             <a:r>
               <a:rPr lang="en-US" sz="4000" dirty="0" smtClean="0"/>
               <a:t>String					description</a:t>
@@ -3456,20 +4098,35 @@
           <a:p>
             <a:pPr algn="l" rtl="0"/>
             <a:r>
+              <a:rPr lang="en-US" sz="4000" dirty="0" smtClean="0"/>
+              <a:t>Array&lt;float&gt;[5]			reps</a:t>
+            </a:r>
+          </a:p>
+          <a:p>
+            <a:pPr algn="l" rtl="0"/>
+            <a:r>
+              <a:rPr lang="en-US" sz="4000" dirty="0" smtClean="0"/>
+              <a:t>Boolean					</a:t>
+            </a:r>
+            <a:r>
+              <a:rPr lang="en-US" sz="4000" dirty="0" err="1" smtClean="0"/>
+              <a:t>isOriginal</a:t>
+            </a:r>
+            <a:endParaRPr lang="en-US" sz="4000" dirty="0" smtClean="0"/>
+          </a:p>
+          <a:p>
+            <a:pPr algn="l" rtl="0"/>
+            <a:r>
+              <a:rPr lang="en-US" sz="4000" dirty="0" smtClean="0"/>
+              <a:t>//</a:t>
+            </a:r>
+            <a:r>
               <a:rPr lang="en-US" sz="4000" dirty="0" err="1" smtClean="0"/>
               <a:t>Arraylist</a:t>
             </a:r>
             <a:r>
               <a:rPr lang="en-US" sz="4000" dirty="0" smtClean="0"/>
-              <a:t>&lt;Float/Double</a:t>
-            </a:r>
-            <a:r>
-              <a:rPr lang="en-US" sz="4000" dirty="0" smtClean="0"/>
-              <a:t>&gt;	</a:t>
-            </a:r>
-            <a:r>
-              <a:rPr lang="en-US" sz="4000" dirty="0" smtClean="0"/>
-              <a:t>reps</a:t>
+              <a:t>&lt;Float/Double&gt;	reps</a:t>
             </a:r>
           </a:p>
           <a:p>
@@ -3963,7 +4620,11 @@
             <a:pPr algn="l" rtl="0"/>
             <a:r>
               <a:rPr lang="en-US" dirty="0" smtClean="0"/>
-              <a:t>Routine		12.12.12</a:t>
+              <a:t>Mass</a:t>
+            </a:r>
+            <a:r>
+              <a:rPr lang="en-US" dirty="0" smtClean="0"/>
+              <a:t>		12.12.12</a:t>
             </a:r>
           </a:p>
           <a:p>
@@ -4036,7 +4697,11 @@
             <a:pPr algn="l" rtl="0"/>
             <a:r>
               <a:rPr lang="en-US" dirty="0" smtClean="0"/>
-              <a:t>Routine		11.11.12</a:t>
+              <a:t>Fit</a:t>
+            </a:r>
+            <a:r>
+              <a:rPr lang="en-US" dirty="0" smtClean="0"/>
+              <a:t>		11.11.12</a:t>
             </a:r>
           </a:p>
           <a:p>
@@ -4113,7 +4778,11 @@
             <a:pPr algn="l" rtl="0"/>
             <a:r>
               <a:rPr lang="en-US" dirty="0" smtClean="0"/>
-              <a:t>Routine		10.10.12</a:t>
+              <a:t>Mass</a:t>
+            </a:r>
+            <a:r>
+              <a:rPr lang="en-US" dirty="0" smtClean="0"/>
+              <a:t>		10.10.12</a:t>
             </a:r>
           </a:p>
           <a:p>
@@ -4145,6 +4814,129 @@
               <a:rPr lang="en-US" dirty="0" smtClean="0"/>
               <a:t> Legs Biceps</a:t>
             </a:r>
+          </a:p>
+        </p:txBody>
+      </p:sp>
+      <p:sp>
+        <p:nvSpPr>
+          <p:cNvPr id="6" name="מלבן 5"/>
+          <p:cNvSpPr/>
+          <p:nvPr/>
+        </p:nvSpPr>
+        <p:spPr>
+          <a:xfrm>
+            <a:off x="7331675" y="4803624"/>
+            <a:ext cx="465438" cy="357702"/>
+          </a:xfrm>
+          <a:prstGeom prst="rect">
+            <a:avLst/>
+          </a:prstGeom>
+        </p:spPr>
+        <p:style>
+          <a:lnRef idx="2">
+            <a:schemeClr val="accent1">
+              <a:shade val="50000"/>
+            </a:schemeClr>
+          </a:lnRef>
+          <a:fillRef idx="1">
+            <a:schemeClr val="accent1"/>
+          </a:fillRef>
+          <a:effectRef idx="0">
+            <a:schemeClr val="accent1"/>
+          </a:effectRef>
+          <a:fontRef idx="minor">
+            <a:schemeClr val="lt1"/>
+          </a:fontRef>
+        </p:style>
+        <p:txBody>
+          <a:bodyPr rtlCol="1" anchor="ctr"/>
+          <a:lstStyle/>
+          <a:p>
+            <a:pPr algn="ctr"/>
+            <a:r>
+              <a:rPr lang="en-US" dirty="0" smtClean="0"/>
+              <a:t>+</a:t>
+            </a:r>
+            <a:endParaRPr lang="he-IL" dirty="0"/>
+          </a:p>
+        </p:txBody>
+      </p:sp>
+      <p:cxnSp>
+        <p:nvCxnSpPr>
+          <p:cNvPr id="4" name="מחבר חץ ישר 3"/>
+          <p:cNvCxnSpPr>
+            <a:stCxn id="6" idx="3"/>
+          </p:cNvCxnSpPr>
+          <p:nvPr/>
+        </p:nvCxnSpPr>
+        <p:spPr>
+          <a:xfrm>
+            <a:off x="7797113" y="4982475"/>
+            <a:ext cx="811428" cy="108509"/>
+          </a:xfrm>
+          <a:prstGeom prst="straightConnector1">
+            <a:avLst/>
+          </a:prstGeom>
+          <a:ln>
+            <a:tailEnd type="triangle"/>
+          </a:ln>
+        </p:spPr>
+        <p:style>
+          <a:lnRef idx="1">
+            <a:schemeClr val="accent1"/>
+          </a:lnRef>
+          <a:fillRef idx="0">
+            <a:schemeClr val="accent1"/>
+          </a:fillRef>
+          <a:effectRef idx="0">
+            <a:schemeClr val="accent1"/>
+          </a:effectRef>
+          <a:fontRef idx="minor">
+            <a:schemeClr val="tx1"/>
+          </a:fontRef>
+        </p:style>
+      </p:cxnSp>
+      <p:sp>
+        <p:nvSpPr>
+          <p:cNvPr id="7" name="מלבן מעוגל 6"/>
+          <p:cNvSpPr/>
+          <p:nvPr/>
+        </p:nvSpPr>
+        <p:spPr>
+          <a:xfrm>
+            <a:off x="8608541" y="4982475"/>
+            <a:ext cx="1351005" cy="495687"/>
+          </a:xfrm>
+          <a:prstGeom prst="roundRect">
+            <a:avLst/>
+          </a:prstGeom>
+        </p:spPr>
+        <p:style>
+          <a:lnRef idx="2">
+            <a:schemeClr val="accent1">
+              <a:shade val="50000"/>
+            </a:schemeClr>
+          </a:lnRef>
+          <a:fillRef idx="1">
+            <a:schemeClr val="accent1"/>
+          </a:fillRef>
+          <a:effectRef idx="0">
+            <a:schemeClr val="accent1"/>
+          </a:effectRef>
+          <a:fontRef idx="minor">
+            <a:schemeClr val="lt1"/>
+          </a:fontRef>
+        </p:style>
+        <p:txBody>
+          <a:bodyPr rtlCol="1" anchor="ctr"/>
+          <a:lstStyle/>
+          <a:p>
+            <a:pPr algn="ctr"/>
+            <a:r>
+              <a:rPr lang="en-US" dirty="0" err="1" smtClean="0"/>
+              <a:t>AddRoutineActivity</a:t>
+            </a:r>
+            <a:endParaRPr lang="he-IL" dirty="0"/>
           </a:p>
         </p:txBody>
       </p:sp>
@@ -4208,7 +5000,7 @@
             <a:pPr rtl="0"/>
             <a:r>
               <a:rPr lang="en-US" dirty="0" err="1" smtClean="0"/>
-              <a:t>EditRoutine</a:t>
+              <a:t>AddRoutineActivity</a:t>
             </a:r>
             <a:endParaRPr lang="he-IL" dirty="0"/>
           </a:p>
@@ -4223,7 +5015,7 @@
         <p:spPr>
           <a:xfrm>
             <a:off x="4592594" y="1206843"/>
-            <a:ext cx="3204519" cy="976184"/>
+            <a:ext cx="3204519" cy="333633"/>
           </a:xfrm>
           <a:prstGeom prst="roundRect">
             <a:avLst/>
@@ -4251,22 +5043,26 @@
           <a:p>
             <a:pPr algn="l" rtl="0"/>
             <a:r>
+              <a:rPr lang="en-US" u="sng" dirty="0" smtClean="0"/>
+              <a:t>Routine Name </a:t>
+            </a:r>
+            <a:r>
               <a:rPr lang="en-US" dirty="0" smtClean="0"/>
-              <a:t>A-Back Biceps</a:t>
-            </a:r>
-          </a:p>
-        </p:txBody>
-      </p:sp>
-      <p:sp>
-        <p:nvSpPr>
-          <p:cNvPr id="10" name="מלבן מעוגל 9"/>
+              <a:t>___________	</a:t>
+            </a:r>
+          </a:p>
+        </p:txBody>
+      </p:sp>
+      <p:sp>
+        <p:nvSpPr>
+          <p:cNvPr id="9" name="מלבן מעוגל 8"/>
           <p:cNvSpPr/>
           <p:nvPr/>
         </p:nvSpPr>
         <p:spPr>
           <a:xfrm>
-            <a:off x="4592594" y="2393091"/>
-            <a:ext cx="3204519" cy="1099751"/>
+            <a:off x="4592593" y="1731361"/>
+            <a:ext cx="3204519" cy="333633"/>
           </a:xfrm>
           <a:prstGeom prst="roundRect">
             <a:avLst/>
@@ -4294,65 +5090,20 @@
           <a:p>
             <a:pPr algn="l" rtl="0"/>
             <a:r>
+              <a:rPr lang="en-US" u="sng" dirty="0" smtClean="0"/>
+              <a:t>Starting Date </a:t>
+            </a:r>
+            <a:r>
               <a:rPr lang="en-US" dirty="0" smtClean="0"/>
-              <a:t>B-Chest Biceps</a:t>
-            </a:r>
-            <a:endParaRPr lang="en-US" dirty="0"/>
-          </a:p>
-        </p:txBody>
-      </p:sp>
-      <p:sp>
-        <p:nvSpPr>
-          <p:cNvPr id="12" name="מלבן מעוגל 11"/>
-          <p:cNvSpPr/>
-          <p:nvPr/>
-        </p:nvSpPr>
-        <p:spPr>
-          <a:xfrm>
-            <a:off x="4592594" y="3702906"/>
-            <a:ext cx="3204519" cy="976184"/>
-          </a:xfrm>
-          <a:prstGeom prst="roundRect">
-            <a:avLst/>
-          </a:prstGeom>
-        </p:spPr>
-        <p:style>
-          <a:lnRef idx="2">
-            <a:schemeClr val="accent1">
-              <a:shade val="50000"/>
-            </a:schemeClr>
-          </a:lnRef>
-          <a:fillRef idx="1">
-            <a:schemeClr val="accent1"/>
-          </a:fillRef>
-          <a:effectRef idx="0">
-            <a:schemeClr val="accent1"/>
-          </a:effectRef>
-          <a:fontRef idx="minor">
-            <a:schemeClr val="lt1"/>
-          </a:fontRef>
-        </p:style>
-        <p:txBody>
-          <a:bodyPr rtlCol="1" anchor="ctr"/>
-          <a:lstStyle/>
-          <a:p>
-            <a:pPr algn="l" rtl="0"/>
-            <a:r>
-              <a:rPr lang="en-US" dirty="0" smtClean="0"/>
-              <a:t>C-Legs </a:t>
-            </a:r>
-            <a:r>
-              <a:rPr lang="en-US" dirty="0" err="1" smtClean="0"/>
-              <a:t>Soulders</a:t>
-            </a:r>
-            <a:endParaRPr lang="en-US" dirty="0" smtClean="0"/>
+              <a:t>___________	</a:t>
+            </a:r>
           </a:p>
         </p:txBody>
       </p:sp>
     </p:spTree>
     <p:extLst>
       <p:ext uri="{BB962C8B-B14F-4D97-AF65-F5344CB8AC3E}">
-        <p14:creationId xmlns:p14="http://schemas.microsoft.com/office/powerpoint/2010/main" val="467685491"/>
+        <p14:creationId xmlns:p14="http://schemas.microsoft.com/office/powerpoint/2010/main" val="504684143"/>
       </p:ext>
     </p:extLst>
   </p:cSld>
@@ -4398,20 +5149,18 @@
         </p:nvSpPr>
         <p:spPr>
           <a:xfrm>
-            <a:off x="4347003" y="0"/>
-            <a:ext cx="3695700" cy="849141"/>
-          </a:xfrm>
-        </p:spPr>
-        <p:txBody>
-          <a:bodyPr>
-            <a:normAutofit fontScale="90000"/>
-          </a:bodyPr>
+            <a:off x="1622854" y="-1538459"/>
+            <a:ext cx="9144000" cy="2387600"/>
+          </a:xfrm>
+        </p:spPr>
+        <p:txBody>
+          <a:bodyPr/>
           <a:lstStyle/>
           <a:p>
             <a:pPr rtl="0"/>
             <a:r>
               <a:rPr lang="en-US" dirty="0" err="1" smtClean="0"/>
-              <a:t>EditWorkout</a:t>
+              <a:t>EditRoutine</a:t>
             </a:r>
             <a:endParaRPr lang="he-IL" dirty="0"/>
           </a:p>
@@ -4452,19 +5201,11 @@
           <a:bodyPr rtlCol="1" anchor="ctr"/>
           <a:lstStyle/>
           <a:p>
-            <a:pPr rtl="0"/>
-            <a:r>
-              <a:rPr lang="he-IL" dirty="0" smtClean="0"/>
-              <a:t>מתח</a:t>
-            </a:r>
-          </a:p>
-          <a:p>
-            <a:pPr rtl="0"/>
-            <a:r>
-              <a:rPr lang="he-IL" dirty="0" smtClean="0"/>
-              <a:t>גב</a:t>
-            </a:r>
-            <a:endParaRPr lang="en-US" dirty="0" smtClean="0"/>
+            <a:pPr algn="l" rtl="0"/>
+            <a:r>
+              <a:rPr lang="en-US" dirty="0" smtClean="0"/>
+              <a:t>A-Back Biceps</a:t>
+            </a:r>
           </a:p>
         </p:txBody>
       </p:sp>
@@ -4503,15 +5244,10 @@
           <a:bodyPr rtlCol="1" anchor="ctr"/>
           <a:lstStyle/>
           <a:p>
-            <a:r>
-              <a:rPr lang="he-IL" dirty="0" smtClean="0"/>
-              <a:t>חתיכה במכונה</a:t>
-            </a:r>
-          </a:p>
-          <a:p>
-            <a:r>
-              <a:rPr lang="he-IL" dirty="0" smtClean="0"/>
-              <a:t>גב</a:t>
+            <a:pPr algn="l" rtl="0"/>
+            <a:r>
+              <a:rPr lang="en-US" dirty="0" smtClean="0"/>
+              <a:t>B-Chest Biceps</a:t>
             </a:r>
             <a:endParaRPr lang="en-US" dirty="0"/>
           </a:p>
@@ -4552,18 +5288,14 @@
           <a:bodyPr rtlCol="1" anchor="ctr"/>
           <a:lstStyle/>
           <a:p>
-            <a:pPr algn="r"/>
-            <a:r>
-              <a:rPr lang="he-IL" dirty="0" err="1" smtClean="0"/>
-              <a:t>דדליפט</a:t>
-            </a:r>
-            <a:endParaRPr lang="he-IL" dirty="0" smtClean="0"/>
-          </a:p>
-          <a:p>
-            <a:pPr algn="r"/>
-            <a:r>
-              <a:rPr lang="he-IL" dirty="0" smtClean="0"/>
-              <a:t>גב</a:t>
+            <a:pPr algn="l" rtl="0"/>
+            <a:r>
+              <a:rPr lang="en-US" dirty="0" smtClean="0"/>
+              <a:t>C-Legs </a:t>
+            </a:r>
+            <a:r>
+              <a:rPr lang="en-US" dirty="0" err="1" smtClean="0"/>
+              <a:t>Soulders</a:t>
             </a:r>
             <a:endParaRPr lang="en-US" dirty="0" smtClean="0"/>
           </a:p>
@@ -4571,16 +5303,16 @@
       </p:sp>
       <p:sp>
         <p:nvSpPr>
-          <p:cNvPr id="6" name="מלבן מעוגל 5"/>
+          <p:cNvPr id="6" name="מלבן 5"/>
           <p:cNvSpPr/>
           <p:nvPr/>
         </p:nvSpPr>
         <p:spPr>
           <a:xfrm>
-            <a:off x="4592594" y="4889154"/>
-            <a:ext cx="3204519" cy="976184"/>
-          </a:xfrm>
-          <a:prstGeom prst="roundRect">
+            <a:off x="7331675" y="4803624"/>
+            <a:ext cx="465438" cy="357702"/>
+          </a:xfrm>
+          <a:prstGeom prst="rect">
             <a:avLst/>
           </a:prstGeom>
         </p:spPr>
@@ -4604,61 +5336,6 @@
           <a:bodyPr rtlCol="1" anchor="ctr"/>
           <a:lstStyle/>
           <a:p>
-            <a:pPr algn="r"/>
-            <a:r>
-              <a:rPr lang="he-IL" dirty="0" err="1" smtClean="0"/>
-              <a:t>מיליטרי</a:t>
-            </a:r>
-            <a:r>
-              <a:rPr lang="he-IL" dirty="0" smtClean="0"/>
-              <a:t> פרס</a:t>
-            </a:r>
-          </a:p>
-          <a:p>
-            <a:pPr algn="r"/>
-            <a:r>
-              <a:rPr lang="he-IL" dirty="0" smtClean="0"/>
-              <a:t>כתפיים</a:t>
-            </a:r>
-            <a:endParaRPr lang="en-US" dirty="0" smtClean="0"/>
-          </a:p>
-        </p:txBody>
-      </p:sp>
-      <p:sp>
-        <p:nvSpPr>
-          <p:cNvPr id="4" name="מלבן 3"/>
-          <p:cNvSpPr/>
-          <p:nvPr/>
-        </p:nvSpPr>
-        <p:spPr>
-          <a:xfrm>
-            <a:off x="4592594" y="775322"/>
-            <a:ext cx="465438" cy="357702"/>
-          </a:xfrm>
-          <a:prstGeom prst="rect">
-            <a:avLst/>
-          </a:prstGeom>
-        </p:spPr>
-        <p:style>
-          <a:lnRef idx="2">
-            <a:schemeClr val="accent1">
-              <a:shade val="50000"/>
-            </a:schemeClr>
-          </a:lnRef>
-          <a:fillRef idx="1">
-            <a:schemeClr val="accent1"/>
-          </a:fillRef>
-          <a:effectRef idx="0">
-            <a:schemeClr val="accent1"/>
-          </a:effectRef>
-          <a:fontRef idx="minor">
-            <a:schemeClr val="lt1"/>
-          </a:fontRef>
-        </p:style>
-        <p:txBody>
-          <a:bodyPr rtlCol="1" anchor="ctr"/>
-          <a:lstStyle/>
-          <a:p>
             <a:pPr algn="ctr"/>
             <a:r>
               <a:rPr lang="en-US" dirty="0" smtClean="0"/>
@@ -4671,7 +5348,7 @@
     </p:spTree>
     <p:extLst>
       <p:ext uri="{BB962C8B-B14F-4D97-AF65-F5344CB8AC3E}">
-        <p14:creationId xmlns:p14="http://schemas.microsoft.com/office/powerpoint/2010/main" val="2668362922"/>
+        <p14:creationId xmlns:p14="http://schemas.microsoft.com/office/powerpoint/2010/main" val="467685491"/>
       </p:ext>
     </p:extLst>
   </p:cSld>
@@ -4717,7 +5394,7 @@
         </p:nvSpPr>
         <p:spPr>
           <a:xfrm>
-            <a:off x="4384074" y="295918"/>
+            <a:off x="4347003" y="0"/>
             <a:ext cx="3695700" cy="849141"/>
           </a:xfrm>
         </p:spPr>
@@ -4729,8 +5406,8 @@
           <a:p>
             <a:pPr rtl="0"/>
             <a:r>
-              <a:rPr lang="en-US" dirty="0" smtClean="0"/>
-              <a:t>Database</a:t>
+              <a:rPr lang="en-US" dirty="0" err="1" smtClean="0"/>
+              <a:t>EditWorkout</a:t>
             </a:r>
             <a:endParaRPr lang="he-IL" dirty="0"/>
           </a:p>
@@ -4738,16 +5415,16 @@
       </p:sp>
       <p:sp>
         <p:nvSpPr>
-          <p:cNvPr id="9" name="מלבן 8"/>
+          <p:cNvPr id="8" name="מלבן מעוגל 7"/>
           <p:cNvSpPr/>
           <p:nvPr/>
         </p:nvSpPr>
         <p:spPr>
           <a:xfrm>
-            <a:off x="1206843" y="2042985"/>
-            <a:ext cx="5025081" cy="2817340"/>
-          </a:xfrm>
-          <a:prstGeom prst="rect">
+            <a:off x="4617307" y="959707"/>
+            <a:ext cx="3204519" cy="976184"/>
+          </a:xfrm>
+          <a:prstGeom prst="roundRect">
             <a:avLst/>
           </a:prstGeom>
         </p:spPr>
@@ -4768,30 +5445,37 @@
           </a:fontRef>
         </p:style>
         <p:txBody>
-          <a:bodyPr rtlCol="1" anchor="t"/>
-          <a:lstStyle/>
-          <a:p>
-            <a:pPr algn="ctr" rtl="0"/>
-            <a:r>
-              <a:rPr lang="en-US" sz="4000" dirty="0" err="1" smtClean="0"/>
-              <a:t>routine_table</a:t>
-            </a:r>
-            <a:endParaRPr lang="he-IL" sz="4000" dirty="0"/>
-          </a:p>
-        </p:txBody>
-      </p:sp>
-      <p:sp>
-        <p:nvSpPr>
-          <p:cNvPr id="11" name="מלבן 10"/>
+          <a:bodyPr rtlCol="1" anchor="ctr"/>
+          <a:lstStyle/>
+          <a:p>
+            <a:pPr rtl="0"/>
+            <a:r>
+              <a:rPr lang="he-IL" dirty="0" smtClean="0"/>
+              <a:t>מתח</a:t>
+            </a:r>
+          </a:p>
+          <a:p>
+            <a:pPr rtl="0"/>
+            <a:r>
+              <a:rPr lang="he-IL" dirty="0" smtClean="0"/>
+              <a:t>גב</a:t>
+            </a:r>
+            <a:endParaRPr lang="en-US" dirty="0" smtClean="0"/>
+          </a:p>
+        </p:txBody>
+      </p:sp>
+      <p:sp>
+        <p:nvSpPr>
+          <p:cNvPr id="10" name="מלבן מעוגל 9"/>
           <p:cNvSpPr/>
           <p:nvPr/>
         </p:nvSpPr>
         <p:spPr>
           <a:xfrm>
-            <a:off x="6538783" y="2042985"/>
-            <a:ext cx="5025081" cy="2817340"/>
-          </a:xfrm>
-          <a:prstGeom prst="rect">
+            <a:off x="4617307" y="2145955"/>
+            <a:ext cx="3204519" cy="1099751"/>
+          </a:xfrm>
+          <a:prstGeom prst="roundRect">
             <a:avLst/>
           </a:prstGeom>
         </p:spPr>
@@ -4812,37 +5496,37 @@
           </a:fontRef>
         </p:style>
         <p:txBody>
-          <a:bodyPr rtlCol="1" anchor="t"/>
-          <a:lstStyle/>
-          <a:p>
-            <a:pPr algn="l" rtl="0"/>
-            <a:r>
-              <a:rPr lang="en-US" sz="4000" dirty="0" smtClean="0"/>
-              <a:t>	</a:t>
-            </a:r>
-            <a:r>
-              <a:rPr lang="en-US" sz="4000" dirty="0" err="1" smtClean="0"/>
-              <a:t>workout_table</a:t>
-            </a:r>
-            <a:endParaRPr lang="he-IL" sz="4000" dirty="0"/>
-          </a:p>
-        </p:txBody>
-      </p:sp>
-      <p:sp>
-        <p:nvSpPr>
-          <p:cNvPr id="13" name="מלבן 12"/>
+          <a:bodyPr rtlCol="1" anchor="ctr"/>
+          <a:lstStyle/>
+          <a:p>
+            <a:r>
+              <a:rPr lang="he-IL" dirty="0" smtClean="0"/>
+              <a:t>חתיכה במכונה</a:t>
+            </a:r>
+          </a:p>
+          <a:p>
+            <a:r>
+              <a:rPr lang="he-IL" dirty="0" smtClean="0"/>
+              <a:t>גב</a:t>
+            </a:r>
+            <a:endParaRPr lang="en-US" dirty="0"/>
+          </a:p>
+        </p:txBody>
+      </p:sp>
+      <p:sp>
+        <p:nvSpPr>
+          <p:cNvPr id="12" name="מלבן מעוגל 11"/>
           <p:cNvSpPr/>
           <p:nvPr/>
         </p:nvSpPr>
         <p:spPr>
           <a:xfrm>
-            <a:off x="593124" y="1145059"/>
-            <a:ext cx="11277600" cy="4522573"/>
-          </a:xfrm>
-          <a:prstGeom prst="rect">
+            <a:off x="4617307" y="3455770"/>
+            <a:ext cx="3204519" cy="976184"/>
+          </a:xfrm>
+          <a:prstGeom prst="roundRect">
             <a:avLst/>
           </a:prstGeom>
-          <a:noFill/>
         </p:spPr>
         <p:style>
           <a:lnRef idx="2">
@@ -4861,18 +5545,125 @@
           </a:fontRef>
         </p:style>
         <p:txBody>
-          <a:bodyPr rtlCol="1" anchor="t"/>
-          <a:lstStyle/>
-          <a:p>
-            <a:pPr algn="l" rtl="0"/>
-            <a:endParaRPr lang="he-IL" sz="4000" dirty="0"/>
+          <a:bodyPr rtlCol="1" anchor="ctr"/>
+          <a:lstStyle/>
+          <a:p>
+            <a:pPr algn="r"/>
+            <a:r>
+              <a:rPr lang="he-IL" dirty="0" err="1" smtClean="0"/>
+              <a:t>דדליפט</a:t>
+            </a:r>
+            <a:endParaRPr lang="he-IL" dirty="0" smtClean="0"/>
+          </a:p>
+          <a:p>
+            <a:pPr algn="r"/>
+            <a:r>
+              <a:rPr lang="he-IL" dirty="0" smtClean="0"/>
+              <a:t>גב</a:t>
+            </a:r>
+            <a:endParaRPr lang="en-US" dirty="0" smtClean="0"/>
+          </a:p>
+        </p:txBody>
+      </p:sp>
+      <p:sp>
+        <p:nvSpPr>
+          <p:cNvPr id="6" name="מלבן מעוגל 5"/>
+          <p:cNvSpPr/>
+          <p:nvPr/>
+        </p:nvSpPr>
+        <p:spPr>
+          <a:xfrm>
+            <a:off x="4617307" y="4642018"/>
+            <a:ext cx="3204519" cy="976184"/>
+          </a:xfrm>
+          <a:prstGeom prst="roundRect">
+            <a:avLst/>
+          </a:prstGeom>
+        </p:spPr>
+        <p:style>
+          <a:lnRef idx="2">
+            <a:schemeClr val="accent1">
+              <a:shade val="50000"/>
+            </a:schemeClr>
+          </a:lnRef>
+          <a:fillRef idx="1">
+            <a:schemeClr val="accent1"/>
+          </a:fillRef>
+          <a:effectRef idx="0">
+            <a:schemeClr val="accent1"/>
+          </a:effectRef>
+          <a:fontRef idx="minor">
+            <a:schemeClr val="lt1"/>
+          </a:fontRef>
+        </p:style>
+        <p:txBody>
+          <a:bodyPr rtlCol="1" anchor="ctr"/>
+          <a:lstStyle/>
+          <a:p>
+            <a:pPr algn="r"/>
+            <a:r>
+              <a:rPr lang="he-IL" dirty="0" smtClean="0"/>
+              <a:t>יד קדמית בישיבה</a:t>
+            </a:r>
+          </a:p>
+          <a:p>
+            <a:pPr algn="r"/>
+            <a:r>
+              <a:rPr lang="he-IL" dirty="0" smtClean="0"/>
+              <a:t>יד קדמית</a:t>
+            </a:r>
+            <a:endParaRPr lang="en-US" dirty="0" smtClean="0"/>
+          </a:p>
+        </p:txBody>
+      </p:sp>
+      <p:sp>
+        <p:nvSpPr>
+          <p:cNvPr id="4" name="מלבן 3"/>
+          <p:cNvSpPr/>
+          <p:nvPr/>
+        </p:nvSpPr>
+        <p:spPr>
+          <a:xfrm>
+            <a:off x="7356388" y="5712936"/>
+            <a:ext cx="465438" cy="357702"/>
+          </a:xfrm>
+          <a:prstGeom prst="rect">
+            <a:avLst/>
+          </a:prstGeom>
+        </p:spPr>
+        <p:style>
+          <a:lnRef idx="2">
+            <a:schemeClr val="accent1">
+              <a:shade val="50000"/>
+            </a:schemeClr>
+          </a:lnRef>
+          <a:fillRef idx="1">
+            <a:schemeClr val="accent1"/>
+          </a:fillRef>
+          <a:effectRef idx="0">
+            <a:schemeClr val="accent1"/>
+          </a:effectRef>
+          <a:fontRef idx="minor">
+            <a:schemeClr val="lt1"/>
+          </a:fontRef>
+        </p:style>
+        <p:txBody>
+          <a:bodyPr rtlCol="1" anchor="ctr"/>
+          <a:lstStyle/>
+          <a:p>
+            <a:pPr algn="ctr"/>
+            <a:r>
+              <a:rPr lang="en-US" dirty="0" smtClean="0"/>
+              <a:t>+</a:t>
+            </a:r>
+            <a:endParaRPr lang="he-IL" dirty="0"/>
           </a:p>
         </p:txBody>
       </p:sp>
     </p:spTree>
     <p:extLst>
       <p:ext uri="{BB962C8B-B14F-4D97-AF65-F5344CB8AC3E}">
-        <p14:creationId xmlns:p14="http://schemas.microsoft.com/office/powerpoint/2010/main" val="777559622"/>
+        <p14:creationId xmlns:p14="http://schemas.microsoft.com/office/powerpoint/2010/main" val="2668362922"/>
       </p:ext>
     </p:extLst>
   </p:cSld>
@@ -4918,8 +5709,8 @@
         </p:nvSpPr>
         <p:spPr>
           <a:xfrm>
-            <a:off x="3915804" y="0"/>
-            <a:ext cx="5077083" cy="849141"/>
+            <a:off x="3912973" y="0"/>
+            <a:ext cx="4654378" cy="849141"/>
           </a:xfrm>
         </p:spPr>
         <p:txBody>
@@ -4931,11 +5722,7 @@
             <a:pPr rtl="0"/>
             <a:r>
               <a:rPr lang="en-US" dirty="0" err="1" smtClean="0"/>
-              <a:t>r</a:t>
-            </a:r>
-            <a:r>
-              <a:rPr lang="en-US" dirty="0" err="1" smtClean="0"/>
-              <a:t>outine_table</a:t>
+              <a:t>ChoseExercises</a:t>
             </a:r>
             <a:endParaRPr lang="he-IL" dirty="0"/>
           </a:p>
@@ -4943,18 +5730,21 @@
       </p:sp>
       <p:sp>
         <p:nvSpPr>
-          <p:cNvPr id="9" name="מלבן 8"/>
+          <p:cNvPr id="8" name="מלבן מעוגל 7"/>
           <p:cNvSpPr/>
           <p:nvPr/>
         </p:nvSpPr>
         <p:spPr>
           <a:xfrm>
-            <a:off x="1820562" y="1326292"/>
-            <a:ext cx="9267568" cy="5000367"/>
-          </a:xfrm>
-          <a:prstGeom prst="rect">
+            <a:off x="4617307" y="959707"/>
+            <a:ext cx="3204519" cy="448963"/>
+          </a:xfrm>
+          <a:prstGeom prst="roundRect">
             <a:avLst/>
           </a:prstGeom>
+          <a:solidFill>
+            <a:schemeClr val="bg1"/>
+          </a:solidFill>
         </p:spPr>
         <p:style>
           <a:lnRef idx="2">
@@ -4973,26 +5763,359 @@
           </a:fontRef>
         </p:style>
         <p:txBody>
+          <a:bodyPr rtlCol="1" anchor="ctr"/>
+          <a:lstStyle/>
+          <a:p>
+            <a:pPr rtl="0"/>
+            <a:r>
+              <a:rPr lang="en-US" dirty="0" err="1" smtClean="0">
+                <a:solidFill>
+                  <a:srgbClr val="FF0000"/>
+                </a:solidFill>
+              </a:rPr>
+              <a:t>comboBox</a:t>
+            </a:r>
+            <a:r>
+              <a:rPr lang="en-US" dirty="0" smtClean="0">
+                <a:solidFill>
+                  <a:srgbClr val="FF0000"/>
+                </a:solidFill>
+              </a:rPr>
+              <a:t> with </a:t>
+            </a:r>
+            <a:r>
+              <a:rPr lang="en-US" dirty="0" err="1">
+                <a:solidFill>
+                  <a:srgbClr val="FF0000"/>
+                </a:solidFill>
+              </a:rPr>
+              <a:t>m</a:t>
+            </a:r>
+            <a:r>
+              <a:rPr lang="en-US" dirty="0" err="1" smtClean="0">
+                <a:solidFill>
+                  <a:srgbClr val="FF0000"/>
+                </a:solidFill>
+              </a:rPr>
+              <a:t>ussle</a:t>
+            </a:r>
+            <a:r>
+              <a:rPr lang="en-US" dirty="0" smtClean="0">
+                <a:solidFill>
+                  <a:srgbClr val="FF0000"/>
+                </a:solidFill>
+              </a:rPr>
+              <a:t> </a:t>
+            </a:r>
+            <a:r>
+              <a:rPr lang="en-US" dirty="0" err="1" smtClean="0">
+                <a:solidFill>
+                  <a:srgbClr val="FF0000"/>
+                </a:solidFill>
+              </a:rPr>
+              <a:t>group</a:t>
+            </a:r>
+            <a:r>
+              <a:rPr lang="en-US" dirty="0" err="1" smtClean="0"/>
+              <a:t>d</a:t>
+            </a:r>
+            <a:endParaRPr lang="en-US" dirty="0" smtClean="0"/>
+          </a:p>
+        </p:txBody>
+      </p:sp>
+      <p:sp>
+        <p:nvSpPr>
+          <p:cNvPr id="10" name="מלבן מעוגל 9"/>
+          <p:cNvSpPr/>
+          <p:nvPr/>
+        </p:nvSpPr>
+        <p:spPr>
+          <a:xfrm>
+            <a:off x="4617307" y="2145955"/>
+            <a:ext cx="3204519" cy="1099751"/>
+          </a:xfrm>
+          <a:prstGeom prst="roundRect">
+            <a:avLst/>
+          </a:prstGeom>
+        </p:spPr>
+        <p:style>
+          <a:lnRef idx="2">
+            <a:schemeClr val="accent1">
+              <a:shade val="50000"/>
+            </a:schemeClr>
+          </a:lnRef>
+          <a:fillRef idx="1">
+            <a:schemeClr val="accent1"/>
+          </a:fillRef>
+          <a:effectRef idx="0">
+            <a:schemeClr val="accent1"/>
+          </a:effectRef>
+          <a:fontRef idx="minor">
+            <a:schemeClr val="lt1"/>
+          </a:fontRef>
+        </p:style>
+        <p:txBody>
+          <a:bodyPr rtlCol="1" anchor="ctr"/>
+          <a:lstStyle/>
+          <a:p>
+            <a:r>
+              <a:rPr lang="he-IL" dirty="0" smtClean="0"/>
+              <a:t>חתיכה במכונה</a:t>
+            </a:r>
+          </a:p>
+          <a:p>
+            <a:r>
+              <a:rPr lang="he-IL" dirty="0" smtClean="0"/>
+              <a:t>גב</a:t>
+            </a:r>
+            <a:endParaRPr lang="en-US" dirty="0"/>
+          </a:p>
+        </p:txBody>
+      </p:sp>
+      <p:sp>
+        <p:nvSpPr>
+          <p:cNvPr id="12" name="מלבן מעוגל 11"/>
+          <p:cNvSpPr/>
+          <p:nvPr/>
+        </p:nvSpPr>
+        <p:spPr>
+          <a:xfrm>
+            <a:off x="4617307" y="3455770"/>
+            <a:ext cx="3204519" cy="976184"/>
+          </a:xfrm>
+          <a:prstGeom prst="roundRect">
+            <a:avLst/>
+          </a:prstGeom>
+        </p:spPr>
+        <p:style>
+          <a:lnRef idx="2">
+            <a:schemeClr val="accent1">
+              <a:shade val="50000"/>
+            </a:schemeClr>
+          </a:lnRef>
+          <a:fillRef idx="1">
+            <a:schemeClr val="accent1"/>
+          </a:fillRef>
+          <a:effectRef idx="0">
+            <a:schemeClr val="accent1"/>
+          </a:effectRef>
+          <a:fontRef idx="minor">
+            <a:schemeClr val="lt1"/>
+          </a:fontRef>
+        </p:style>
+        <p:txBody>
+          <a:bodyPr rtlCol="1" anchor="ctr"/>
+          <a:lstStyle/>
+          <a:p>
+            <a:pPr algn="r"/>
+            <a:r>
+              <a:rPr lang="he-IL" dirty="0" err="1" smtClean="0"/>
+              <a:t>דדליפט</a:t>
+            </a:r>
+            <a:endParaRPr lang="he-IL" dirty="0" smtClean="0"/>
+          </a:p>
+          <a:p>
+            <a:pPr algn="r"/>
+            <a:r>
+              <a:rPr lang="he-IL" dirty="0" smtClean="0"/>
+              <a:t>גב</a:t>
+            </a:r>
+            <a:endParaRPr lang="en-US" dirty="0" smtClean="0"/>
+          </a:p>
+        </p:txBody>
+      </p:sp>
+      <p:sp>
+        <p:nvSpPr>
+          <p:cNvPr id="6" name="מלבן מעוגל 5"/>
+          <p:cNvSpPr/>
+          <p:nvPr/>
+        </p:nvSpPr>
+        <p:spPr>
+          <a:xfrm>
+            <a:off x="4617307" y="4642018"/>
+            <a:ext cx="3204519" cy="976184"/>
+          </a:xfrm>
+          <a:prstGeom prst="roundRect">
+            <a:avLst/>
+          </a:prstGeom>
+        </p:spPr>
+        <p:style>
+          <a:lnRef idx="2">
+            <a:schemeClr val="accent1">
+              <a:shade val="50000"/>
+            </a:schemeClr>
+          </a:lnRef>
+          <a:fillRef idx="1">
+            <a:schemeClr val="accent1"/>
+          </a:fillRef>
+          <a:effectRef idx="0">
+            <a:schemeClr val="accent1"/>
+          </a:effectRef>
+          <a:fontRef idx="minor">
+            <a:schemeClr val="lt1"/>
+          </a:fontRef>
+        </p:style>
+        <p:txBody>
+          <a:bodyPr rtlCol="1" anchor="ctr"/>
+          <a:lstStyle/>
+          <a:p>
+            <a:pPr algn="r"/>
+            <a:r>
+              <a:rPr lang="he-IL" dirty="0" err="1" smtClean="0"/>
+              <a:t>מיליטרי</a:t>
+            </a:r>
+            <a:r>
+              <a:rPr lang="he-IL" dirty="0" smtClean="0"/>
+              <a:t> פרס</a:t>
+            </a:r>
+          </a:p>
+          <a:p>
+            <a:pPr algn="r"/>
+            <a:r>
+              <a:rPr lang="he-IL" dirty="0" smtClean="0"/>
+              <a:t>כתפיים</a:t>
+            </a:r>
+            <a:endParaRPr lang="en-US" dirty="0" smtClean="0"/>
+          </a:p>
+        </p:txBody>
+      </p:sp>
+      <p:sp>
+        <p:nvSpPr>
+          <p:cNvPr id="4" name="מלבן 3"/>
+          <p:cNvSpPr/>
+          <p:nvPr/>
+        </p:nvSpPr>
+        <p:spPr>
+          <a:xfrm>
+            <a:off x="7356388" y="6254901"/>
+            <a:ext cx="465438" cy="357702"/>
+          </a:xfrm>
+          <a:prstGeom prst="rect">
+            <a:avLst/>
+          </a:prstGeom>
+        </p:spPr>
+        <p:style>
+          <a:lnRef idx="2">
+            <a:schemeClr val="accent1">
+              <a:shade val="50000"/>
+            </a:schemeClr>
+          </a:lnRef>
+          <a:fillRef idx="1">
+            <a:schemeClr val="accent1"/>
+          </a:fillRef>
+          <a:effectRef idx="0">
+            <a:schemeClr val="accent1"/>
+          </a:effectRef>
+          <a:fontRef idx="minor">
+            <a:schemeClr val="lt1"/>
+          </a:fontRef>
+        </p:style>
+        <p:txBody>
+          <a:bodyPr rtlCol="1" anchor="ctr"/>
+          <a:lstStyle/>
+          <a:p>
+            <a:pPr algn="ctr"/>
+            <a:r>
+              <a:rPr lang="en-US" dirty="0" smtClean="0"/>
+              <a:t>+</a:t>
+            </a:r>
+            <a:endParaRPr lang="he-IL" dirty="0"/>
+          </a:p>
+        </p:txBody>
+      </p:sp>
+      <p:sp>
+        <p:nvSpPr>
+          <p:cNvPr id="3" name="חץ למטה 2"/>
+          <p:cNvSpPr/>
+          <p:nvPr/>
+        </p:nvSpPr>
+        <p:spPr>
+          <a:xfrm>
+            <a:off x="4687329" y="1135405"/>
+            <a:ext cx="156520" cy="149698"/>
+          </a:xfrm>
+          <a:prstGeom prst="downArrow">
+            <a:avLst/>
+          </a:prstGeom>
+        </p:spPr>
+        <p:style>
+          <a:lnRef idx="2">
+            <a:schemeClr val="accent1">
+              <a:shade val="50000"/>
+            </a:schemeClr>
+          </a:lnRef>
+          <a:fillRef idx="1">
+            <a:schemeClr val="accent1"/>
+          </a:fillRef>
+          <a:effectRef idx="0">
+            <a:schemeClr val="accent1"/>
+          </a:effectRef>
+          <a:fontRef idx="minor">
+            <a:schemeClr val="lt1"/>
+          </a:fontRef>
+        </p:style>
+        <p:txBody>
+          <a:bodyPr rtlCol="1" anchor="ctr"/>
+          <a:lstStyle/>
+          <a:p>
+            <a:pPr algn="ctr"/>
+            <a:endParaRPr lang="he-IL"/>
+          </a:p>
+        </p:txBody>
+      </p:sp>
+      <p:sp>
+        <p:nvSpPr>
+          <p:cNvPr id="11" name="מלבן מעוגל 10"/>
+          <p:cNvSpPr/>
+          <p:nvPr/>
+        </p:nvSpPr>
+        <p:spPr>
+          <a:xfrm>
+            <a:off x="4287794" y="1519236"/>
+            <a:ext cx="3904735" cy="4287797"/>
+          </a:xfrm>
+          <a:prstGeom prst="roundRect">
+            <a:avLst/>
+          </a:prstGeom>
+          <a:noFill/>
+        </p:spPr>
+        <p:style>
+          <a:lnRef idx="2">
+            <a:schemeClr val="accent1">
+              <a:shade val="50000"/>
+            </a:schemeClr>
+          </a:lnRef>
+          <a:fillRef idx="1">
+            <a:schemeClr val="accent1"/>
+          </a:fillRef>
+          <a:effectRef idx="0">
+            <a:schemeClr val="accent1"/>
+          </a:effectRef>
+          <a:fontRef idx="minor">
+            <a:schemeClr val="lt1"/>
+          </a:fontRef>
+        </p:style>
+        <p:txBody>
           <a:bodyPr rtlCol="1" anchor="t"/>
           <a:lstStyle/>
           <a:p>
-            <a:pPr algn="l" rtl="0"/>
-            <a:r>
-              <a:rPr lang="en-US" sz="4000" dirty="0" smtClean="0"/>
-              <a:t>			    Id		      date	</a:t>
-            </a:r>
-            <a:r>
-              <a:rPr lang="en-US" sz="4000" dirty="0" smtClean="0"/>
-              <a:t>		</a:t>
-            </a:r>
-            <a:endParaRPr lang="he-IL" sz="4000" dirty="0"/>
+            <a:pPr algn="ctr"/>
+            <a:r>
+              <a:rPr lang="he-IL" dirty="0" smtClean="0">
+                <a:solidFill>
+                  <a:srgbClr val="FF0000"/>
+                </a:solidFill>
+              </a:rPr>
+              <a:t>כל התרגילים</a:t>
+            </a:r>
+            <a:endParaRPr lang="he-IL" dirty="0" smtClean="0"/>
           </a:p>
         </p:txBody>
       </p:sp>
     </p:spTree>
     <p:extLst>
       <p:ext uri="{BB962C8B-B14F-4D97-AF65-F5344CB8AC3E}">
-        <p14:creationId xmlns:p14="http://schemas.microsoft.com/office/powerpoint/2010/main" val="763200124"/>
+        <p14:creationId xmlns:p14="http://schemas.microsoft.com/office/powerpoint/2010/main" val="643279091"/>
       </p:ext>
     </p:extLst>
   </p:cSld>

</xml_diff>

<commit_message>
Exercise and ExerciseAbstract  - added classes  - working with pairing to workout!
Signed-off-by: Tamir Mishali <Tamirmishali@gmail.com>
</commit_message>
<xml_diff>
--- a/ClassArrangments.pptx
+++ b/ClassArrangments.pptx
@@ -8,16 +8,19 @@
     <p:sldId id="256" r:id="rId2"/>
     <p:sldId id="257" r:id="rId3"/>
     <p:sldId id="258" r:id="rId4"/>
-    <p:sldId id="259" r:id="rId5"/>
-    <p:sldId id="260" r:id="rId6"/>
-    <p:sldId id="268" r:id="rId7"/>
-    <p:sldId id="261" r:id="rId8"/>
-    <p:sldId id="262" r:id="rId9"/>
-    <p:sldId id="267" r:id="rId10"/>
-    <p:sldId id="266" r:id="rId11"/>
-    <p:sldId id="263" r:id="rId12"/>
-    <p:sldId id="264" r:id="rId13"/>
-    <p:sldId id="265" r:id="rId14"/>
+    <p:sldId id="271" r:id="rId5"/>
+    <p:sldId id="259" r:id="rId6"/>
+    <p:sldId id="260" r:id="rId7"/>
+    <p:sldId id="268" r:id="rId8"/>
+    <p:sldId id="261" r:id="rId9"/>
+    <p:sldId id="262" r:id="rId10"/>
+    <p:sldId id="267" r:id="rId11"/>
+    <p:sldId id="266" r:id="rId12"/>
+    <p:sldId id="263" r:id="rId13"/>
+    <p:sldId id="264" r:id="rId14"/>
+    <p:sldId id="265" r:id="rId15"/>
+    <p:sldId id="269" r:id="rId16"/>
+    <p:sldId id="270" r:id="rId17"/>
   </p:sldIdLst>
   <p:sldSz cx="12192000" cy="6858000"/>
   <p:notesSz cx="6858000" cy="9144000"/>
@@ -255,7 +258,7 @@
           <a:p>
             <a:fld id="{244BBE53-A23C-433C-8B4F-282DFA43F4D8}" type="datetimeFigureOut">
               <a:rPr lang="he-IL" smtClean="0"/>
-              <a:t>כ"ד/אדר א/תשע"ט</a:t>
+              <a:t>א'/אדר ב/תשע"ט</a:t>
             </a:fld>
             <a:endParaRPr lang="he-IL"/>
           </a:p>
@@ -425,7 +428,7 @@
           <a:p>
             <a:fld id="{244BBE53-A23C-433C-8B4F-282DFA43F4D8}" type="datetimeFigureOut">
               <a:rPr lang="he-IL" smtClean="0"/>
-              <a:t>כ"ד/אדר א/תשע"ט</a:t>
+              <a:t>א'/אדר ב/תשע"ט</a:t>
             </a:fld>
             <a:endParaRPr lang="he-IL"/>
           </a:p>
@@ -605,7 +608,7 @@
           <a:p>
             <a:fld id="{244BBE53-A23C-433C-8B4F-282DFA43F4D8}" type="datetimeFigureOut">
               <a:rPr lang="he-IL" smtClean="0"/>
-              <a:t>כ"ד/אדר א/תשע"ט</a:t>
+              <a:t>א'/אדר ב/תשע"ט</a:t>
             </a:fld>
             <a:endParaRPr lang="he-IL"/>
           </a:p>
@@ -775,7 +778,7 @@
           <a:p>
             <a:fld id="{244BBE53-A23C-433C-8B4F-282DFA43F4D8}" type="datetimeFigureOut">
               <a:rPr lang="he-IL" smtClean="0"/>
-              <a:t>כ"ד/אדר א/תשע"ט</a:t>
+              <a:t>א'/אדר ב/תשע"ט</a:t>
             </a:fld>
             <a:endParaRPr lang="he-IL"/>
           </a:p>
@@ -1021,7 +1024,7 @@
           <a:p>
             <a:fld id="{244BBE53-A23C-433C-8B4F-282DFA43F4D8}" type="datetimeFigureOut">
               <a:rPr lang="he-IL" smtClean="0"/>
-              <a:t>כ"ד/אדר א/תשע"ט</a:t>
+              <a:t>א'/אדר ב/תשע"ט</a:t>
             </a:fld>
             <a:endParaRPr lang="he-IL"/>
           </a:p>
@@ -1253,7 +1256,7 @@
           <a:p>
             <a:fld id="{244BBE53-A23C-433C-8B4F-282DFA43F4D8}" type="datetimeFigureOut">
               <a:rPr lang="he-IL" smtClean="0"/>
-              <a:t>כ"ד/אדר א/תשע"ט</a:t>
+              <a:t>א'/אדר ב/תשע"ט</a:t>
             </a:fld>
             <a:endParaRPr lang="he-IL"/>
           </a:p>
@@ -1620,7 +1623,7 @@
           <a:p>
             <a:fld id="{244BBE53-A23C-433C-8B4F-282DFA43F4D8}" type="datetimeFigureOut">
               <a:rPr lang="he-IL" smtClean="0"/>
-              <a:t>כ"ד/אדר א/תשע"ט</a:t>
+              <a:t>א'/אדר ב/תשע"ט</a:t>
             </a:fld>
             <a:endParaRPr lang="he-IL"/>
           </a:p>
@@ -1738,7 +1741,7 @@
           <a:p>
             <a:fld id="{244BBE53-A23C-433C-8B4F-282DFA43F4D8}" type="datetimeFigureOut">
               <a:rPr lang="he-IL" smtClean="0"/>
-              <a:t>כ"ד/אדר א/תשע"ט</a:t>
+              <a:t>א'/אדר ב/תשע"ט</a:t>
             </a:fld>
             <a:endParaRPr lang="he-IL"/>
           </a:p>
@@ -1833,7 +1836,7 @@
           <a:p>
             <a:fld id="{244BBE53-A23C-433C-8B4F-282DFA43F4D8}" type="datetimeFigureOut">
               <a:rPr lang="he-IL" smtClean="0"/>
-              <a:t>כ"ד/אדר א/תשע"ט</a:t>
+              <a:t>א'/אדר ב/תשע"ט</a:t>
             </a:fld>
             <a:endParaRPr lang="he-IL"/>
           </a:p>
@@ -2110,7 +2113,7 @@
           <a:p>
             <a:fld id="{244BBE53-A23C-433C-8B4F-282DFA43F4D8}" type="datetimeFigureOut">
               <a:rPr lang="he-IL" smtClean="0"/>
-              <a:t>כ"ד/אדר א/תשע"ט</a:t>
+              <a:t>א'/אדר ב/תשע"ט</a:t>
             </a:fld>
             <a:endParaRPr lang="he-IL"/>
           </a:p>
@@ -2363,7 +2366,7 @@
           <a:p>
             <a:fld id="{244BBE53-A23C-433C-8B4F-282DFA43F4D8}" type="datetimeFigureOut">
               <a:rPr lang="he-IL" smtClean="0"/>
-              <a:t>כ"ד/אדר א/תשע"ט</a:t>
+              <a:t>א'/אדר ב/תשע"ט</a:t>
             </a:fld>
             <a:endParaRPr lang="he-IL"/>
           </a:p>
@@ -2576,7 +2579,7 @@
           <a:p>
             <a:fld id="{244BBE53-A23C-433C-8B4F-282DFA43F4D8}" type="datetimeFigureOut">
               <a:rPr lang="he-IL" smtClean="0"/>
-              <a:t>כ"ד/אדר א/תשע"ט</a:t>
+              <a:t>א'/אדר ב/תשע"ט</a:t>
             </a:fld>
             <a:endParaRPr lang="he-IL"/>
           </a:p>
@@ -3003,8 +3006,8 @@
           <a:p>
             <a:pPr rtl="0"/>
             <a:r>
-              <a:rPr lang="en-US" dirty="0" smtClean="0"/>
-              <a:t>Routine</a:t>
+              <a:rPr lang="en-US" dirty="0" err="1" smtClean="0"/>
+              <a:t>RoutineClass</a:t>
             </a:r>
             <a:endParaRPr lang="he-IL" dirty="0"/>
           </a:p>
@@ -3048,7 +3051,23 @@
             <a:pPr algn="l" rtl="0"/>
             <a:r>
               <a:rPr lang="en-US" sz="4000" dirty="0" smtClean="0"/>
-              <a:t>Date			</a:t>
+              <a:t>Id				</a:t>
+            </a:r>
+            <a:r>
+              <a:rPr lang="en-US" sz="4000" dirty="0" err="1" smtClean="0"/>
+              <a:t>int</a:t>
+            </a:r>
+            <a:endParaRPr lang="en-US" sz="4000" dirty="0" smtClean="0"/>
+          </a:p>
+          <a:p>
+            <a:pPr algn="l" rtl="0"/>
+            <a:r>
+              <a:rPr lang="en-US" sz="4000" dirty="0" smtClean="0"/>
+              <a:t>Date</a:t>
+            </a:r>
+            <a:r>
+              <a:rPr lang="en-US" sz="4000" dirty="0" smtClean="0"/>
+              <a:t>			</a:t>
             </a:r>
             <a:r>
               <a:rPr lang="en-US" sz="4000" dirty="0" err="1"/>
@@ -3064,17 +3083,8 @@
             <a:pPr algn="l" rtl="0"/>
             <a:r>
               <a:rPr lang="en-US" sz="4000" dirty="0" smtClean="0"/>
-              <a:t>List&lt;Workout&gt; </a:t>
-            </a:r>
-            <a:r>
-              <a:rPr lang="en-US" sz="4000" smtClean="0"/>
-              <a:t>	</a:t>
-            </a:r>
-            <a:r>
-              <a:rPr lang="en-US" sz="4000" smtClean="0"/>
-              <a:t>workouts</a:t>
-            </a:r>
-            <a:endParaRPr lang="en-US" sz="4000" dirty="0" smtClean="0"/>
+              <a:t>List&lt;Workout&gt; 	workouts</a:t>
+            </a:r>
           </a:p>
         </p:txBody>
       </p:sp>
@@ -3127,8 +3137,8 @@
         </p:nvSpPr>
         <p:spPr>
           <a:xfrm>
-            <a:off x="4347003" y="0"/>
-            <a:ext cx="3695700" cy="849141"/>
+            <a:off x="3912973" y="0"/>
+            <a:ext cx="4654378" cy="849141"/>
           </a:xfrm>
         </p:spPr>
         <p:txBody>
@@ -3140,7 +3150,7 @@
             <a:pPr rtl="0"/>
             <a:r>
               <a:rPr lang="en-US" dirty="0" err="1" smtClean="0"/>
-              <a:t>NewExercise</a:t>
+              <a:t>ChoseExercises</a:t>
             </a:r>
             <a:endParaRPr lang="he-IL" dirty="0"/>
           </a:p>
@@ -3154,12 +3164,15 @@
         </p:nvSpPr>
         <p:spPr>
           <a:xfrm>
-            <a:off x="4617307" y="959706"/>
-            <a:ext cx="3204519" cy="4246607"/>
+            <a:off x="4617307" y="959707"/>
+            <a:ext cx="3204519" cy="448963"/>
           </a:xfrm>
           <a:prstGeom prst="roundRect">
             <a:avLst/>
           </a:prstGeom>
+          <a:solidFill>
+            <a:schemeClr val="bg1"/>
+          </a:solidFill>
         </p:spPr>
         <p:style>
           <a:lnRef idx="2">
@@ -3178,81 +3191,80 @@
           </a:fontRef>
         </p:style>
         <p:txBody>
-          <a:bodyPr rtlCol="1" anchor="t"/>
+          <a:bodyPr rtlCol="1" anchor="ctr"/>
           <a:lstStyle/>
           <a:p>
             <a:pPr rtl="0"/>
             <a:r>
-              <a:rPr lang="he-IL" dirty="0" smtClean="0"/>
-              <a:t>שם תרגיל:</a:t>
-            </a:r>
-          </a:p>
-          <a:p>
-            <a:pPr rtl="0"/>
-            <a:r>
-              <a:rPr lang="he-IL" dirty="0" smtClean="0"/>
-              <a:t>_________________</a:t>
+              <a:rPr lang="en-US" dirty="0" err="1" smtClean="0">
+                <a:solidFill>
+                  <a:srgbClr val="FF0000"/>
+                </a:solidFill>
+              </a:rPr>
+              <a:t>comboBox</a:t>
+            </a:r>
+            <a:r>
+              <a:rPr lang="en-US" dirty="0" smtClean="0">
+                <a:solidFill>
+                  <a:srgbClr val="FF0000"/>
+                </a:solidFill>
+              </a:rPr>
+              <a:t> with </a:t>
+            </a:r>
+            <a:r>
+              <a:rPr lang="en-US" dirty="0" err="1">
+                <a:solidFill>
+                  <a:srgbClr val="FF0000"/>
+                </a:solidFill>
+              </a:rPr>
+              <a:t>m</a:t>
+            </a:r>
+            <a:r>
+              <a:rPr lang="en-US" dirty="0" err="1" smtClean="0">
+                <a:solidFill>
+                  <a:srgbClr val="FF0000"/>
+                </a:solidFill>
+              </a:rPr>
+              <a:t>ussle</a:t>
+            </a:r>
+            <a:r>
+              <a:rPr lang="en-US" dirty="0" smtClean="0">
+                <a:solidFill>
+                  <a:srgbClr val="FF0000"/>
+                </a:solidFill>
+              </a:rPr>
+              <a:t> </a:t>
+            </a:r>
+            <a:r>
+              <a:rPr lang="en-US" dirty="0" err="1" smtClean="0">
+                <a:solidFill>
+                  <a:srgbClr val="FF0000"/>
+                </a:solidFill>
+              </a:rPr>
+              <a:t>group</a:t>
+            </a:r>
+            <a:r>
+              <a:rPr lang="en-US" dirty="0" err="1" smtClean="0"/>
+              <a:t>d</a:t>
             </a:r>
             <a:endParaRPr lang="en-US" dirty="0" smtClean="0"/>
           </a:p>
-          <a:p>
-            <a:pPr rtl="0"/>
-            <a:endParaRPr lang="he-IL" dirty="0" smtClean="0"/>
-          </a:p>
-          <a:p>
-            <a:pPr rtl="0"/>
-            <a:r>
-              <a:rPr lang="he-IL" dirty="0" smtClean="0"/>
-              <a:t>שריר:</a:t>
-            </a:r>
-          </a:p>
-          <a:p>
-            <a:pPr rtl="0"/>
-            <a:r>
-              <a:rPr lang="he-IL" dirty="0" smtClean="0"/>
-              <a:t>_________________</a:t>
-            </a:r>
-          </a:p>
-          <a:p>
-            <a:pPr rtl="0"/>
-            <a:endParaRPr lang="he-IL" dirty="0" smtClean="0"/>
-          </a:p>
-          <a:p>
-            <a:pPr rtl="0"/>
-            <a:r>
-              <a:rPr lang="he-IL" dirty="0" smtClean="0"/>
-              <a:t>פירוט:</a:t>
-            </a:r>
-          </a:p>
-          <a:p>
-            <a:pPr rtl="0"/>
-            <a:r>
-              <a:rPr lang="he-IL" dirty="0" smtClean="0"/>
-              <a:t>_________________</a:t>
-            </a:r>
-            <a:endParaRPr lang="en-US" dirty="0" smtClean="0"/>
-          </a:p>
-        </p:txBody>
-      </p:sp>
-      <p:sp>
-        <p:nvSpPr>
-          <p:cNvPr id="4" name="מלבן 3"/>
+        </p:txBody>
+      </p:sp>
+      <p:sp>
+        <p:nvSpPr>
+          <p:cNvPr id="10" name="מלבן מעוגל 9"/>
           <p:cNvSpPr/>
           <p:nvPr/>
         </p:nvSpPr>
         <p:spPr>
           <a:xfrm>
-            <a:off x="4876800" y="4427833"/>
-            <a:ext cx="934994" cy="589010"/>
-          </a:xfrm>
-          <a:prstGeom prst="rect">
+            <a:off x="4617307" y="2145955"/>
+            <a:ext cx="3204519" cy="1099751"/>
+          </a:xfrm>
+          <a:prstGeom prst="roundRect">
             <a:avLst/>
           </a:prstGeom>
-          <a:ln>
-            <a:solidFill>
-              <a:schemeClr val="tx1"/>
-            </a:solidFill>
-          </a:ln>
         </p:spPr>
         <p:style>
           <a:lnRef idx="2">
@@ -3274,26 +3286,264 @@
           <a:bodyPr rtlCol="1" anchor="ctr"/>
           <a:lstStyle/>
           <a:p>
+            <a:r>
+              <a:rPr lang="he-IL" dirty="0" smtClean="0"/>
+              <a:t>חתיכה במכונה</a:t>
+            </a:r>
+          </a:p>
+          <a:p>
+            <a:r>
+              <a:rPr lang="he-IL" dirty="0" smtClean="0"/>
+              <a:t>גב</a:t>
+            </a:r>
+            <a:endParaRPr lang="en-US" dirty="0"/>
+          </a:p>
+        </p:txBody>
+      </p:sp>
+      <p:sp>
+        <p:nvSpPr>
+          <p:cNvPr id="12" name="מלבן מעוגל 11"/>
+          <p:cNvSpPr/>
+          <p:nvPr/>
+        </p:nvSpPr>
+        <p:spPr>
+          <a:xfrm>
+            <a:off x="4617307" y="3455770"/>
+            <a:ext cx="3204519" cy="976184"/>
+          </a:xfrm>
+          <a:prstGeom prst="roundRect">
+            <a:avLst/>
+          </a:prstGeom>
+        </p:spPr>
+        <p:style>
+          <a:lnRef idx="2">
+            <a:schemeClr val="accent1">
+              <a:shade val="50000"/>
+            </a:schemeClr>
+          </a:lnRef>
+          <a:fillRef idx="1">
+            <a:schemeClr val="accent1"/>
+          </a:fillRef>
+          <a:effectRef idx="0">
+            <a:schemeClr val="accent1"/>
+          </a:effectRef>
+          <a:fontRef idx="minor">
+            <a:schemeClr val="lt1"/>
+          </a:fontRef>
+        </p:style>
+        <p:txBody>
+          <a:bodyPr rtlCol="1" anchor="ctr"/>
+          <a:lstStyle/>
+          <a:p>
+            <a:pPr algn="r"/>
+            <a:r>
+              <a:rPr lang="he-IL" dirty="0" err="1" smtClean="0"/>
+              <a:t>דדליפט</a:t>
+            </a:r>
+            <a:endParaRPr lang="he-IL" dirty="0" smtClean="0"/>
+          </a:p>
+          <a:p>
+            <a:pPr algn="r"/>
+            <a:r>
+              <a:rPr lang="he-IL" dirty="0" smtClean="0"/>
+              <a:t>גב</a:t>
+            </a:r>
+            <a:endParaRPr lang="en-US" dirty="0" smtClean="0"/>
+          </a:p>
+        </p:txBody>
+      </p:sp>
+      <p:sp>
+        <p:nvSpPr>
+          <p:cNvPr id="6" name="מלבן מעוגל 5"/>
+          <p:cNvSpPr/>
+          <p:nvPr/>
+        </p:nvSpPr>
+        <p:spPr>
+          <a:xfrm>
+            <a:off x="4617307" y="4642018"/>
+            <a:ext cx="3204519" cy="976184"/>
+          </a:xfrm>
+          <a:prstGeom prst="roundRect">
+            <a:avLst/>
+          </a:prstGeom>
+        </p:spPr>
+        <p:style>
+          <a:lnRef idx="2">
+            <a:schemeClr val="accent1">
+              <a:shade val="50000"/>
+            </a:schemeClr>
+          </a:lnRef>
+          <a:fillRef idx="1">
+            <a:schemeClr val="accent1"/>
+          </a:fillRef>
+          <a:effectRef idx="0">
+            <a:schemeClr val="accent1"/>
+          </a:effectRef>
+          <a:fontRef idx="minor">
+            <a:schemeClr val="lt1"/>
+          </a:fontRef>
+        </p:style>
+        <p:txBody>
+          <a:bodyPr rtlCol="1" anchor="ctr"/>
+          <a:lstStyle/>
+          <a:p>
+            <a:pPr algn="r"/>
+            <a:r>
+              <a:rPr lang="he-IL" dirty="0" err="1" smtClean="0"/>
+              <a:t>מיליטרי</a:t>
+            </a:r>
+            <a:r>
+              <a:rPr lang="he-IL" dirty="0" smtClean="0"/>
+              <a:t> פרס</a:t>
+            </a:r>
+          </a:p>
+          <a:p>
+            <a:pPr algn="r"/>
+            <a:r>
+              <a:rPr lang="he-IL" dirty="0" smtClean="0"/>
+              <a:t>כתפיים</a:t>
+            </a:r>
+            <a:endParaRPr lang="en-US" dirty="0" smtClean="0"/>
+          </a:p>
+        </p:txBody>
+      </p:sp>
+      <p:sp>
+        <p:nvSpPr>
+          <p:cNvPr id="4" name="מלבן 3"/>
+          <p:cNvSpPr/>
+          <p:nvPr/>
+        </p:nvSpPr>
+        <p:spPr>
+          <a:xfrm>
+            <a:off x="7356388" y="6254901"/>
+            <a:ext cx="465438" cy="357702"/>
+          </a:xfrm>
+          <a:prstGeom prst="rect">
+            <a:avLst/>
+          </a:prstGeom>
+        </p:spPr>
+        <p:style>
+          <a:lnRef idx="2">
+            <a:schemeClr val="accent1">
+              <a:shade val="50000"/>
+            </a:schemeClr>
+          </a:lnRef>
+          <a:fillRef idx="1">
+            <a:schemeClr val="accent1"/>
+          </a:fillRef>
+          <a:effectRef idx="0">
+            <a:schemeClr val="accent1"/>
+          </a:effectRef>
+          <a:fontRef idx="minor">
+            <a:schemeClr val="lt1"/>
+          </a:fontRef>
+        </p:style>
+        <p:txBody>
+          <a:bodyPr rtlCol="1" anchor="ctr"/>
+          <a:lstStyle/>
+          <a:p>
             <a:pPr algn="ctr"/>
             <a:r>
               <a:rPr lang="en-US" dirty="0" smtClean="0"/>
-              <a:t>Save</a:t>
-            </a:r>
-          </a:p>
+              <a:t>+</a:t>
+            </a:r>
+            <a:endParaRPr lang="he-IL" dirty="0"/>
+          </a:p>
+        </p:txBody>
+      </p:sp>
+      <p:sp>
+        <p:nvSpPr>
+          <p:cNvPr id="3" name="חץ למטה 2"/>
+          <p:cNvSpPr/>
+          <p:nvPr/>
+        </p:nvSpPr>
+        <p:spPr>
+          <a:xfrm>
+            <a:off x="4687329" y="1135405"/>
+            <a:ext cx="156520" cy="149698"/>
+          </a:xfrm>
+          <a:prstGeom prst="downArrow">
+            <a:avLst/>
+          </a:prstGeom>
+        </p:spPr>
+        <p:style>
+          <a:lnRef idx="2">
+            <a:schemeClr val="accent1">
+              <a:shade val="50000"/>
+            </a:schemeClr>
+          </a:lnRef>
+          <a:fillRef idx="1">
+            <a:schemeClr val="accent1"/>
+          </a:fillRef>
+          <a:effectRef idx="0">
+            <a:schemeClr val="accent1"/>
+          </a:effectRef>
+          <a:fontRef idx="minor">
+            <a:schemeClr val="lt1"/>
+          </a:fontRef>
+        </p:style>
+        <p:txBody>
+          <a:bodyPr rtlCol="1" anchor="ctr"/>
+          <a:lstStyle/>
           <a:p>
             <a:pPr algn="ctr"/>
-            <a:r>
-              <a:rPr lang="en-US" dirty="0" smtClean="0"/>
-              <a:t>button</a:t>
-            </a:r>
-            <a:endParaRPr lang="he-IL" dirty="0"/>
+            <a:endParaRPr lang="he-IL"/>
+          </a:p>
+        </p:txBody>
+      </p:sp>
+      <p:sp>
+        <p:nvSpPr>
+          <p:cNvPr id="11" name="מלבן מעוגל 10"/>
+          <p:cNvSpPr/>
+          <p:nvPr/>
+        </p:nvSpPr>
+        <p:spPr>
+          <a:xfrm>
+            <a:off x="4287794" y="1519236"/>
+            <a:ext cx="3904735" cy="4287797"/>
+          </a:xfrm>
+          <a:prstGeom prst="roundRect">
+            <a:avLst/>
+          </a:prstGeom>
+          <a:noFill/>
+        </p:spPr>
+        <p:style>
+          <a:lnRef idx="2">
+            <a:schemeClr val="accent1">
+              <a:shade val="50000"/>
+            </a:schemeClr>
+          </a:lnRef>
+          <a:fillRef idx="1">
+            <a:schemeClr val="accent1"/>
+          </a:fillRef>
+          <a:effectRef idx="0">
+            <a:schemeClr val="accent1"/>
+          </a:effectRef>
+          <a:fontRef idx="minor">
+            <a:schemeClr val="lt1"/>
+          </a:fontRef>
+        </p:style>
+        <p:txBody>
+          <a:bodyPr rtlCol="1" anchor="t"/>
+          <a:lstStyle/>
+          <a:p>
+            <a:pPr algn="ctr"/>
+            <a:r>
+              <a:rPr lang="he-IL" dirty="0" smtClean="0">
+                <a:solidFill>
+                  <a:srgbClr val="FF0000"/>
+                </a:solidFill>
+              </a:rPr>
+              <a:t>כל התרגילים</a:t>
+            </a:r>
+            <a:endParaRPr lang="he-IL" dirty="0" smtClean="0"/>
           </a:p>
         </p:txBody>
       </p:sp>
     </p:spTree>
     <p:extLst>
       <p:ext uri="{BB962C8B-B14F-4D97-AF65-F5344CB8AC3E}">
-        <p14:creationId xmlns:p14="http://schemas.microsoft.com/office/powerpoint/2010/main" val="2641639846"/>
+        <p14:creationId xmlns:p14="http://schemas.microsoft.com/office/powerpoint/2010/main" val="643279091"/>
       </p:ext>
     </p:extLst>
   </p:cSld>
@@ -3339,7 +3589,7 @@
         </p:nvSpPr>
         <p:spPr>
           <a:xfrm>
-            <a:off x="4384074" y="295918"/>
+            <a:off x="4347003" y="0"/>
             <a:ext cx="3695700" cy="849141"/>
           </a:xfrm>
         </p:spPr>
@@ -3351,8 +3601,8 @@
           <a:p>
             <a:pPr rtl="0"/>
             <a:r>
-              <a:rPr lang="en-US" dirty="0" smtClean="0"/>
-              <a:t>Database</a:t>
+              <a:rPr lang="en-US" dirty="0" err="1" smtClean="0"/>
+              <a:t>NewExercise</a:t>
             </a:r>
             <a:endParaRPr lang="he-IL" dirty="0"/>
           </a:p>
@@ -3360,16 +3610,16 @@
       </p:sp>
       <p:sp>
         <p:nvSpPr>
-          <p:cNvPr id="9" name="מלבן 8"/>
+          <p:cNvPr id="8" name="מלבן מעוגל 7"/>
           <p:cNvSpPr/>
           <p:nvPr/>
         </p:nvSpPr>
         <p:spPr>
           <a:xfrm>
-            <a:off x="844378" y="1425147"/>
-            <a:ext cx="4304271" cy="1276864"/>
-          </a:xfrm>
-          <a:prstGeom prst="rect">
+            <a:off x="4617307" y="959706"/>
+            <a:ext cx="3204519" cy="4246607"/>
+          </a:xfrm>
+          <a:prstGeom prst="roundRect">
             <a:avLst/>
           </a:prstGeom>
         </p:spPr>
@@ -3393,37 +3643,78 @@
           <a:bodyPr rtlCol="1" anchor="t"/>
           <a:lstStyle/>
           <a:p>
-            <a:pPr algn="ctr" rtl="0"/>
-            <a:r>
-              <a:rPr lang="en-US" sz="4000" dirty="0" err="1" smtClean="0"/>
-              <a:t>routine_table</a:t>
-            </a:r>
-            <a:endParaRPr lang="en-US" sz="4000" dirty="0" smtClean="0"/>
-          </a:p>
-          <a:p>
-            <a:pPr algn="l" rtl="0"/>
-            <a:r>
-              <a:rPr lang="en-US" sz="2400" dirty="0" smtClean="0"/>
-              <a:t>id</a:t>
-            </a:r>
-            <a:endParaRPr lang="he-IL" sz="2400" dirty="0"/>
-          </a:p>
-        </p:txBody>
-      </p:sp>
-      <p:sp>
-        <p:nvSpPr>
-          <p:cNvPr id="11" name="מלבן 10"/>
+            <a:pPr rtl="0"/>
+            <a:r>
+              <a:rPr lang="he-IL" dirty="0" smtClean="0"/>
+              <a:t>שם תרגיל:</a:t>
+            </a:r>
+          </a:p>
+          <a:p>
+            <a:pPr rtl="0"/>
+            <a:r>
+              <a:rPr lang="he-IL" dirty="0" smtClean="0"/>
+              <a:t>_________________</a:t>
+            </a:r>
+            <a:endParaRPr lang="en-US" dirty="0" smtClean="0"/>
+          </a:p>
+          <a:p>
+            <a:pPr rtl="0"/>
+            <a:endParaRPr lang="he-IL" dirty="0" smtClean="0"/>
+          </a:p>
+          <a:p>
+            <a:pPr rtl="0"/>
+            <a:r>
+              <a:rPr lang="he-IL" dirty="0" smtClean="0"/>
+              <a:t>שריר:</a:t>
+            </a:r>
+          </a:p>
+          <a:p>
+            <a:pPr rtl="0"/>
+            <a:r>
+              <a:rPr lang="he-IL" dirty="0" smtClean="0"/>
+              <a:t>_________________</a:t>
+            </a:r>
+          </a:p>
+          <a:p>
+            <a:pPr rtl="0"/>
+            <a:endParaRPr lang="he-IL" dirty="0" smtClean="0"/>
+          </a:p>
+          <a:p>
+            <a:pPr rtl="0"/>
+            <a:r>
+              <a:rPr lang="he-IL" dirty="0" smtClean="0"/>
+              <a:t>פירוט:</a:t>
+            </a:r>
+          </a:p>
+          <a:p>
+            <a:pPr rtl="0"/>
+            <a:r>
+              <a:rPr lang="he-IL" dirty="0" smtClean="0"/>
+              <a:t>_________________</a:t>
+            </a:r>
+            <a:endParaRPr lang="en-US" dirty="0" smtClean="0"/>
+          </a:p>
+        </p:txBody>
+      </p:sp>
+      <p:sp>
+        <p:nvSpPr>
+          <p:cNvPr id="4" name="מלבן 3"/>
           <p:cNvSpPr/>
           <p:nvPr/>
         </p:nvSpPr>
         <p:spPr>
           <a:xfrm>
-            <a:off x="6044513" y="1425148"/>
-            <a:ext cx="4326925" cy="1276864"/>
+            <a:off x="4876800" y="4427833"/>
+            <a:ext cx="934994" cy="589010"/>
           </a:xfrm>
           <a:prstGeom prst="rect">
             <a:avLst/>
           </a:prstGeom>
+          <a:ln>
+            <a:solidFill>
+              <a:schemeClr val="tx1"/>
+            </a:solidFill>
+          </a:ln>
         </p:spPr>
         <p:style>
           <a:lnRef idx="2">
@@ -3442,143 +3733,29 @@
           </a:fontRef>
         </p:style>
         <p:txBody>
-          <a:bodyPr rtlCol="1" anchor="t"/>
-          <a:lstStyle/>
-          <a:p>
-            <a:pPr algn="ctr" rtl="0"/>
-            <a:r>
-              <a:rPr lang="en-US" sz="4000" dirty="0" err="1" smtClean="0"/>
-              <a:t>workout_table</a:t>
-            </a:r>
-            <a:endParaRPr lang="en-US" sz="4000" dirty="0" smtClean="0"/>
-          </a:p>
-          <a:p>
-            <a:pPr algn="l" rtl="0"/>
-            <a:r>
-              <a:rPr lang="en-US" sz="2400" dirty="0" smtClean="0"/>
-              <a:t>id        </a:t>
-            </a:r>
-            <a:r>
-              <a:rPr lang="en-US" sz="2400" dirty="0" err="1" smtClean="0"/>
-              <a:t>Id_routine</a:t>
-            </a:r>
-            <a:endParaRPr lang="he-IL" sz="2000" dirty="0"/>
-          </a:p>
-        </p:txBody>
-      </p:sp>
-      <p:sp>
-        <p:nvSpPr>
-          <p:cNvPr id="13" name="מלבן 12"/>
-          <p:cNvSpPr/>
-          <p:nvPr/>
-        </p:nvSpPr>
-        <p:spPr>
-          <a:xfrm>
-            <a:off x="593124" y="1145059"/>
-            <a:ext cx="11277600" cy="4522573"/>
-          </a:xfrm>
-          <a:prstGeom prst="rect">
-            <a:avLst/>
-          </a:prstGeom>
-          <a:noFill/>
-        </p:spPr>
-        <p:style>
-          <a:lnRef idx="2">
-            <a:schemeClr val="accent1">
-              <a:shade val="50000"/>
-            </a:schemeClr>
-          </a:lnRef>
-          <a:fillRef idx="1">
-            <a:schemeClr val="accent1"/>
-          </a:fillRef>
-          <a:effectRef idx="0">
-            <a:schemeClr val="accent1"/>
-          </a:effectRef>
-          <a:fontRef idx="minor">
-            <a:schemeClr val="lt1"/>
-          </a:fontRef>
-        </p:style>
-        <p:txBody>
-          <a:bodyPr rtlCol="1" anchor="t"/>
-          <a:lstStyle/>
-          <a:p>
-            <a:pPr algn="l" rtl="0"/>
-            <a:endParaRPr lang="he-IL" sz="4000" dirty="0"/>
-          </a:p>
-        </p:txBody>
-      </p:sp>
-      <p:cxnSp>
-        <p:nvCxnSpPr>
-          <p:cNvPr id="6" name="מחבר מרפקי 5"/>
-          <p:cNvCxnSpPr/>
-          <p:nvPr/>
-        </p:nvCxnSpPr>
-        <p:spPr>
-          <a:xfrm>
-            <a:off x="1079157" y="2702011"/>
-            <a:ext cx="6326659" cy="436605"/>
-          </a:xfrm>
-          <a:prstGeom prst="bentConnector3">
-            <a:avLst>
-              <a:gd name="adj1" fmla="val -391"/>
-            </a:avLst>
-          </a:prstGeom>
-          <a:ln>
-            <a:tailEnd type="triangle"/>
-          </a:ln>
-        </p:spPr>
-        <p:style>
-          <a:lnRef idx="1">
-            <a:schemeClr val="accent1"/>
-          </a:lnRef>
-          <a:fillRef idx="0">
-            <a:schemeClr val="accent1"/>
-          </a:fillRef>
-          <a:effectRef idx="0">
-            <a:schemeClr val="accent1"/>
-          </a:effectRef>
-          <a:fontRef idx="minor">
-            <a:schemeClr val="tx1"/>
-          </a:fontRef>
-        </p:style>
-      </p:cxnSp>
-      <p:cxnSp>
-        <p:nvCxnSpPr>
-          <p:cNvPr id="10" name="מחבר חץ ישר 9"/>
-          <p:cNvCxnSpPr/>
-          <p:nvPr/>
-        </p:nvCxnSpPr>
-        <p:spPr>
-          <a:xfrm flipH="1" flipV="1">
-            <a:off x="7405816" y="2702011"/>
-            <a:ext cx="8238" cy="436605"/>
-          </a:xfrm>
-          <a:prstGeom prst="straightConnector1">
-            <a:avLst/>
-          </a:prstGeom>
-          <a:ln>
-            <a:tailEnd type="triangle"/>
-          </a:ln>
-        </p:spPr>
-        <p:style>
-          <a:lnRef idx="1">
-            <a:schemeClr val="accent1"/>
-          </a:lnRef>
-          <a:fillRef idx="0">
-            <a:schemeClr val="accent1"/>
-          </a:fillRef>
-          <a:effectRef idx="0">
-            <a:schemeClr val="accent1"/>
-          </a:effectRef>
-          <a:fontRef idx="minor">
-            <a:schemeClr val="tx1"/>
-          </a:fontRef>
-        </p:style>
-      </p:cxnSp>
+          <a:bodyPr rtlCol="1" anchor="ctr"/>
+          <a:lstStyle/>
+          <a:p>
+            <a:pPr algn="ctr"/>
+            <a:r>
+              <a:rPr lang="en-US" dirty="0" smtClean="0"/>
+              <a:t>Save</a:t>
+            </a:r>
+          </a:p>
+          <a:p>
+            <a:pPr algn="ctr"/>
+            <a:r>
+              <a:rPr lang="en-US" dirty="0" smtClean="0"/>
+              <a:t>button</a:t>
+            </a:r>
+            <a:endParaRPr lang="he-IL" dirty="0"/>
+          </a:p>
+        </p:txBody>
+      </p:sp>
     </p:spTree>
     <p:extLst>
       <p:ext uri="{BB962C8B-B14F-4D97-AF65-F5344CB8AC3E}">
-        <p14:creationId xmlns:p14="http://schemas.microsoft.com/office/powerpoint/2010/main" val="777559622"/>
+        <p14:creationId xmlns:p14="http://schemas.microsoft.com/office/powerpoint/2010/main" val="2641639846"/>
       </p:ext>
     </p:extLst>
   </p:cSld>
@@ -3624,8 +3801,8 @@
         </p:nvSpPr>
         <p:spPr>
           <a:xfrm>
-            <a:off x="3915804" y="0"/>
-            <a:ext cx="5077083" cy="849141"/>
+            <a:off x="4384074" y="295918"/>
+            <a:ext cx="3695700" cy="849141"/>
           </a:xfrm>
         </p:spPr>
         <p:txBody>
@@ -3636,8 +3813,8 @@
           <a:p>
             <a:pPr rtl="0"/>
             <a:r>
-              <a:rPr lang="en-US" dirty="0" err="1" smtClean="0"/>
-              <a:t>routine_table</a:t>
+              <a:rPr lang="en-US" dirty="0" smtClean="0"/>
+              <a:t>Database</a:t>
             </a:r>
             <a:endParaRPr lang="he-IL" dirty="0"/>
           </a:p>
@@ -3651,8 +3828,8 @@
         </p:nvSpPr>
         <p:spPr>
           <a:xfrm>
-            <a:off x="1820562" y="1326292"/>
-            <a:ext cx="9267568" cy="5000367"/>
+            <a:off x="844378" y="1425147"/>
+            <a:ext cx="4304271" cy="1276864"/>
           </a:xfrm>
           <a:prstGeom prst="rect">
             <a:avLst/>
@@ -3678,19 +3855,192 @@
           <a:bodyPr rtlCol="1" anchor="t"/>
           <a:lstStyle/>
           <a:p>
+            <a:pPr algn="ctr" rtl="0"/>
+            <a:r>
+              <a:rPr lang="en-US" sz="4000" dirty="0" err="1" smtClean="0"/>
+              <a:t>routine_table</a:t>
+            </a:r>
+            <a:endParaRPr lang="en-US" sz="4000" dirty="0" smtClean="0"/>
+          </a:p>
+          <a:p>
             <a:pPr algn="l" rtl="0"/>
             <a:r>
-              <a:rPr lang="en-US" sz="4000" dirty="0" smtClean="0"/>
-              <a:t>			    Id		      date			</a:t>
-            </a:r>
+              <a:rPr lang="en-US" sz="2400" dirty="0" smtClean="0"/>
+              <a:t>id</a:t>
+            </a:r>
+            <a:endParaRPr lang="he-IL" sz="2400" dirty="0"/>
+          </a:p>
+        </p:txBody>
+      </p:sp>
+      <p:sp>
+        <p:nvSpPr>
+          <p:cNvPr id="11" name="מלבן 10"/>
+          <p:cNvSpPr/>
+          <p:nvPr/>
+        </p:nvSpPr>
+        <p:spPr>
+          <a:xfrm>
+            <a:off x="6044513" y="1425148"/>
+            <a:ext cx="4326925" cy="1276864"/>
+          </a:xfrm>
+          <a:prstGeom prst="rect">
+            <a:avLst/>
+          </a:prstGeom>
+        </p:spPr>
+        <p:style>
+          <a:lnRef idx="2">
+            <a:schemeClr val="accent1">
+              <a:shade val="50000"/>
+            </a:schemeClr>
+          </a:lnRef>
+          <a:fillRef idx="1">
+            <a:schemeClr val="accent1"/>
+          </a:fillRef>
+          <a:effectRef idx="0">
+            <a:schemeClr val="accent1"/>
+          </a:effectRef>
+          <a:fontRef idx="minor">
+            <a:schemeClr val="lt1"/>
+          </a:fontRef>
+        </p:style>
+        <p:txBody>
+          <a:bodyPr rtlCol="1" anchor="t"/>
+          <a:lstStyle/>
+          <a:p>
+            <a:pPr algn="ctr" rtl="0"/>
+            <a:r>
+              <a:rPr lang="en-US" sz="4000" dirty="0" err="1" smtClean="0"/>
+              <a:t>workout_table</a:t>
+            </a:r>
+            <a:endParaRPr lang="en-US" sz="4000" dirty="0" smtClean="0"/>
+          </a:p>
+          <a:p>
+            <a:pPr algn="l" rtl="0"/>
+            <a:r>
+              <a:rPr lang="en-US" sz="2400" dirty="0" smtClean="0"/>
+              <a:t>id        </a:t>
+            </a:r>
+            <a:r>
+              <a:rPr lang="en-US" sz="2400" dirty="0" err="1" smtClean="0"/>
+              <a:t>Id_routine</a:t>
+            </a:r>
+            <a:endParaRPr lang="he-IL" sz="2000" dirty="0"/>
+          </a:p>
+        </p:txBody>
+      </p:sp>
+      <p:sp>
+        <p:nvSpPr>
+          <p:cNvPr id="13" name="מלבן 12"/>
+          <p:cNvSpPr/>
+          <p:nvPr/>
+        </p:nvSpPr>
+        <p:spPr>
+          <a:xfrm>
+            <a:off x="593124" y="1145059"/>
+            <a:ext cx="11277600" cy="4522573"/>
+          </a:xfrm>
+          <a:prstGeom prst="rect">
+            <a:avLst/>
+          </a:prstGeom>
+          <a:noFill/>
+        </p:spPr>
+        <p:style>
+          <a:lnRef idx="2">
+            <a:schemeClr val="accent1">
+              <a:shade val="50000"/>
+            </a:schemeClr>
+          </a:lnRef>
+          <a:fillRef idx="1">
+            <a:schemeClr val="accent1"/>
+          </a:fillRef>
+          <a:effectRef idx="0">
+            <a:schemeClr val="accent1"/>
+          </a:effectRef>
+          <a:fontRef idx="minor">
+            <a:schemeClr val="lt1"/>
+          </a:fontRef>
+        </p:style>
+        <p:txBody>
+          <a:bodyPr rtlCol="1" anchor="t"/>
+          <a:lstStyle/>
+          <a:p>
+            <a:pPr algn="l" rtl="0"/>
             <a:endParaRPr lang="he-IL" sz="4000" dirty="0"/>
           </a:p>
         </p:txBody>
       </p:sp>
+      <p:cxnSp>
+        <p:nvCxnSpPr>
+          <p:cNvPr id="6" name="מחבר מרפקי 5"/>
+          <p:cNvCxnSpPr/>
+          <p:nvPr/>
+        </p:nvCxnSpPr>
+        <p:spPr>
+          <a:xfrm>
+            <a:off x="1079157" y="2702011"/>
+            <a:ext cx="6326659" cy="436605"/>
+          </a:xfrm>
+          <a:prstGeom prst="bentConnector3">
+            <a:avLst>
+              <a:gd name="adj1" fmla="val -391"/>
+            </a:avLst>
+          </a:prstGeom>
+          <a:ln>
+            <a:tailEnd type="triangle"/>
+          </a:ln>
+        </p:spPr>
+        <p:style>
+          <a:lnRef idx="1">
+            <a:schemeClr val="accent1"/>
+          </a:lnRef>
+          <a:fillRef idx="0">
+            <a:schemeClr val="accent1"/>
+          </a:fillRef>
+          <a:effectRef idx="0">
+            <a:schemeClr val="accent1"/>
+          </a:effectRef>
+          <a:fontRef idx="minor">
+            <a:schemeClr val="tx1"/>
+          </a:fontRef>
+        </p:style>
+      </p:cxnSp>
+      <p:cxnSp>
+        <p:nvCxnSpPr>
+          <p:cNvPr id="10" name="מחבר חץ ישר 9"/>
+          <p:cNvCxnSpPr/>
+          <p:nvPr/>
+        </p:nvCxnSpPr>
+        <p:spPr>
+          <a:xfrm flipH="1" flipV="1">
+            <a:off x="7405816" y="2702011"/>
+            <a:ext cx="8238" cy="436605"/>
+          </a:xfrm>
+          <a:prstGeom prst="straightConnector1">
+            <a:avLst/>
+          </a:prstGeom>
+          <a:ln>
+            <a:tailEnd type="triangle"/>
+          </a:ln>
+        </p:spPr>
+        <p:style>
+          <a:lnRef idx="1">
+            <a:schemeClr val="accent1"/>
+          </a:lnRef>
+          <a:fillRef idx="0">
+            <a:schemeClr val="accent1"/>
+          </a:fillRef>
+          <a:effectRef idx="0">
+            <a:schemeClr val="accent1"/>
+          </a:effectRef>
+          <a:fontRef idx="minor">
+            <a:schemeClr val="tx1"/>
+          </a:fontRef>
+        </p:style>
+      </p:cxnSp>
     </p:spTree>
     <p:extLst>
       <p:ext uri="{BB962C8B-B14F-4D97-AF65-F5344CB8AC3E}">
-        <p14:creationId xmlns:p14="http://schemas.microsoft.com/office/powerpoint/2010/main" val="763200124"/>
+        <p14:creationId xmlns:p14="http://schemas.microsoft.com/office/powerpoint/2010/main" val="777559622"/>
       </p:ext>
     </p:extLst>
   </p:cSld>
@@ -3736,8 +4086,8 @@
         </p:nvSpPr>
         <p:spPr>
           <a:xfrm>
-            <a:off x="3899329" y="57665"/>
-            <a:ext cx="5110033" cy="849141"/>
+            <a:off x="3915804" y="0"/>
+            <a:ext cx="5077083" cy="849141"/>
           </a:xfrm>
         </p:spPr>
         <p:txBody>
@@ -3748,12 +4098,8 @@
           <a:p>
             <a:pPr rtl="0"/>
             <a:r>
-              <a:rPr lang="en-US" dirty="0" err="1"/>
-              <a:t>w</a:t>
-            </a:r>
-            <a:r>
               <a:rPr lang="en-US" dirty="0" err="1" smtClean="0"/>
-              <a:t>orkout_history</a:t>
+              <a:t>routine_table</a:t>
             </a:r>
             <a:endParaRPr lang="he-IL" dirty="0"/>
           </a:p>
@@ -3797,15 +4143,147 @@
             <a:pPr algn="l" rtl="0"/>
             <a:r>
               <a:rPr lang="en-US" sz="4000" dirty="0" smtClean="0"/>
+              <a:t>		    Id		</a:t>
+            </a:r>
+            <a:r>
+              <a:rPr lang="en-US" sz="4000" dirty="0" smtClean="0"/>
+              <a:t>name	date</a:t>
+            </a:r>
+            <a:r>
+              <a:rPr lang="en-US" sz="4000" dirty="0" smtClean="0"/>
+              <a:t>			</a:t>
+            </a:r>
+            <a:endParaRPr lang="he-IL" sz="4000" dirty="0"/>
+          </a:p>
+        </p:txBody>
+      </p:sp>
+    </p:spTree>
+    <p:extLst>
+      <p:ext uri="{BB962C8B-B14F-4D97-AF65-F5344CB8AC3E}">
+        <p14:creationId xmlns:p14="http://schemas.microsoft.com/office/powerpoint/2010/main" val="763200124"/>
+      </p:ext>
+    </p:extLst>
+  </p:cSld>
+  <p:clrMapOvr>
+    <a:masterClrMapping/>
+  </p:clrMapOvr>
+  <p:timing>
+    <p:tnLst>
+      <p:par>
+        <p:cTn id="1" dur="indefinite" restart="never" nodeType="tmRoot"/>
+      </p:par>
+    </p:tnLst>
+  </p:timing>
+</p:sld>
+</file>
+
+<file path=ppt/slides/slide14.xml><?xml version="1.0" encoding="utf-8"?>
+<p:sld xmlns:a="http://schemas.openxmlformats.org/drawingml/2006/main" xmlns:r="http://schemas.openxmlformats.org/officeDocument/2006/relationships" xmlns:p="http://schemas.openxmlformats.org/presentationml/2006/main">
+  <p:cSld>
+    <p:spTree>
+      <p:nvGrpSpPr>
+        <p:cNvPr id="1" name=""/>
+        <p:cNvGrpSpPr/>
+        <p:nvPr/>
+      </p:nvGrpSpPr>
+      <p:grpSpPr>
+        <a:xfrm>
+          <a:off x="0" y="0"/>
+          <a:ext cx="0" cy="0"/>
+          <a:chOff x="0" y="0"/>
+          <a:chExt cx="0" cy="0"/>
+        </a:xfrm>
+      </p:grpSpPr>
+      <p:sp>
+        <p:nvSpPr>
+          <p:cNvPr id="2" name="כותרת 1"/>
+          <p:cNvSpPr>
+            <a:spLocks noGrp="1"/>
+          </p:cNvSpPr>
+          <p:nvPr>
+            <p:ph type="ctrTitle"/>
+          </p:nvPr>
+        </p:nvSpPr>
+        <p:spPr>
+          <a:xfrm>
+            <a:off x="3899329" y="57665"/>
+            <a:ext cx="5110033" cy="849141"/>
+          </a:xfrm>
+        </p:spPr>
+        <p:txBody>
+          <a:bodyPr>
+            <a:normAutofit fontScale="90000"/>
+          </a:bodyPr>
+          <a:lstStyle/>
+          <a:p>
+            <a:pPr rtl="0"/>
+            <a:r>
+              <a:rPr lang="en-US" dirty="0" err="1"/>
+              <a:t>w</a:t>
+            </a:r>
+            <a:r>
+              <a:rPr lang="en-US" dirty="0" err="1" smtClean="0"/>
+              <a:t>orkout_history</a:t>
+            </a:r>
+            <a:endParaRPr lang="he-IL" dirty="0"/>
+          </a:p>
+        </p:txBody>
+      </p:sp>
+      <p:sp>
+        <p:nvSpPr>
+          <p:cNvPr id="9" name="מלבן 8"/>
+          <p:cNvSpPr/>
+          <p:nvPr/>
+        </p:nvSpPr>
+        <p:spPr>
+          <a:xfrm>
+            <a:off x="1820562" y="1326292"/>
+            <a:ext cx="9267568" cy="5000367"/>
+          </a:xfrm>
+          <a:prstGeom prst="rect">
+            <a:avLst/>
+          </a:prstGeom>
+        </p:spPr>
+        <p:style>
+          <a:lnRef idx="2">
+            <a:schemeClr val="accent1">
+              <a:shade val="50000"/>
+            </a:schemeClr>
+          </a:lnRef>
+          <a:fillRef idx="1">
+            <a:schemeClr val="accent1"/>
+          </a:fillRef>
+          <a:effectRef idx="0">
+            <a:schemeClr val="accent1"/>
+          </a:effectRef>
+          <a:fontRef idx="minor">
+            <a:schemeClr val="lt1"/>
+          </a:fontRef>
+        </p:style>
+        <p:txBody>
+          <a:bodyPr rtlCol="1" anchor="t"/>
+          <a:lstStyle/>
+          <a:p>
+            <a:pPr algn="l" rtl="0"/>
+            <a:r>
+              <a:rPr lang="en-US" sz="4000" dirty="0" smtClean="0"/>
               <a:t>Id	</a:t>
             </a:r>
             <a:r>
               <a:rPr lang="en-US" sz="4000" dirty="0" err="1" smtClean="0"/>
-              <a:t>id_routines</a:t>
+              <a:t>id_routine</a:t>
             </a:r>
             <a:r>
               <a:rPr lang="en-US" sz="4000" dirty="0" smtClean="0"/>
-              <a:t>	type	date	workout</a:t>
+              <a:t>	</a:t>
+            </a:r>
+            <a:r>
+              <a:rPr lang="en-US" sz="4000" dirty="0" smtClean="0"/>
+              <a:t>name</a:t>
+            </a:r>
+            <a:r>
+              <a:rPr lang="en-US" sz="4000" dirty="0" smtClean="0"/>
+              <a:t>	date	workout</a:t>
             </a:r>
           </a:p>
           <a:p>
@@ -3822,6 +4300,380 @@
     <p:extLst>
       <p:ext uri="{BB962C8B-B14F-4D97-AF65-F5344CB8AC3E}">
         <p14:creationId xmlns:p14="http://schemas.microsoft.com/office/powerpoint/2010/main" val="1696149671"/>
+      </p:ext>
+    </p:extLst>
+  </p:cSld>
+  <p:clrMapOvr>
+    <a:masterClrMapping/>
+  </p:clrMapOvr>
+  <p:timing>
+    <p:tnLst>
+      <p:par>
+        <p:cTn id="1" dur="indefinite" restart="never" nodeType="tmRoot"/>
+      </p:par>
+    </p:tnLst>
+  </p:timing>
+</p:sld>
+</file>
+
+<file path=ppt/slides/slide15.xml><?xml version="1.0" encoding="utf-8"?>
+<p:sld xmlns:a="http://schemas.openxmlformats.org/drawingml/2006/main" xmlns:r="http://schemas.openxmlformats.org/officeDocument/2006/relationships" xmlns:p="http://schemas.openxmlformats.org/presentationml/2006/main">
+  <p:cSld>
+    <p:spTree>
+      <p:nvGrpSpPr>
+        <p:cNvPr id="1" name=""/>
+        <p:cNvGrpSpPr/>
+        <p:nvPr/>
+      </p:nvGrpSpPr>
+      <p:grpSpPr>
+        <a:xfrm>
+          <a:off x="0" y="0"/>
+          <a:ext cx="0" cy="0"/>
+          <a:chOff x="0" y="0"/>
+          <a:chExt cx="0" cy="0"/>
+        </a:xfrm>
+      </p:grpSpPr>
+      <p:sp>
+        <p:nvSpPr>
+          <p:cNvPr id="2" name="כותרת 1"/>
+          <p:cNvSpPr>
+            <a:spLocks noGrp="1"/>
+          </p:cNvSpPr>
+          <p:nvPr>
+            <p:ph type="ctrTitle"/>
+          </p:nvPr>
+        </p:nvSpPr>
+        <p:spPr>
+          <a:xfrm>
+            <a:off x="2487827" y="57665"/>
+            <a:ext cx="8007178" cy="849141"/>
+          </a:xfrm>
+        </p:spPr>
+        <p:txBody>
+          <a:bodyPr>
+            <a:normAutofit fontScale="90000"/>
+          </a:bodyPr>
+          <a:lstStyle/>
+          <a:p>
+            <a:pPr rtl="0"/>
+            <a:r>
+              <a:rPr lang="en-US" dirty="0" err="1" smtClean="0"/>
+              <a:t>ExerciseAbstruct_Table</a:t>
+            </a:r>
+            <a:endParaRPr lang="he-IL" dirty="0"/>
+          </a:p>
+        </p:txBody>
+      </p:sp>
+      <p:sp>
+        <p:nvSpPr>
+          <p:cNvPr id="9" name="מלבן 8"/>
+          <p:cNvSpPr/>
+          <p:nvPr/>
+        </p:nvSpPr>
+        <p:spPr>
+          <a:xfrm>
+            <a:off x="576649" y="1326292"/>
+            <a:ext cx="11458832" cy="5000367"/>
+          </a:xfrm>
+          <a:prstGeom prst="rect">
+            <a:avLst/>
+          </a:prstGeom>
+        </p:spPr>
+        <p:style>
+          <a:lnRef idx="2">
+            <a:schemeClr val="accent1">
+              <a:shade val="50000"/>
+            </a:schemeClr>
+          </a:lnRef>
+          <a:fillRef idx="1">
+            <a:schemeClr val="accent1"/>
+          </a:fillRef>
+          <a:effectRef idx="0">
+            <a:schemeClr val="accent1"/>
+          </a:effectRef>
+          <a:fontRef idx="minor">
+            <a:schemeClr val="lt1"/>
+          </a:fontRef>
+        </p:style>
+        <p:txBody>
+          <a:bodyPr rtlCol="1" anchor="t"/>
+          <a:lstStyle/>
+          <a:p>
+            <a:pPr algn="l" rtl="0"/>
+            <a:r>
+              <a:rPr lang="en-US" sz="4000" dirty="0" smtClean="0"/>
+              <a:t>Id			</a:t>
+            </a:r>
+            <a:r>
+              <a:rPr lang="en-US" sz="4000" dirty="0" err="1" smtClean="0"/>
+              <a:t>int</a:t>
+            </a:r>
+            <a:endParaRPr lang="en-US" sz="4000" dirty="0" smtClean="0"/>
+          </a:p>
+          <a:p>
+            <a:pPr algn="l" rtl="0"/>
+            <a:r>
+              <a:rPr lang="en-US" sz="4000" dirty="0" smtClean="0"/>
+              <a:t>name</a:t>
+            </a:r>
+            <a:r>
+              <a:rPr lang="en-US" sz="4000" dirty="0" smtClean="0"/>
+              <a:t>	</a:t>
+            </a:r>
+            <a:r>
+              <a:rPr lang="en-US" sz="4000" dirty="0" smtClean="0"/>
+              <a:t>	string</a:t>
+            </a:r>
+          </a:p>
+          <a:p>
+            <a:pPr algn="l" rtl="0"/>
+            <a:r>
+              <a:rPr lang="en-US" sz="4000" dirty="0" smtClean="0"/>
+              <a:t>description </a:t>
+            </a:r>
+            <a:r>
+              <a:rPr lang="en-US" sz="4000" dirty="0" smtClean="0"/>
+              <a:t>	</a:t>
+            </a:r>
+            <a:r>
+              <a:rPr lang="en-US" sz="4000" dirty="0" smtClean="0"/>
+              <a:t>string</a:t>
+            </a:r>
+            <a:endParaRPr lang="en-US" sz="4000" dirty="0" smtClean="0"/>
+          </a:p>
+          <a:p>
+            <a:pPr algn="l" rtl="0"/>
+            <a:r>
+              <a:rPr lang="en-US" sz="4000" dirty="0" err="1" smtClean="0"/>
+              <a:t>Mussle</a:t>
+            </a:r>
+            <a:r>
+              <a:rPr lang="en-US" sz="4000" dirty="0" smtClean="0"/>
+              <a:t>		string</a:t>
+            </a:r>
+          </a:p>
+          <a:p>
+            <a:pPr algn="l" rtl="0"/>
+            <a:r>
+              <a:rPr lang="en-US" sz="4000" dirty="0" smtClean="0"/>
+              <a:t>//in the future insert link to video or </a:t>
+            </a:r>
+            <a:r>
+              <a:rPr lang="en-US" sz="4000" dirty="0" err="1" smtClean="0"/>
+              <a:t>somthing</a:t>
+            </a:r>
+            <a:endParaRPr lang="en-US" sz="4000" dirty="0" smtClean="0"/>
+          </a:p>
+          <a:p>
+            <a:pPr algn="l" rtl="0"/>
+            <a:endParaRPr lang="en-US" sz="4000" dirty="0" smtClean="0"/>
+          </a:p>
+          <a:p>
+            <a:pPr algn="l" rtl="0"/>
+            <a:r>
+              <a:rPr lang="en-US" sz="4000" dirty="0" smtClean="0"/>
+              <a:t>	</a:t>
+            </a:r>
+            <a:endParaRPr lang="he-IL" sz="4000" dirty="0"/>
+          </a:p>
+        </p:txBody>
+      </p:sp>
+    </p:spTree>
+    <p:extLst>
+      <p:ext uri="{BB962C8B-B14F-4D97-AF65-F5344CB8AC3E}">
+        <p14:creationId xmlns:p14="http://schemas.microsoft.com/office/powerpoint/2010/main" val="3353105803"/>
+      </p:ext>
+    </p:extLst>
+  </p:cSld>
+  <p:clrMapOvr>
+    <a:masterClrMapping/>
+  </p:clrMapOvr>
+  <p:timing>
+    <p:tnLst>
+      <p:par>
+        <p:cTn id="1" dur="indefinite" restart="never" nodeType="tmRoot"/>
+      </p:par>
+    </p:tnLst>
+  </p:timing>
+</p:sld>
+</file>
+
+<file path=ppt/slides/slide16.xml><?xml version="1.0" encoding="utf-8"?>
+<p:sld xmlns:a="http://schemas.openxmlformats.org/drawingml/2006/main" xmlns:r="http://schemas.openxmlformats.org/officeDocument/2006/relationships" xmlns:p="http://schemas.openxmlformats.org/presentationml/2006/main">
+  <p:cSld>
+    <p:spTree>
+      <p:nvGrpSpPr>
+        <p:cNvPr id="1" name=""/>
+        <p:cNvGrpSpPr/>
+        <p:nvPr/>
+      </p:nvGrpSpPr>
+      <p:grpSpPr>
+        <a:xfrm>
+          <a:off x="0" y="0"/>
+          <a:ext cx="0" cy="0"/>
+          <a:chOff x="0" y="0"/>
+          <a:chExt cx="0" cy="0"/>
+        </a:xfrm>
+      </p:grpSpPr>
+      <p:sp>
+        <p:nvSpPr>
+          <p:cNvPr id="2" name="כותרת 1"/>
+          <p:cNvSpPr>
+            <a:spLocks noGrp="1"/>
+          </p:cNvSpPr>
+          <p:nvPr>
+            <p:ph type="ctrTitle"/>
+          </p:nvPr>
+        </p:nvSpPr>
+        <p:spPr>
+          <a:xfrm>
+            <a:off x="2479589" y="57665"/>
+            <a:ext cx="8089557" cy="849141"/>
+          </a:xfrm>
+        </p:spPr>
+        <p:txBody>
+          <a:bodyPr>
+            <a:normAutofit fontScale="90000"/>
+          </a:bodyPr>
+          <a:lstStyle/>
+          <a:p>
+            <a:pPr rtl="0"/>
+            <a:r>
+              <a:rPr lang="en-US" dirty="0" err="1" smtClean="0"/>
+              <a:t>Exercise_Table</a:t>
+            </a:r>
+            <a:endParaRPr lang="he-IL" dirty="0"/>
+          </a:p>
+        </p:txBody>
+      </p:sp>
+      <p:sp>
+        <p:nvSpPr>
+          <p:cNvPr id="9" name="מלבן 8"/>
+          <p:cNvSpPr/>
+          <p:nvPr/>
+        </p:nvSpPr>
+        <p:spPr>
+          <a:xfrm>
+            <a:off x="1820562" y="1326292"/>
+            <a:ext cx="9267568" cy="5000367"/>
+          </a:xfrm>
+          <a:prstGeom prst="rect">
+            <a:avLst/>
+          </a:prstGeom>
+        </p:spPr>
+        <p:style>
+          <a:lnRef idx="2">
+            <a:schemeClr val="accent1">
+              <a:shade val="50000"/>
+            </a:schemeClr>
+          </a:lnRef>
+          <a:fillRef idx="1">
+            <a:schemeClr val="accent1"/>
+          </a:fillRef>
+          <a:effectRef idx="0">
+            <a:schemeClr val="accent1"/>
+          </a:effectRef>
+          <a:fontRef idx="minor">
+            <a:schemeClr val="lt1"/>
+          </a:fontRef>
+        </p:style>
+        <p:txBody>
+          <a:bodyPr rtlCol="1" anchor="t"/>
+          <a:lstStyle/>
+          <a:p>
+            <a:pPr algn="l" rtl="0"/>
+            <a:r>
+              <a:rPr lang="en-US" sz="4000" dirty="0" smtClean="0"/>
+              <a:t>Id	</a:t>
+            </a:r>
+            <a:r>
+              <a:rPr lang="en-US" sz="4000" dirty="0" err="1" smtClean="0"/>
+              <a:t>id_wo</a:t>
+            </a:r>
+            <a:r>
+              <a:rPr lang="en-US" sz="4000" dirty="0"/>
+              <a:t> </a:t>
+            </a:r>
+            <a:r>
+              <a:rPr lang="en-US" sz="4000" dirty="0" smtClean="0"/>
+              <a:t> </a:t>
+            </a:r>
+            <a:r>
+              <a:rPr lang="en-US" sz="4000" dirty="0" err="1" smtClean="0"/>
+              <a:t>id_exeAbs</a:t>
+            </a:r>
+            <a:r>
+              <a:rPr lang="en-US" sz="4000" dirty="0" smtClean="0"/>
+              <a:t>  </a:t>
+            </a:r>
+            <a:r>
+              <a:rPr lang="en-US" sz="4000" dirty="0" err="1" smtClean="0"/>
+              <a:t>SetsRepsWeight</a:t>
+            </a:r>
+            <a:r>
+              <a:rPr lang="en-US" sz="4000" dirty="0" smtClean="0"/>
+              <a:t> </a:t>
+            </a:r>
+          </a:p>
+          <a:p>
+            <a:pPr algn="l" rtl="0"/>
+            <a:r>
+              <a:rPr lang="en-US" sz="4000" dirty="0"/>
+              <a:t> </a:t>
+            </a:r>
+            <a:r>
+              <a:rPr lang="en-US" sz="4000" dirty="0" smtClean="0"/>
+              <a:t>						(</a:t>
+            </a:r>
+            <a:r>
+              <a:rPr lang="en-US" sz="4000" dirty="0" err="1"/>
+              <a:t>Json</a:t>
+            </a:r>
+            <a:r>
+              <a:rPr lang="en-US" sz="4000" dirty="0"/>
+              <a:t>) </a:t>
+            </a:r>
+          </a:p>
+          <a:p>
+            <a:pPr algn="l" rtl="0"/>
+            <a:endParaRPr lang="en-US" sz="4000" dirty="0" smtClean="0"/>
+          </a:p>
+          <a:p>
+            <a:pPr algn="l" rtl="0"/>
+            <a:r>
+              <a:rPr lang="en-US" sz="4000" dirty="0" smtClean="0"/>
+              <a:t>comment</a:t>
+            </a:r>
+          </a:p>
+          <a:p>
+            <a:pPr algn="l" rtl="0"/>
+            <a:r>
+              <a:rPr lang="en-US" sz="4000" dirty="0"/>
+              <a:t> </a:t>
+            </a:r>
+            <a:r>
+              <a:rPr lang="en-US" sz="4000" dirty="0" smtClean="0"/>
+              <a:t>  string</a:t>
+            </a:r>
+            <a:endParaRPr lang="en-US" sz="4000" dirty="0"/>
+          </a:p>
+          <a:p>
+            <a:pPr algn="l" rtl="0"/>
+            <a:endParaRPr lang="en-US" sz="4000" dirty="0"/>
+          </a:p>
+          <a:p>
+            <a:pPr algn="l" rtl="0"/>
+            <a:r>
+              <a:rPr lang="en-US" sz="4000" dirty="0"/>
+              <a:t>	</a:t>
+            </a:r>
+          </a:p>
+        </p:txBody>
+      </p:sp>
+    </p:spTree>
+    <p:extLst>
+      <p:ext uri="{BB962C8B-B14F-4D97-AF65-F5344CB8AC3E}">
+        <p14:creationId xmlns:p14="http://schemas.microsoft.com/office/powerpoint/2010/main" val="1735018047"/>
       </p:ext>
     </p:extLst>
   </p:cSld>
@@ -3877,8 +4729,8 @@
           <a:p>
             <a:pPr rtl="0"/>
             <a:r>
-              <a:rPr lang="en-US" dirty="0" smtClean="0"/>
-              <a:t>Workout</a:t>
+              <a:rPr lang="en-US" dirty="0" err="1" smtClean="0"/>
+              <a:t>WorkoutClass</a:t>
             </a:r>
             <a:endParaRPr lang="he-IL" dirty="0"/>
           </a:p>
@@ -3921,8 +4773,44 @@
           <a:p>
             <a:pPr algn="l" rtl="0"/>
             <a:r>
+              <a:rPr lang="en-US" sz="4000" dirty="0" err="1" smtClean="0"/>
+              <a:t>Id_workout</a:t>
+            </a:r>
+            <a:r>
               <a:rPr lang="en-US" sz="4000" dirty="0" smtClean="0"/>
-              <a:t>String				name=</a:t>
+              <a:t>			</a:t>
+            </a:r>
+            <a:r>
+              <a:rPr lang="en-US" sz="4000" dirty="0" err="1" smtClean="0"/>
+              <a:t>int</a:t>
+            </a:r>
+            <a:endParaRPr lang="en-US" sz="4000" dirty="0" smtClean="0"/>
+          </a:p>
+          <a:p>
+            <a:pPr algn="l" rtl="0"/>
+            <a:r>
+              <a:rPr lang="en-US" sz="4000" dirty="0" err="1" smtClean="0"/>
+              <a:t>Id_routine</a:t>
+            </a:r>
+            <a:r>
+              <a:rPr lang="en-US" sz="4000" dirty="0" smtClean="0"/>
+              <a:t>			</a:t>
+            </a:r>
+            <a:r>
+              <a:rPr lang="en-US" sz="4000" dirty="0" err="1" smtClean="0"/>
+              <a:t>int</a:t>
+            </a:r>
+            <a:endParaRPr lang="en-US" sz="4000" dirty="0"/>
+          </a:p>
+          <a:p>
+            <a:pPr algn="l" rtl="0"/>
+            <a:r>
+              <a:rPr lang="en-US" sz="4000" dirty="0" smtClean="0"/>
+              <a:t>String</a:t>
+            </a:r>
+            <a:r>
+              <a:rPr lang="en-US" sz="4000" dirty="0" smtClean="0"/>
+              <a:t>				name=</a:t>
             </a:r>
             <a:r>
               <a:rPr lang="en-US" sz="4000" dirty="0" err="1" smtClean="0"/>
@@ -3935,17 +4823,6 @@
             <a:r>
               <a:rPr lang="en-US" sz="4000" dirty="0" smtClean="0"/>
               <a:t>Date				date</a:t>
-            </a:r>
-          </a:p>
-          <a:p>
-            <a:pPr algn="l" rtl="0"/>
-            <a:r>
-              <a:rPr lang="en-US" sz="4000" dirty="0" err="1" smtClean="0"/>
-              <a:t>Arraylist</a:t>
-            </a:r>
-            <a:r>
-              <a:rPr lang="en-US" sz="4000" dirty="0" smtClean="0"/>
-              <a:t>&lt;Exercise&gt; 	exercises</a:t>
             </a:r>
           </a:p>
           <a:p>
@@ -4017,8 +4894,8 @@
           <a:p>
             <a:pPr rtl="0"/>
             <a:r>
-              <a:rPr lang="en-US" dirty="0" smtClean="0"/>
-              <a:t>Exercise</a:t>
+              <a:rPr lang="en-US" dirty="0" err="1" smtClean="0"/>
+              <a:t>ExerciseClass</a:t>
             </a:r>
             <a:endParaRPr lang="he-IL" dirty="0"/>
           </a:p>
@@ -4032,7 +4909,7 @@
         </p:nvSpPr>
         <p:spPr>
           <a:xfrm>
-            <a:off x="1820562" y="849142"/>
+            <a:off x="1812324" y="849142"/>
             <a:ext cx="9267568" cy="5477518"/>
           </a:xfrm>
           <a:prstGeom prst="rect">
@@ -4066,102 +4943,98 @@
             <a:pPr algn="l" rtl="0"/>
             <a:r>
               <a:rPr lang="en-US" sz="4000" dirty="0" smtClean="0"/>
-              <a:t>String					name</a:t>
-            </a:r>
+              <a:t>Id						</a:t>
+            </a:r>
+            <a:r>
+              <a:rPr lang="en-US" sz="4000" dirty="0" err="1" smtClean="0"/>
+              <a:t>int</a:t>
+            </a:r>
+            <a:endParaRPr lang="en-US" sz="4000" dirty="0" smtClean="0"/>
           </a:p>
           <a:p>
             <a:pPr algn="l" rtl="0"/>
             <a:r>
+              <a:rPr lang="en-US" sz="4000" dirty="0" err="1" smtClean="0"/>
+              <a:t>Id_exerciseabs</a:t>
+            </a:r>
+            <a:r>
               <a:rPr lang="en-US" sz="4000" dirty="0" smtClean="0"/>
-              <a:t>String					description</a:t>
-            </a:r>
+              <a:t>			</a:t>
+            </a:r>
+            <a:r>
+              <a:rPr lang="en-US" sz="4000" dirty="0" err="1" smtClean="0"/>
+              <a:t>int</a:t>
+            </a:r>
+            <a:endParaRPr lang="en-US" sz="4000" dirty="0" smtClean="0"/>
           </a:p>
           <a:p>
             <a:pPr algn="l" rtl="0"/>
             <a:r>
+              <a:rPr lang="en-US" sz="4000" dirty="0" err="1" smtClean="0"/>
+              <a:t>Id_workout</a:t>
+            </a:r>
+            <a:r>
               <a:rPr lang="en-US" sz="4000" dirty="0" smtClean="0"/>
-              <a:t>String					comment</a:t>
-            </a:r>
+              <a:t>				</a:t>
+            </a:r>
+            <a:r>
+              <a:rPr lang="en-US" sz="4000" dirty="0" err="1" smtClean="0"/>
+              <a:t>int</a:t>
+            </a:r>
+            <a:endParaRPr lang="en-US" sz="4000" dirty="0" smtClean="0"/>
           </a:p>
           <a:p>
             <a:pPr algn="l" rtl="0"/>
             <a:r>
               <a:rPr lang="en-US" sz="4000" dirty="0" smtClean="0"/>
-              <a:t>String					</a:t>
-            </a:r>
-            <a:r>
-              <a:rPr lang="en-US" sz="4000" dirty="0" err="1" smtClean="0"/>
-              <a:t>mussle</a:t>
-            </a:r>
-            <a:endParaRPr lang="en-US" sz="4000" dirty="0" smtClean="0"/>
+              <a:t>Comment		</a:t>
+            </a:r>
+            <a:r>
+              <a:rPr lang="en-US" sz="4000" dirty="0"/>
+              <a:t>	</a:t>
+            </a:r>
+            <a:r>
+              <a:rPr lang="en-US" sz="4000" dirty="0" smtClean="0"/>
+              <a:t>	</a:t>
+            </a:r>
+            <a:r>
+              <a:rPr lang="en-US" sz="4000" dirty="0" smtClean="0"/>
+              <a:t>String</a:t>
+            </a:r>
           </a:p>
           <a:p>
             <a:pPr algn="l" rtl="0"/>
             <a:r>
               <a:rPr lang="en-US" sz="4000" dirty="0" smtClean="0"/>
-              <a:t>Array&lt;float&gt;[5]			reps</a:t>
+              <a:t>Array&lt;float</a:t>
+            </a:r>
+            <a:r>
+              <a:rPr lang="en-US" sz="4000" dirty="0" smtClean="0"/>
+              <a:t>&gt;[5]			</a:t>
+            </a:r>
+            <a:r>
+              <a:rPr lang="en-US" sz="4000" dirty="0" smtClean="0"/>
+              <a:t>reps</a:t>
             </a:r>
           </a:p>
           <a:p>
             <a:pPr algn="l" rtl="0"/>
             <a:r>
-              <a:rPr lang="en-US" sz="4000" dirty="0" smtClean="0"/>
-              <a:t>Boolean					</a:t>
-            </a:r>
-            <a:r>
-              <a:rPr lang="en-US" sz="4000" dirty="0" err="1" smtClean="0"/>
-              <a:t>isOriginal</a:t>
-            </a:r>
-            <a:endParaRPr lang="en-US" sz="4000" dirty="0" smtClean="0"/>
-          </a:p>
-          <a:p>
-            <a:pPr algn="l" rtl="0"/>
+              <a:rPr lang="en-US" sz="4000" dirty="0"/>
+              <a:t>//in the future insert link to video or </a:t>
+            </a:r>
             <a:r>
               <a:rPr lang="en-US" sz="4000" dirty="0" smtClean="0"/>
               <a:t>//</a:t>
             </a:r>
             <a:r>
               <a:rPr lang="en-US" sz="4000" dirty="0" err="1" smtClean="0"/>
-              <a:t>Arraylist</a:t>
-            </a:r>
-            <a:r>
-              <a:rPr lang="en-US" sz="4000" dirty="0" smtClean="0"/>
-              <a:t>&lt;Float/Double&gt;	reps</a:t>
-            </a:r>
+              <a:t>somthing</a:t>
+            </a:r>
+            <a:endParaRPr lang="en-US" sz="4000" dirty="0"/>
           </a:p>
           <a:p>
             <a:pPr algn="l" rtl="0"/>
-            <a:r>
-              <a:rPr lang="en-US" sz="4000" dirty="0" smtClean="0"/>
-              <a:t>//</a:t>
-            </a:r>
-            <a:r>
-              <a:rPr lang="en-US" sz="4000" dirty="0" err="1" smtClean="0"/>
-              <a:t>Arraylist</a:t>
-            </a:r>
-            <a:r>
-              <a:rPr lang="en-US" sz="4000" dirty="0" smtClean="0"/>
-              <a:t>&lt;</a:t>
-            </a:r>
-            <a:r>
-              <a:rPr lang="en-US" sz="4000" dirty="0" err="1" smtClean="0"/>
-              <a:t>Int</a:t>
-            </a:r>
-            <a:r>
-              <a:rPr lang="en-US" sz="4000" dirty="0"/>
-              <a:t>&gt; 			sets</a:t>
-            </a:r>
-          </a:p>
-          <a:p>
-            <a:pPr algn="l" rtl="0"/>
-            <a:endParaRPr lang="en-US" sz="4000" dirty="0" smtClean="0"/>
-          </a:p>
-          <a:p>
-            <a:pPr algn="l" rtl="0"/>
-            <a:r>
-              <a:rPr lang="en-US" sz="4000" dirty="0" smtClean="0"/>
-              <a:t>		</a:t>
-            </a:r>
             <a:endParaRPr lang="he-IL" sz="4000" dirty="0"/>
           </a:p>
         </p:txBody>
@@ -4225,8 +5098,8 @@
           <a:p>
             <a:pPr rtl="0"/>
             <a:r>
-              <a:rPr lang="en-US" dirty="0" smtClean="0"/>
-              <a:t>Main</a:t>
+              <a:rPr lang="en-US" dirty="0" err="1" smtClean="0"/>
+              <a:t>ExerciseAbstractClass</a:t>
             </a:r>
             <a:endParaRPr lang="he-IL" dirty="0"/>
           </a:p>
@@ -4234,16 +5107,16 @@
       </p:sp>
       <p:sp>
         <p:nvSpPr>
-          <p:cNvPr id="3" name="מלבן מעוגל 2"/>
+          <p:cNvPr id="5" name="מלבן 4"/>
           <p:cNvSpPr/>
           <p:nvPr/>
         </p:nvSpPr>
         <p:spPr>
           <a:xfrm>
-            <a:off x="4592594" y="1029730"/>
-            <a:ext cx="3204519" cy="1005016"/>
-          </a:xfrm>
-          <a:prstGeom prst="roundRect">
+            <a:off x="1812324" y="849142"/>
+            <a:ext cx="9267568" cy="5477518"/>
+          </a:xfrm>
+          <a:prstGeom prst="rect">
             <a:avLst/>
           </a:prstGeom>
         </p:spPr>
@@ -4267,259 +5140,81 @@
           <a:bodyPr rtlCol="1" anchor="ctr"/>
           <a:lstStyle/>
           <a:p>
-            <a:pPr algn="ctr"/>
-            <a:r>
-              <a:rPr lang="en-US" dirty="0" err="1" smtClean="0"/>
-              <a:t>MainActivity</a:t>
-            </a:r>
-            <a:endParaRPr lang="he-IL" dirty="0"/>
-          </a:p>
-        </p:txBody>
-      </p:sp>
-      <p:sp>
-        <p:nvSpPr>
-          <p:cNvPr id="6" name="מלבן מעוגל 5"/>
-          <p:cNvSpPr/>
-          <p:nvPr/>
-        </p:nvSpPr>
-        <p:spPr>
-          <a:xfrm>
-            <a:off x="8377881" y="2837935"/>
-            <a:ext cx="3204519" cy="1005016"/>
-          </a:xfrm>
-          <a:prstGeom prst="roundRect">
-            <a:avLst/>
-          </a:prstGeom>
-        </p:spPr>
-        <p:style>
-          <a:lnRef idx="2">
-            <a:schemeClr val="accent1">
-              <a:shade val="50000"/>
-            </a:schemeClr>
-          </a:lnRef>
-          <a:fillRef idx="1">
-            <a:schemeClr val="accent1"/>
-          </a:fillRef>
-          <a:effectRef idx="0">
-            <a:schemeClr val="accent1"/>
-          </a:effectRef>
-          <a:fontRef idx="minor">
-            <a:schemeClr val="lt1"/>
-          </a:fontRef>
-        </p:style>
-        <p:txBody>
-          <a:bodyPr rtlCol="1" anchor="ctr"/>
-          <a:lstStyle/>
-          <a:p>
-            <a:pPr algn="ctr"/>
-            <a:r>
-              <a:rPr lang="en-US" dirty="0" smtClean="0"/>
-              <a:t>Workout</a:t>
-            </a:r>
-            <a:endParaRPr lang="he-IL" dirty="0"/>
-          </a:p>
-        </p:txBody>
-      </p:sp>
-      <p:sp>
-        <p:nvSpPr>
-          <p:cNvPr id="7" name="מלבן מעוגל 6"/>
-          <p:cNvSpPr/>
-          <p:nvPr/>
-        </p:nvSpPr>
-        <p:spPr>
-          <a:xfrm>
-            <a:off x="4592594" y="2780270"/>
-            <a:ext cx="3204519" cy="1005016"/>
-          </a:xfrm>
-          <a:prstGeom prst="roundRect">
-            <a:avLst/>
-          </a:prstGeom>
-        </p:spPr>
-        <p:style>
-          <a:lnRef idx="2">
-            <a:schemeClr val="accent1">
-              <a:shade val="50000"/>
-            </a:schemeClr>
-          </a:lnRef>
-          <a:fillRef idx="1">
-            <a:schemeClr val="accent1"/>
-          </a:fillRef>
-          <a:effectRef idx="0">
-            <a:schemeClr val="accent1"/>
-          </a:effectRef>
-          <a:fontRef idx="minor">
-            <a:schemeClr val="lt1"/>
-          </a:fontRef>
-        </p:style>
-        <p:txBody>
-          <a:bodyPr rtlCol="1" anchor="ctr"/>
-          <a:lstStyle/>
-          <a:p>
-            <a:pPr algn="ctr"/>
-            <a:r>
-              <a:rPr lang="en-US" dirty="0" smtClean="0"/>
-              <a:t>History</a:t>
-            </a:r>
-            <a:endParaRPr lang="he-IL" dirty="0"/>
-          </a:p>
-        </p:txBody>
-      </p:sp>
-      <p:sp>
-        <p:nvSpPr>
-          <p:cNvPr id="8" name="מלבן מעוגל 7"/>
-          <p:cNvSpPr/>
-          <p:nvPr/>
-        </p:nvSpPr>
-        <p:spPr>
-          <a:xfrm>
-            <a:off x="807307" y="2780270"/>
-            <a:ext cx="3204519" cy="1005016"/>
-          </a:xfrm>
-          <a:prstGeom prst="roundRect">
-            <a:avLst/>
-          </a:prstGeom>
-        </p:spPr>
-        <p:style>
-          <a:lnRef idx="2">
-            <a:schemeClr val="accent1">
-              <a:shade val="50000"/>
-            </a:schemeClr>
-          </a:lnRef>
-          <a:fillRef idx="1">
-            <a:schemeClr val="accent1"/>
-          </a:fillRef>
-          <a:effectRef idx="0">
-            <a:schemeClr val="accent1"/>
-          </a:effectRef>
-          <a:fontRef idx="minor">
-            <a:schemeClr val="lt1"/>
-          </a:fontRef>
-        </p:style>
-        <p:txBody>
-          <a:bodyPr rtlCol="1" anchor="ctr"/>
-          <a:lstStyle/>
-          <a:p>
-            <a:pPr algn="ctr"/>
-            <a:r>
-              <a:rPr lang="en-US" dirty="0" smtClean="0"/>
-              <a:t>Edit</a:t>
-            </a:r>
-            <a:endParaRPr lang="he-IL" dirty="0"/>
-          </a:p>
-        </p:txBody>
-      </p:sp>
-      <p:cxnSp>
-        <p:nvCxnSpPr>
-          <p:cNvPr id="9" name="מחבר חץ ישר 8"/>
-          <p:cNvCxnSpPr>
-            <a:stCxn id="3" idx="2"/>
-            <a:endCxn id="6" idx="0"/>
-          </p:cNvCxnSpPr>
-          <p:nvPr/>
-        </p:nvCxnSpPr>
-        <p:spPr>
-          <a:xfrm>
-            <a:off x="6194854" y="2034746"/>
-            <a:ext cx="3785287" cy="803189"/>
-          </a:xfrm>
-          <a:prstGeom prst="straightConnector1">
-            <a:avLst/>
-          </a:prstGeom>
-          <a:ln>
-            <a:tailEnd type="triangle"/>
-          </a:ln>
-        </p:spPr>
-        <p:style>
-          <a:lnRef idx="1">
-            <a:schemeClr val="accent1"/>
-          </a:lnRef>
-          <a:fillRef idx="0">
-            <a:schemeClr val="accent1"/>
-          </a:fillRef>
-          <a:effectRef idx="0">
-            <a:schemeClr val="accent1"/>
-          </a:effectRef>
-          <a:fontRef idx="minor">
-            <a:schemeClr val="tx1"/>
-          </a:fontRef>
-        </p:style>
-      </p:cxnSp>
-      <p:cxnSp>
-        <p:nvCxnSpPr>
-          <p:cNvPr id="11" name="מחבר חץ ישר 10"/>
-          <p:cNvCxnSpPr>
-            <a:stCxn id="3" idx="2"/>
-            <a:endCxn id="7" idx="0"/>
-          </p:cNvCxnSpPr>
-          <p:nvPr/>
-        </p:nvCxnSpPr>
-        <p:spPr>
-          <a:xfrm>
-            <a:off x="6194854" y="2034746"/>
-            <a:ext cx="0" cy="745524"/>
-          </a:xfrm>
-          <a:prstGeom prst="straightConnector1">
-            <a:avLst/>
-          </a:prstGeom>
-          <a:ln>
-            <a:tailEnd type="triangle"/>
-          </a:ln>
-        </p:spPr>
-        <p:style>
-          <a:lnRef idx="1">
-            <a:schemeClr val="accent1"/>
-          </a:lnRef>
-          <a:fillRef idx="0">
-            <a:schemeClr val="accent1"/>
-          </a:fillRef>
-          <a:effectRef idx="0">
-            <a:schemeClr val="accent1"/>
-          </a:effectRef>
-          <a:fontRef idx="minor">
-            <a:schemeClr val="tx1"/>
-          </a:fontRef>
-        </p:style>
-      </p:cxnSp>
-      <p:cxnSp>
-        <p:nvCxnSpPr>
-          <p:cNvPr id="13" name="מחבר חץ ישר 12"/>
-          <p:cNvCxnSpPr>
-            <a:stCxn id="3" idx="2"/>
-            <a:endCxn id="8" idx="0"/>
-          </p:cNvCxnSpPr>
-          <p:nvPr/>
-        </p:nvCxnSpPr>
-        <p:spPr>
-          <a:xfrm flipH="1">
-            <a:off x="2409567" y="2034746"/>
-            <a:ext cx="3785287" cy="745524"/>
-          </a:xfrm>
-          <a:prstGeom prst="straightConnector1">
-            <a:avLst/>
-          </a:prstGeom>
-          <a:ln>
-            <a:tailEnd type="triangle"/>
-          </a:ln>
-        </p:spPr>
-        <p:style>
-          <a:lnRef idx="1">
-            <a:schemeClr val="accent1"/>
-          </a:lnRef>
-          <a:fillRef idx="0">
-            <a:schemeClr val="accent1"/>
-          </a:fillRef>
-          <a:effectRef idx="0">
-            <a:schemeClr val="accent1"/>
-          </a:effectRef>
-          <a:fontRef idx="minor">
-            <a:schemeClr val="tx1"/>
-          </a:fontRef>
-        </p:style>
-      </p:cxnSp>
+            <a:pPr algn="l" rtl="0"/>
+            <a:endParaRPr lang="en-US" sz="4000" dirty="0" smtClean="0"/>
+          </a:p>
+          <a:p>
+            <a:pPr algn="l" rtl="0"/>
+            <a:r>
+              <a:rPr lang="en-US" sz="4000" dirty="0" smtClean="0"/>
+              <a:t>Id						</a:t>
+            </a:r>
+            <a:r>
+              <a:rPr lang="en-US" sz="4000" dirty="0" err="1" smtClean="0"/>
+              <a:t>int</a:t>
+            </a:r>
+            <a:endParaRPr lang="en-US" sz="4000" dirty="0" smtClean="0"/>
+          </a:p>
+          <a:p>
+            <a:pPr algn="l" rtl="0"/>
+            <a:r>
+              <a:rPr lang="en-US" sz="4000" dirty="0" smtClean="0"/>
+              <a:t>String</a:t>
+            </a:r>
+            <a:r>
+              <a:rPr lang="en-US" sz="4000" dirty="0" smtClean="0"/>
+              <a:t>					name</a:t>
+            </a:r>
+          </a:p>
+          <a:p>
+            <a:pPr algn="l" rtl="0"/>
+            <a:r>
+              <a:rPr lang="en-US" sz="4000" dirty="0" smtClean="0"/>
+              <a:t>String					description</a:t>
+            </a:r>
+          </a:p>
+          <a:p>
+            <a:pPr algn="l" rtl="0"/>
+            <a:r>
+              <a:rPr lang="en-US" sz="4000" dirty="0" smtClean="0"/>
+              <a:t>String</a:t>
+            </a:r>
+            <a:r>
+              <a:rPr lang="en-US" sz="4000" dirty="0" smtClean="0"/>
+              <a:t>					</a:t>
+            </a:r>
+            <a:r>
+              <a:rPr lang="en-US" sz="4000" dirty="0" err="1" smtClean="0"/>
+              <a:t>mussle</a:t>
+            </a:r>
+            <a:endParaRPr lang="en-US" sz="4000" dirty="0" smtClean="0"/>
+          </a:p>
+          <a:p>
+            <a:pPr algn="l" rtl="0"/>
+            <a:r>
+              <a:rPr lang="en-US" sz="4000" dirty="0" smtClean="0"/>
+              <a:t>//</a:t>
+            </a:r>
+            <a:r>
+              <a:rPr lang="en-US" sz="4000" dirty="0"/>
+              <a:t>in the future insert link to video or </a:t>
+            </a:r>
+            <a:r>
+              <a:rPr lang="en-US" sz="4000" dirty="0" err="1"/>
+              <a:t>somthing</a:t>
+            </a:r>
+            <a:endParaRPr lang="en-US" sz="4000" dirty="0"/>
+          </a:p>
+          <a:p>
+            <a:pPr algn="l" rtl="0"/>
+            <a:endParaRPr lang="he-IL" sz="4000" dirty="0"/>
+          </a:p>
+        </p:txBody>
+      </p:sp>
     </p:spTree>
     <p:extLst>
       <p:ext uri="{BB962C8B-B14F-4D97-AF65-F5344CB8AC3E}">
-        <p14:creationId xmlns:p14="http://schemas.microsoft.com/office/powerpoint/2010/main" val="1769765647"/>
+        <p14:creationId xmlns:p14="http://schemas.microsoft.com/office/powerpoint/2010/main" val="3627482298"/>
       </p:ext>
     </p:extLst>
   </p:cSld>
@@ -4576,7 +5271,7 @@
             <a:pPr rtl="0"/>
             <a:r>
               <a:rPr lang="en-US" dirty="0" smtClean="0"/>
-              <a:t>Edit</a:t>
+              <a:t>Main</a:t>
             </a:r>
             <a:endParaRPr lang="he-IL" dirty="0"/>
           </a:p>
@@ -4584,14 +5279,14 @@
       </p:sp>
       <p:sp>
         <p:nvSpPr>
-          <p:cNvPr id="8" name="מלבן מעוגל 7"/>
+          <p:cNvPr id="3" name="מלבן מעוגל 2"/>
           <p:cNvSpPr/>
           <p:nvPr/>
         </p:nvSpPr>
         <p:spPr>
           <a:xfrm>
-            <a:off x="4592594" y="1206843"/>
-            <a:ext cx="3204519" cy="976184"/>
+            <a:off x="4592594" y="1029730"/>
+            <a:ext cx="3204519" cy="1005016"/>
           </a:xfrm>
           <a:prstGeom prst="roundRect">
             <a:avLst/>
@@ -4617,58 +5312,25 @@
           <a:bodyPr rtlCol="1" anchor="ctr"/>
           <a:lstStyle/>
           <a:p>
-            <a:pPr algn="l" rtl="0"/>
-            <a:r>
-              <a:rPr lang="en-US" dirty="0" smtClean="0"/>
-              <a:t>Mass</a:t>
-            </a:r>
-            <a:r>
-              <a:rPr lang="en-US" dirty="0" smtClean="0"/>
-              <a:t>		12.12.12</a:t>
-            </a:r>
-          </a:p>
-          <a:p>
-            <a:pPr algn="l" rtl="0"/>
-            <a:r>
-              <a:rPr lang="en-US" dirty="0" smtClean="0"/>
-              <a:t>A-Back </a:t>
-            </a:r>
+            <a:pPr algn="ctr"/>
             <a:r>
               <a:rPr lang="en-US" dirty="0" err="1" smtClean="0"/>
-              <a:t>Soulders</a:t>
-            </a:r>
-            <a:r>
-              <a:rPr lang="en-US" dirty="0" smtClean="0"/>
-              <a:t> Biceps</a:t>
-            </a:r>
-          </a:p>
-          <a:p>
-            <a:pPr algn="l" rtl="0"/>
-            <a:r>
-              <a:rPr lang="en-US" dirty="0" smtClean="0"/>
-              <a:t>B-</a:t>
-            </a:r>
-            <a:r>
-              <a:rPr lang="en-US" dirty="0" err="1" smtClean="0"/>
-              <a:t>Chset</a:t>
-            </a:r>
-            <a:r>
-              <a:rPr lang="en-US" dirty="0" smtClean="0"/>
-              <a:t> Legs Biceps</a:t>
-            </a:r>
-          </a:p>
-        </p:txBody>
-      </p:sp>
-      <p:sp>
-        <p:nvSpPr>
-          <p:cNvPr id="10" name="מלבן מעוגל 9"/>
+              <a:t>MainActivity</a:t>
+            </a:r>
+            <a:endParaRPr lang="he-IL" dirty="0"/>
+          </a:p>
+        </p:txBody>
+      </p:sp>
+      <p:sp>
+        <p:nvSpPr>
+          <p:cNvPr id="6" name="מלבן מעוגל 5"/>
           <p:cNvSpPr/>
           <p:nvPr/>
         </p:nvSpPr>
         <p:spPr>
           <a:xfrm>
-            <a:off x="4592594" y="2393091"/>
-            <a:ext cx="3204519" cy="1099751"/>
+            <a:off x="8377881" y="2837935"/>
+            <a:ext cx="3204519" cy="1005016"/>
           </a:xfrm>
           <a:prstGeom prst="roundRect">
             <a:avLst/>
@@ -4694,62 +5356,25 @@
           <a:bodyPr rtlCol="1" anchor="ctr"/>
           <a:lstStyle/>
           <a:p>
-            <a:pPr algn="l" rtl="0"/>
+            <a:pPr algn="ctr"/>
             <a:r>
               <a:rPr lang="en-US" dirty="0" smtClean="0"/>
-              <a:t>Fit</a:t>
-            </a:r>
-            <a:r>
-              <a:rPr lang="en-US" dirty="0" smtClean="0"/>
-              <a:t>		11.11.12</a:t>
-            </a:r>
-          </a:p>
-          <a:p>
-            <a:pPr algn="l" rtl="0"/>
-            <a:r>
-              <a:rPr lang="en-US" dirty="0" smtClean="0"/>
-              <a:t>A-Back Biceps</a:t>
-            </a:r>
-          </a:p>
-          <a:p>
-            <a:pPr algn="l" rtl="0"/>
-            <a:r>
-              <a:rPr lang="en-US" dirty="0" smtClean="0"/>
-              <a:t>B-</a:t>
-            </a:r>
-            <a:r>
-              <a:rPr lang="en-US" dirty="0" err="1" smtClean="0"/>
-              <a:t>Chset</a:t>
-            </a:r>
-            <a:r>
-              <a:rPr lang="en-US" dirty="0" smtClean="0"/>
-              <a:t> Biceps</a:t>
-            </a:r>
-          </a:p>
-          <a:p>
-            <a:pPr algn="l" rtl="0"/>
-            <a:r>
-              <a:rPr lang="en-US" dirty="0" smtClean="0"/>
-              <a:t>C-Legs </a:t>
-            </a:r>
-            <a:r>
-              <a:rPr lang="en-US" dirty="0" err="1" smtClean="0"/>
-              <a:t>Soulders</a:t>
-            </a:r>
-            <a:endParaRPr lang="en-US" dirty="0" smtClean="0"/>
-          </a:p>
-        </p:txBody>
-      </p:sp>
-      <p:sp>
-        <p:nvSpPr>
-          <p:cNvPr id="12" name="מלבן מעוגל 11"/>
+              <a:t>Workout</a:t>
+            </a:r>
+            <a:endParaRPr lang="he-IL" dirty="0"/>
+          </a:p>
+        </p:txBody>
+      </p:sp>
+      <p:sp>
+        <p:nvSpPr>
+          <p:cNvPr id="7" name="מלבן מעוגל 6"/>
           <p:cNvSpPr/>
           <p:nvPr/>
         </p:nvSpPr>
         <p:spPr>
           <a:xfrm>
-            <a:off x="4592594" y="3702906"/>
-            <a:ext cx="3204519" cy="976184"/>
+            <a:off x="4592594" y="2780270"/>
+            <a:ext cx="3204519" cy="1005016"/>
           </a:xfrm>
           <a:prstGeom prst="roundRect">
             <a:avLst/>
@@ -4775,60 +5400,27 @@
           <a:bodyPr rtlCol="1" anchor="ctr"/>
           <a:lstStyle/>
           <a:p>
-            <a:pPr algn="l" rtl="0"/>
+            <a:pPr algn="ctr"/>
             <a:r>
               <a:rPr lang="en-US" dirty="0" smtClean="0"/>
-              <a:t>Mass</a:t>
-            </a:r>
-            <a:r>
-              <a:rPr lang="en-US" dirty="0" smtClean="0"/>
-              <a:t>		10.10.12</a:t>
-            </a:r>
-          </a:p>
-          <a:p>
-            <a:pPr algn="l" rtl="0"/>
-            <a:r>
-              <a:rPr lang="en-US" dirty="0" smtClean="0"/>
-              <a:t>A-Back </a:t>
-            </a:r>
-            <a:r>
-              <a:rPr lang="en-US" dirty="0" err="1" smtClean="0"/>
-              <a:t>Soulders</a:t>
-            </a:r>
-            <a:r>
-              <a:rPr lang="en-US" dirty="0" smtClean="0"/>
-              <a:t> Biceps</a:t>
-            </a:r>
-          </a:p>
-          <a:p>
-            <a:pPr algn="l" rtl="0"/>
-            <a:r>
-              <a:rPr lang="en-US" dirty="0" smtClean="0"/>
-              <a:t>B-</a:t>
-            </a:r>
-            <a:r>
-              <a:rPr lang="en-US" dirty="0" err="1" smtClean="0"/>
-              <a:t>Chset</a:t>
-            </a:r>
-            <a:r>
-              <a:rPr lang="en-US" dirty="0" smtClean="0"/>
-              <a:t> Legs Biceps</a:t>
-            </a:r>
-          </a:p>
-        </p:txBody>
-      </p:sp>
-      <p:sp>
-        <p:nvSpPr>
-          <p:cNvPr id="6" name="מלבן 5"/>
+              <a:t>History</a:t>
+            </a:r>
+            <a:endParaRPr lang="he-IL" dirty="0"/>
+          </a:p>
+        </p:txBody>
+      </p:sp>
+      <p:sp>
+        <p:nvSpPr>
+          <p:cNvPr id="8" name="מלבן מעוגל 7"/>
           <p:cNvSpPr/>
           <p:nvPr/>
         </p:nvSpPr>
         <p:spPr>
           <a:xfrm>
-            <a:off x="7331675" y="4803624"/>
-            <a:ext cx="465438" cy="357702"/>
-          </a:xfrm>
-          <a:prstGeom prst="rect">
+            <a:off x="807307" y="2780270"/>
+            <a:ext cx="3204519" cy="1005016"/>
+          </a:xfrm>
+          <a:prstGeom prst="roundRect">
             <a:avLst/>
           </a:prstGeom>
         </p:spPr>
@@ -4855,7 +5447,7 @@
             <a:pPr algn="ctr"/>
             <a:r>
               <a:rPr lang="en-US" dirty="0" smtClean="0"/>
-              <a:t>+</a:t>
+              <a:t>Edit</a:t>
             </a:r>
             <a:endParaRPr lang="he-IL" dirty="0"/>
           </a:p>
@@ -4863,16 +5455,17 @@
       </p:sp>
       <p:cxnSp>
         <p:nvCxnSpPr>
-          <p:cNvPr id="4" name="מחבר חץ ישר 3"/>
+          <p:cNvPr id="9" name="מחבר חץ ישר 8"/>
           <p:cNvCxnSpPr>
-            <a:stCxn id="6" idx="3"/>
+            <a:stCxn id="3" idx="2"/>
+            <a:endCxn id="6" idx="0"/>
           </p:cNvCxnSpPr>
           <p:nvPr/>
         </p:nvCxnSpPr>
         <p:spPr>
           <a:xfrm>
-            <a:off x="7797113" y="4982475"/>
-            <a:ext cx="811428" cy="108509"/>
+            <a:off x="6194854" y="2034746"/>
+            <a:ext cx="3785287" cy="803189"/>
           </a:xfrm>
           <a:prstGeom prst="straightConnector1">
             <a:avLst/>
@@ -4896,54 +5489,82 @@
           </a:fontRef>
         </p:style>
       </p:cxnSp>
-      <p:sp>
-        <p:nvSpPr>
-          <p:cNvPr id="7" name="מלבן מעוגל 6"/>
-          <p:cNvSpPr/>
+      <p:cxnSp>
+        <p:nvCxnSpPr>
+          <p:cNvPr id="11" name="מחבר חץ ישר 10"/>
+          <p:cNvCxnSpPr>
+            <a:stCxn id="3" idx="2"/>
+            <a:endCxn id="7" idx="0"/>
+          </p:cNvCxnSpPr>
           <p:nvPr/>
-        </p:nvSpPr>
-        <p:spPr>
-          <a:xfrm>
-            <a:off x="8608541" y="4982475"/>
-            <a:ext cx="1351005" cy="495687"/>
-          </a:xfrm>
-          <a:prstGeom prst="roundRect">
+        </p:nvCxnSpPr>
+        <p:spPr>
+          <a:xfrm>
+            <a:off x="6194854" y="2034746"/>
+            <a:ext cx="0" cy="745524"/>
+          </a:xfrm>
+          <a:prstGeom prst="straightConnector1">
             <a:avLst/>
           </a:prstGeom>
+          <a:ln>
+            <a:tailEnd type="triangle"/>
+          </a:ln>
         </p:spPr>
         <p:style>
-          <a:lnRef idx="2">
-            <a:schemeClr val="accent1">
-              <a:shade val="50000"/>
-            </a:schemeClr>
+          <a:lnRef idx="1">
+            <a:schemeClr val="accent1"/>
           </a:lnRef>
-          <a:fillRef idx="1">
+          <a:fillRef idx="0">
             <a:schemeClr val="accent1"/>
           </a:fillRef>
           <a:effectRef idx="0">
             <a:schemeClr val="accent1"/>
           </a:effectRef>
           <a:fontRef idx="minor">
-            <a:schemeClr val="lt1"/>
+            <a:schemeClr val="tx1"/>
           </a:fontRef>
         </p:style>
-        <p:txBody>
-          <a:bodyPr rtlCol="1" anchor="ctr"/>
-          <a:lstStyle/>
-          <a:p>
-            <a:pPr algn="ctr"/>
-            <a:r>
-              <a:rPr lang="en-US" dirty="0" err="1" smtClean="0"/>
-              <a:t>AddRoutineActivity</a:t>
-            </a:r>
-            <a:endParaRPr lang="he-IL" dirty="0"/>
-          </a:p>
-        </p:txBody>
-      </p:sp>
+      </p:cxnSp>
+      <p:cxnSp>
+        <p:nvCxnSpPr>
+          <p:cNvPr id="13" name="מחבר חץ ישר 12"/>
+          <p:cNvCxnSpPr>
+            <a:stCxn id="3" idx="2"/>
+            <a:endCxn id="8" idx="0"/>
+          </p:cNvCxnSpPr>
+          <p:nvPr/>
+        </p:nvCxnSpPr>
+        <p:spPr>
+          <a:xfrm flipH="1">
+            <a:off x="2409567" y="2034746"/>
+            <a:ext cx="3785287" cy="745524"/>
+          </a:xfrm>
+          <a:prstGeom prst="straightConnector1">
+            <a:avLst/>
+          </a:prstGeom>
+          <a:ln>
+            <a:tailEnd type="triangle"/>
+          </a:ln>
+        </p:spPr>
+        <p:style>
+          <a:lnRef idx="1">
+            <a:schemeClr val="accent1"/>
+          </a:lnRef>
+          <a:fillRef idx="0">
+            <a:schemeClr val="accent1"/>
+          </a:fillRef>
+          <a:effectRef idx="0">
+            <a:schemeClr val="accent1"/>
+          </a:effectRef>
+          <a:fontRef idx="minor">
+            <a:schemeClr val="tx1"/>
+          </a:fontRef>
+        </p:style>
+      </p:cxnSp>
     </p:spTree>
     <p:extLst>
       <p:ext uri="{BB962C8B-B14F-4D97-AF65-F5344CB8AC3E}">
-        <p14:creationId xmlns:p14="http://schemas.microsoft.com/office/powerpoint/2010/main" val="2067963516"/>
+        <p14:creationId xmlns:p14="http://schemas.microsoft.com/office/powerpoint/2010/main" val="1769765647"/>
       </p:ext>
     </p:extLst>
   </p:cSld>
@@ -4999,8 +5620,8 @@
           <a:p>
             <a:pPr rtl="0"/>
             <a:r>
-              <a:rPr lang="en-US" dirty="0" err="1" smtClean="0"/>
-              <a:t>AddRoutineActivity</a:t>
+              <a:rPr lang="en-US" dirty="0" smtClean="0"/>
+              <a:t>Edit</a:t>
             </a:r>
             <a:endParaRPr lang="he-IL" dirty="0"/>
           </a:p>
@@ -5015,7 +5636,7 @@
         <p:spPr>
           <a:xfrm>
             <a:off x="4592594" y="1206843"/>
-            <a:ext cx="3204519" cy="333633"/>
+            <a:ext cx="3204519" cy="976184"/>
           </a:xfrm>
           <a:prstGeom prst="roundRect">
             <a:avLst/>
@@ -5043,26 +5664,52 @@
           <a:p>
             <a:pPr algn="l" rtl="0"/>
             <a:r>
-              <a:rPr lang="en-US" u="sng" dirty="0" smtClean="0"/>
-              <a:t>Routine Name </a:t>
-            </a:r>
-            <a:r>
               <a:rPr lang="en-US" dirty="0" smtClean="0"/>
-              <a:t>___________	</a:t>
-            </a:r>
-          </a:p>
-        </p:txBody>
-      </p:sp>
-      <p:sp>
-        <p:nvSpPr>
-          <p:cNvPr id="9" name="מלבן מעוגל 8"/>
+              <a:t>Mass		12.12.12</a:t>
+            </a:r>
+          </a:p>
+          <a:p>
+            <a:pPr algn="l" rtl="0"/>
+            <a:r>
+              <a:rPr lang="en-US" dirty="0" smtClean="0"/>
+              <a:t>A-Back </a:t>
+            </a:r>
+            <a:r>
+              <a:rPr lang="en-US" dirty="0" err="1" smtClean="0"/>
+              <a:t>Soulders</a:t>
+            </a:r>
+            <a:r>
+              <a:rPr lang="en-US" dirty="0" smtClean="0"/>
+              <a:t> Biceps</a:t>
+            </a:r>
+          </a:p>
+          <a:p>
+            <a:pPr algn="l" rtl="0"/>
+            <a:r>
+              <a:rPr lang="en-US" dirty="0" smtClean="0"/>
+              <a:t>B-</a:t>
+            </a:r>
+            <a:r>
+              <a:rPr lang="en-US" dirty="0" err="1" smtClean="0"/>
+              <a:t>Chset</a:t>
+            </a:r>
+            <a:r>
+              <a:rPr lang="en-US" dirty="0" smtClean="0"/>
+              <a:t> Legs Biceps</a:t>
+            </a:r>
+          </a:p>
+        </p:txBody>
+      </p:sp>
+      <p:sp>
+        <p:nvSpPr>
+          <p:cNvPr id="10" name="מלבן מעוגל 9"/>
           <p:cNvSpPr/>
           <p:nvPr/>
         </p:nvSpPr>
         <p:spPr>
           <a:xfrm>
-            <a:off x="4592593" y="1731361"/>
-            <a:ext cx="3204519" cy="333633"/>
+            <a:off x="4592594" y="2393091"/>
+            <a:ext cx="3204519" cy="1099751"/>
           </a:xfrm>
           <a:prstGeom prst="roundRect">
             <a:avLst/>
@@ -5090,20 +5737,246 @@
           <a:p>
             <a:pPr algn="l" rtl="0"/>
             <a:r>
-              <a:rPr lang="en-US" u="sng" dirty="0" smtClean="0"/>
-              <a:t>Starting Date </a:t>
-            </a:r>
-            <a:r>
               <a:rPr lang="en-US" dirty="0" smtClean="0"/>
-              <a:t>___________	</a:t>
-            </a:r>
+              <a:t>Fit		11.11.12</a:t>
+            </a:r>
+          </a:p>
+          <a:p>
+            <a:pPr algn="l" rtl="0"/>
+            <a:r>
+              <a:rPr lang="en-US" dirty="0" smtClean="0"/>
+              <a:t>A-Back Biceps</a:t>
+            </a:r>
+          </a:p>
+          <a:p>
+            <a:pPr algn="l" rtl="0"/>
+            <a:r>
+              <a:rPr lang="en-US" dirty="0" smtClean="0"/>
+              <a:t>B-</a:t>
+            </a:r>
+            <a:r>
+              <a:rPr lang="en-US" dirty="0" err="1" smtClean="0"/>
+              <a:t>Chset</a:t>
+            </a:r>
+            <a:r>
+              <a:rPr lang="en-US" dirty="0" smtClean="0"/>
+              <a:t> Biceps</a:t>
+            </a:r>
+          </a:p>
+          <a:p>
+            <a:pPr algn="l" rtl="0"/>
+            <a:r>
+              <a:rPr lang="en-US" dirty="0" smtClean="0"/>
+              <a:t>C-Legs </a:t>
+            </a:r>
+            <a:r>
+              <a:rPr lang="en-US" dirty="0" err="1" smtClean="0"/>
+              <a:t>Soulders</a:t>
+            </a:r>
+            <a:endParaRPr lang="en-US" dirty="0" smtClean="0"/>
+          </a:p>
+        </p:txBody>
+      </p:sp>
+      <p:sp>
+        <p:nvSpPr>
+          <p:cNvPr id="12" name="מלבן מעוגל 11"/>
+          <p:cNvSpPr/>
+          <p:nvPr/>
+        </p:nvSpPr>
+        <p:spPr>
+          <a:xfrm>
+            <a:off x="4592594" y="3702906"/>
+            <a:ext cx="3204519" cy="976184"/>
+          </a:xfrm>
+          <a:prstGeom prst="roundRect">
+            <a:avLst/>
+          </a:prstGeom>
+        </p:spPr>
+        <p:style>
+          <a:lnRef idx="2">
+            <a:schemeClr val="accent1">
+              <a:shade val="50000"/>
+            </a:schemeClr>
+          </a:lnRef>
+          <a:fillRef idx="1">
+            <a:schemeClr val="accent1"/>
+          </a:fillRef>
+          <a:effectRef idx="0">
+            <a:schemeClr val="accent1"/>
+          </a:effectRef>
+          <a:fontRef idx="minor">
+            <a:schemeClr val="lt1"/>
+          </a:fontRef>
+        </p:style>
+        <p:txBody>
+          <a:bodyPr rtlCol="1" anchor="ctr"/>
+          <a:lstStyle/>
+          <a:p>
+            <a:pPr algn="l" rtl="0"/>
+            <a:r>
+              <a:rPr lang="en-US" dirty="0" smtClean="0"/>
+              <a:t>Mass		10.10.12</a:t>
+            </a:r>
+          </a:p>
+          <a:p>
+            <a:pPr algn="l" rtl="0"/>
+            <a:r>
+              <a:rPr lang="en-US" dirty="0" smtClean="0"/>
+              <a:t>A-Back </a:t>
+            </a:r>
+            <a:r>
+              <a:rPr lang="en-US" dirty="0" err="1" smtClean="0"/>
+              <a:t>Soulders</a:t>
+            </a:r>
+            <a:r>
+              <a:rPr lang="en-US" dirty="0" smtClean="0"/>
+              <a:t> Biceps</a:t>
+            </a:r>
+          </a:p>
+          <a:p>
+            <a:pPr algn="l" rtl="0"/>
+            <a:r>
+              <a:rPr lang="en-US" dirty="0" smtClean="0"/>
+              <a:t>B-</a:t>
+            </a:r>
+            <a:r>
+              <a:rPr lang="en-US" dirty="0" err="1" smtClean="0"/>
+              <a:t>Chset</a:t>
+            </a:r>
+            <a:r>
+              <a:rPr lang="en-US" dirty="0" smtClean="0"/>
+              <a:t> Legs Biceps</a:t>
+            </a:r>
+          </a:p>
+        </p:txBody>
+      </p:sp>
+      <p:sp>
+        <p:nvSpPr>
+          <p:cNvPr id="6" name="מלבן 5"/>
+          <p:cNvSpPr/>
+          <p:nvPr/>
+        </p:nvSpPr>
+        <p:spPr>
+          <a:xfrm>
+            <a:off x="7331675" y="4803624"/>
+            <a:ext cx="465438" cy="357702"/>
+          </a:xfrm>
+          <a:prstGeom prst="rect">
+            <a:avLst/>
+          </a:prstGeom>
+        </p:spPr>
+        <p:style>
+          <a:lnRef idx="2">
+            <a:schemeClr val="accent1">
+              <a:shade val="50000"/>
+            </a:schemeClr>
+          </a:lnRef>
+          <a:fillRef idx="1">
+            <a:schemeClr val="accent1"/>
+          </a:fillRef>
+          <a:effectRef idx="0">
+            <a:schemeClr val="accent1"/>
+          </a:effectRef>
+          <a:fontRef idx="minor">
+            <a:schemeClr val="lt1"/>
+          </a:fontRef>
+        </p:style>
+        <p:txBody>
+          <a:bodyPr rtlCol="1" anchor="ctr"/>
+          <a:lstStyle/>
+          <a:p>
+            <a:pPr algn="ctr"/>
+            <a:r>
+              <a:rPr lang="en-US" dirty="0" smtClean="0"/>
+              <a:t>+</a:t>
+            </a:r>
+            <a:endParaRPr lang="he-IL" dirty="0"/>
+          </a:p>
+        </p:txBody>
+      </p:sp>
+      <p:cxnSp>
+        <p:nvCxnSpPr>
+          <p:cNvPr id="4" name="מחבר חץ ישר 3"/>
+          <p:cNvCxnSpPr>
+            <a:stCxn id="6" idx="3"/>
+          </p:cNvCxnSpPr>
+          <p:nvPr/>
+        </p:nvCxnSpPr>
+        <p:spPr>
+          <a:xfrm>
+            <a:off x="7797113" y="4982475"/>
+            <a:ext cx="811428" cy="108509"/>
+          </a:xfrm>
+          <a:prstGeom prst="straightConnector1">
+            <a:avLst/>
+          </a:prstGeom>
+          <a:ln>
+            <a:tailEnd type="triangle"/>
+          </a:ln>
+        </p:spPr>
+        <p:style>
+          <a:lnRef idx="1">
+            <a:schemeClr val="accent1"/>
+          </a:lnRef>
+          <a:fillRef idx="0">
+            <a:schemeClr val="accent1"/>
+          </a:fillRef>
+          <a:effectRef idx="0">
+            <a:schemeClr val="accent1"/>
+          </a:effectRef>
+          <a:fontRef idx="minor">
+            <a:schemeClr val="tx1"/>
+          </a:fontRef>
+        </p:style>
+      </p:cxnSp>
+      <p:sp>
+        <p:nvSpPr>
+          <p:cNvPr id="7" name="מלבן מעוגל 6"/>
+          <p:cNvSpPr/>
+          <p:nvPr/>
+        </p:nvSpPr>
+        <p:spPr>
+          <a:xfrm>
+            <a:off x="8608541" y="4982475"/>
+            <a:ext cx="1351005" cy="495687"/>
+          </a:xfrm>
+          <a:prstGeom prst="roundRect">
+            <a:avLst/>
+          </a:prstGeom>
+        </p:spPr>
+        <p:style>
+          <a:lnRef idx="2">
+            <a:schemeClr val="accent1">
+              <a:shade val="50000"/>
+            </a:schemeClr>
+          </a:lnRef>
+          <a:fillRef idx="1">
+            <a:schemeClr val="accent1"/>
+          </a:fillRef>
+          <a:effectRef idx="0">
+            <a:schemeClr val="accent1"/>
+          </a:effectRef>
+          <a:fontRef idx="minor">
+            <a:schemeClr val="lt1"/>
+          </a:fontRef>
+        </p:style>
+        <p:txBody>
+          <a:bodyPr rtlCol="1" anchor="ctr"/>
+          <a:lstStyle/>
+          <a:p>
+            <a:pPr algn="ctr"/>
+            <a:r>
+              <a:rPr lang="en-US" dirty="0" err="1" smtClean="0"/>
+              <a:t>AddRoutineActivity</a:t>
+            </a:r>
+            <a:endParaRPr lang="he-IL" dirty="0"/>
           </a:p>
         </p:txBody>
       </p:sp>
     </p:spTree>
     <p:extLst>
       <p:ext uri="{BB962C8B-B14F-4D97-AF65-F5344CB8AC3E}">
-        <p14:creationId xmlns:p14="http://schemas.microsoft.com/office/powerpoint/2010/main" val="504684143"/>
+        <p14:creationId xmlns:p14="http://schemas.microsoft.com/office/powerpoint/2010/main" val="2067963516"/>
       </p:ext>
     </p:extLst>
   </p:cSld>
@@ -5160,7 +6033,7 @@
             <a:pPr rtl="0"/>
             <a:r>
               <a:rPr lang="en-US" dirty="0" err="1" smtClean="0"/>
-              <a:t>EditRoutine</a:t>
+              <a:t>AddRoutineActivity</a:t>
             </a:r>
             <a:endParaRPr lang="he-IL" dirty="0"/>
           </a:p>
@@ -5175,7 +6048,7 @@
         <p:spPr>
           <a:xfrm>
             <a:off x="4592594" y="1206843"/>
-            <a:ext cx="3204519" cy="976184"/>
+            <a:ext cx="3204519" cy="333633"/>
           </a:xfrm>
           <a:prstGeom prst="roundRect">
             <a:avLst/>
@@ -5203,22 +6076,26 @@
           <a:p>
             <a:pPr algn="l" rtl="0"/>
             <a:r>
+              <a:rPr lang="en-US" u="sng" dirty="0" smtClean="0"/>
+              <a:t>Routine Name </a:t>
+            </a:r>
+            <a:r>
               <a:rPr lang="en-US" dirty="0" smtClean="0"/>
-              <a:t>A-Back Biceps</a:t>
-            </a:r>
-          </a:p>
-        </p:txBody>
-      </p:sp>
-      <p:sp>
-        <p:nvSpPr>
-          <p:cNvPr id="10" name="מלבן מעוגל 9"/>
+              <a:t>___________	</a:t>
+            </a:r>
+          </a:p>
+        </p:txBody>
+      </p:sp>
+      <p:sp>
+        <p:nvSpPr>
+          <p:cNvPr id="9" name="מלבן מעוגל 8"/>
           <p:cNvSpPr/>
           <p:nvPr/>
         </p:nvSpPr>
         <p:spPr>
           <a:xfrm>
-            <a:off x="4592594" y="2393091"/>
-            <a:ext cx="3204519" cy="1099751"/>
+            <a:off x="4592593" y="1731361"/>
+            <a:ext cx="3204519" cy="333633"/>
           </a:xfrm>
           <a:prstGeom prst="roundRect">
             <a:avLst/>
@@ -5246,109 +6123,20 @@
           <a:p>
             <a:pPr algn="l" rtl="0"/>
             <a:r>
+              <a:rPr lang="en-US" u="sng" dirty="0" smtClean="0"/>
+              <a:t>Starting Date </a:t>
+            </a:r>
+            <a:r>
               <a:rPr lang="en-US" dirty="0" smtClean="0"/>
-              <a:t>B-Chest Biceps</a:t>
-            </a:r>
-            <a:endParaRPr lang="en-US" dirty="0"/>
-          </a:p>
-        </p:txBody>
-      </p:sp>
-      <p:sp>
-        <p:nvSpPr>
-          <p:cNvPr id="12" name="מלבן מעוגל 11"/>
-          <p:cNvSpPr/>
-          <p:nvPr/>
-        </p:nvSpPr>
-        <p:spPr>
-          <a:xfrm>
-            <a:off x="4592594" y="3702906"/>
-            <a:ext cx="3204519" cy="976184"/>
-          </a:xfrm>
-          <a:prstGeom prst="roundRect">
-            <a:avLst/>
-          </a:prstGeom>
-        </p:spPr>
-        <p:style>
-          <a:lnRef idx="2">
-            <a:schemeClr val="accent1">
-              <a:shade val="50000"/>
-            </a:schemeClr>
-          </a:lnRef>
-          <a:fillRef idx="1">
-            <a:schemeClr val="accent1"/>
-          </a:fillRef>
-          <a:effectRef idx="0">
-            <a:schemeClr val="accent1"/>
-          </a:effectRef>
-          <a:fontRef idx="minor">
-            <a:schemeClr val="lt1"/>
-          </a:fontRef>
-        </p:style>
-        <p:txBody>
-          <a:bodyPr rtlCol="1" anchor="ctr"/>
-          <a:lstStyle/>
-          <a:p>
-            <a:pPr algn="l" rtl="0"/>
-            <a:r>
-              <a:rPr lang="en-US" dirty="0" smtClean="0"/>
-              <a:t>C-Legs </a:t>
-            </a:r>
-            <a:r>
-              <a:rPr lang="en-US" dirty="0" err="1" smtClean="0"/>
-              <a:t>Soulders</a:t>
-            </a:r>
-            <a:endParaRPr lang="en-US" dirty="0" smtClean="0"/>
-          </a:p>
-        </p:txBody>
-      </p:sp>
-      <p:sp>
-        <p:nvSpPr>
-          <p:cNvPr id="6" name="מלבן 5"/>
-          <p:cNvSpPr/>
-          <p:nvPr/>
-        </p:nvSpPr>
-        <p:spPr>
-          <a:xfrm>
-            <a:off x="7331675" y="4803624"/>
-            <a:ext cx="465438" cy="357702"/>
-          </a:xfrm>
-          <a:prstGeom prst="rect">
-            <a:avLst/>
-          </a:prstGeom>
-        </p:spPr>
-        <p:style>
-          <a:lnRef idx="2">
-            <a:schemeClr val="accent1">
-              <a:shade val="50000"/>
-            </a:schemeClr>
-          </a:lnRef>
-          <a:fillRef idx="1">
-            <a:schemeClr val="accent1"/>
-          </a:fillRef>
-          <a:effectRef idx="0">
-            <a:schemeClr val="accent1"/>
-          </a:effectRef>
-          <a:fontRef idx="minor">
-            <a:schemeClr val="lt1"/>
-          </a:fontRef>
-        </p:style>
-        <p:txBody>
-          <a:bodyPr rtlCol="1" anchor="ctr"/>
-          <a:lstStyle/>
-          <a:p>
-            <a:pPr algn="ctr"/>
-            <a:r>
-              <a:rPr lang="en-US" dirty="0" smtClean="0"/>
-              <a:t>+</a:t>
-            </a:r>
-            <a:endParaRPr lang="he-IL" dirty="0"/>
+              <a:t>___________	</a:t>
+            </a:r>
           </a:p>
         </p:txBody>
       </p:sp>
     </p:spTree>
     <p:extLst>
       <p:ext uri="{BB962C8B-B14F-4D97-AF65-F5344CB8AC3E}">
-        <p14:creationId xmlns:p14="http://schemas.microsoft.com/office/powerpoint/2010/main" val="467685491"/>
+        <p14:creationId xmlns:p14="http://schemas.microsoft.com/office/powerpoint/2010/main" val="504684143"/>
       </p:ext>
     </p:extLst>
   </p:cSld>
@@ -5394,20 +6182,18 @@
         </p:nvSpPr>
         <p:spPr>
           <a:xfrm>
-            <a:off x="4347003" y="0"/>
-            <a:ext cx="3695700" cy="849141"/>
-          </a:xfrm>
-        </p:spPr>
-        <p:txBody>
-          <a:bodyPr>
-            <a:normAutofit fontScale="90000"/>
-          </a:bodyPr>
+            <a:off x="1622854" y="-1538459"/>
+            <a:ext cx="9144000" cy="2387600"/>
+          </a:xfrm>
+        </p:spPr>
+        <p:txBody>
+          <a:bodyPr/>
           <a:lstStyle/>
           <a:p>
             <a:pPr rtl="0"/>
             <a:r>
               <a:rPr lang="en-US" dirty="0" err="1" smtClean="0"/>
-              <a:t>EditWorkout</a:t>
+              <a:t>EditRoutine</a:t>
             </a:r>
             <a:endParaRPr lang="he-IL" dirty="0"/>
           </a:p>
@@ -5421,7 +6207,7 @@
         </p:nvSpPr>
         <p:spPr>
           <a:xfrm>
-            <a:off x="4617307" y="959707"/>
+            <a:off x="4592594" y="1206843"/>
             <a:ext cx="3204519" cy="976184"/>
           </a:xfrm>
           <a:prstGeom prst="roundRect">
@@ -5448,19 +6234,11 @@
           <a:bodyPr rtlCol="1" anchor="ctr"/>
           <a:lstStyle/>
           <a:p>
-            <a:pPr rtl="0"/>
-            <a:r>
-              <a:rPr lang="he-IL" dirty="0" smtClean="0"/>
-              <a:t>מתח</a:t>
-            </a:r>
-          </a:p>
-          <a:p>
-            <a:pPr rtl="0"/>
-            <a:r>
-              <a:rPr lang="he-IL" dirty="0" smtClean="0"/>
-              <a:t>גב</a:t>
-            </a:r>
-            <a:endParaRPr lang="en-US" dirty="0" smtClean="0"/>
+            <a:pPr algn="l" rtl="0"/>
+            <a:r>
+              <a:rPr lang="en-US" dirty="0" smtClean="0"/>
+              <a:t>A-Back Biceps</a:t>
+            </a:r>
           </a:p>
         </p:txBody>
       </p:sp>
@@ -5472,7 +6250,7 @@
         </p:nvSpPr>
         <p:spPr>
           <a:xfrm>
-            <a:off x="4617307" y="2145955"/>
+            <a:off x="4592594" y="2393091"/>
             <a:ext cx="3204519" cy="1099751"/>
           </a:xfrm>
           <a:prstGeom prst="roundRect">
@@ -5499,15 +6277,10 @@
           <a:bodyPr rtlCol="1" anchor="ctr"/>
           <a:lstStyle/>
           <a:p>
-            <a:r>
-              <a:rPr lang="he-IL" dirty="0" smtClean="0"/>
-              <a:t>חתיכה במכונה</a:t>
-            </a:r>
-          </a:p>
-          <a:p>
-            <a:r>
-              <a:rPr lang="he-IL" dirty="0" smtClean="0"/>
-              <a:t>גב</a:t>
+            <a:pPr algn="l" rtl="0"/>
+            <a:r>
+              <a:rPr lang="en-US" dirty="0" smtClean="0"/>
+              <a:t>B-Chest Biceps</a:t>
             </a:r>
             <a:endParaRPr lang="en-US" dirty="0"/>
           </a:p>
@@ -5521,7 +6294,7 @@
         </p:nvSpPr>
         <p:spPr>
           <a:xfrm>
-            <a:off x="4617307" y="3455770"/>
+            <a:off x="4592594" y="3702906"/>
             <a:ext cx="3204519" cy="976184"/>
           </a:xfrm>
           <a:prstGeom prst="roundRect">
@@ -5548,18 +6321,14 @@
           <a:bodyPr rtlCol="1" anchor="ctr"/>
           <a:lstStyle/>
           <a:p>
-            <a:pPr algn="r"/>
-            <a:r>
-              <a:rPr lang="he-IL" dirty="0" err="1" smtClean="0"/>
-              <a:t>דדליפט</a:t>
-            </a:r>
-            <a:endParaRPr lang="he-IL" dirty="0" smtClean="0"/>
-          </a:p>
-          <a:p>
-            <a:pPr algn="r"/>
-            <a:r>
-              <a:rPr lang="he-IL" dirty="0" smtClean="0"/>
-              <a:t>גב</a:t>
+            <a:pPr algn="l" rtl="0"/>
+            <a:r>
+              <a:rPr lang="en-US" dirty="0" smtClean="0"/>
+              <a:t>C-Legs </a:t>
+            </a:r>
+            <a:r>
+              <a:rPr lang="en-US" dirty="0" err="1" smtClean="0"/>
+              <a:t>Soulders</a:t>
             </a:r>
             <a:endParaRPr lang="en-US" dirty="0" smtClean="0"/>
           </a:p>
@@ -5567,16 +6336,16 @@
       </p:sp>
       <p:sp>
         <p:nvSpPr>
-          <p:cNvPr id="6" name="מלבן מעוגל 5"/>
+          <p:cNvPr id="6" name="מלבן 5"/>
           <p:cNvSpPr/>
           <p:nvPr/>
         </p:nvSpPr>
         <p:spPr>
           <a:xfrm>
-            <a:off x="4617307" y="4642018"/>
-            <a:ext cx="3204519" cy="976184"/>
-          </a:xfrm>
-          <a:prstGeom prst="roundRect">
+            <a:off x="7331675" y="4803624"/>
+            <a:ext cx="465438" cy="357702"/>
+          </a:xfrm>
+          <a:prstGeom prst="rect">
             <a:avLst/>
           </a:prstGeom>
         </p:spPr>
@@ -5600,57 +6369,6 @@
           <a:bodyPr rtlCol="1" anchor="ctr"/>
           <a:lstStyle/>
           <a:p>
-            <a:pPr algn="r"/>
-            <a:r>
-              <a:rPr lang="he-IL" dirty="0" smtClean="0"/>
-              <a:t>יד קדמית בישיבה</a:t>
-            </a:r>
-          </a:p>
-          <a:p>
-            <a:pPr algn="r"/>
-            <a:r>
-              <a:rPr lang="he-IL" dirty="0" smtClean="0"/>
-              <a:t>יד קדמית</a:t>
-            </a:r>
-            <a:endParaRPr lang="en-US" dirty="0" smtClean="0"/>
-          </a:p>
-        </p:txBody>
-      </p:sp>
-      <p:sp>
-        <p:nvSpPr>
-          <p:cNvPr id="4" name="מלבן 3"/>
-          <p:cNvSpPr/>
-          <p:nvPr/>
-        </p:nvSpPr>
-        <p:spPr>
-          <a:xfrm>
-            <a:off x="7356388" y="5712936"/>
-            <a:ext cx="465438" cy="357702"/>
-          </a:xfrm>
-          <a:prstGeom prst="rect">
-            <a:avLst/>
-          </a:prstGeom>
-        </p:spPr>
-        <p:style>
-          <a:lnRef idx="2">
-            <a:schemeClr val="accent1">
-              <a:shade val="50000"/>
-            </a:schemeClr>
-          </a:lnRef>
-          <a:fillRef idx="1">
-            <a:schemeClr val="accent1"/>
-          </a:fillRef>
-          <a:effectRef idx="0">
-            <a:schemeClr val="accent1"/>
-          </a:effectRef>
-          <a:fontRef idx="minor">
-            <a:schemeClr val="lt1"/>
-          </a:fontRef>
-        </p:style>
-        <p:txBody>
-          <a:bodyPr rtlCol="1" anchor="ctr"/>
-          <a:lstStyle/>
-          <a:p>
             <a:pPr algn="ctr"/>
             <a:r>
               <a:rPr lang="en-US" dirty="0" smtClean="0"/>
@@ -5663,7 +6381,7 @@
     </p:spTree>
     <p:extLst>
       <p:ext uri="{BB962C8B-B14F-4D97-AF65-F5344CB8AC3E}">
-        <p14:creationId xmlns:p14="http://schemas.microsoft.com/office/powerpoint/2010/main" val="2668362922"/>
+        <p14:creationId xmlns:p14="http://schemas.microsoft.com/office/powerpoint/2010/main" val="467685491"/>
       </p:ext>
     </p:extLst>
   </p:cSld>
@@ -5709,8 +6427,8 @@
         </p:nvSpPr>
         <p:spPr>
           <a:xfrm>
-            <a:off x="3912973" y="0"/>
-            <a:ext cx="4654378" cy="849141"/>
+            <a:off x="4347003" y="0"/>
+            <a:ext cx="3695700" cy="849141"/>
           </a:xfrm>
         </p:spPr>
         <p:txBody>
@@ -5722,7 +6440,7 @@
             <a:pPr rtl="0"/>
             <a:r>
               <a:rPr lang="en-US" dirty="0" err="1" smtClean="0"/>
-              <a:t>ChoseExercises</a:t>
+              <a:t>EditWorkout</a:t>
             </a:r>
             <a:endParaRPr lang="he-IL" dirty="0"/>
           </a:p>
@@ -5737,14 +6455,11 @@
         <p:spPr>
           <a:xfrm>
             <a:off x="4617307" y="959707"/>
-            <a:ext cx="3204519" cy="448963"/>
+            <a:ext cx="3204519" cy="976184"/>
           </a:xfrm>
           <a:prstGeom prst="roundRect">
             <a:avLst/>
           </a:prstGeom>
-          <a:solidFill>
-            <a:schemeClr val="bg1"/>
-          </a:solidFill>
         </p:spPr>
         <p:style>
           <a:lnRef idx="2">
@@ -5768,56 +6483,15 @@
           <a:p>
             <a:pPr rtl="0"/>
             <a:r>
-              <a:rPr lang="en-US" dirty="0" err="1" smtClean="0">
-                <a:solidFill>
-                  <a:srgbClr val="FF0000"/>
-                </a:solidFill>
-              </a:rPr>
-              <a:t>comboBox</a:t>
-            </a:r>
-            <a:r>
-              <a:rPr lang="en-US" dirty="0" smtClean="0">
-                <a:solidFill>
-                  <a:srgbClr val="FF0000"/>
-                </a:solidFill>
-              </a:rPr>
-              <a:t> with </a:t>
-            </a:r>
-            <a:r>
-              <a:rPr lang="en-US" dirty="0" err="1">
-                <a:solidFill>
-                  <a:srgbClr val="FF0000"/>
-                </a:solidFill>
-              </a:rPr>
-              <a:t>m</a:t>
-            </a:r>
-            <a:r>
-              <a:rPr lang="en-US" dirty="0" err="1" smtClean="0">
-                <a:solidFill>
-                  <a:srgbClr val="FF0000"/>
-                </a:solidFill>
-              </a:rPr>
-              <a:t>ussle</a:t>
-            </a:r>
-            <a:r>
-              <a:rPr lang="en-US" dirty="0" smtClean="0">
-                <a:solidFill>
-                  <a:srgbClr val="FF0000"/>
-                </a:solidFill>
-              </a:rPr>
-              <a:t> </a:t>
-            </a:r>
-            <a:r>
-              <a:rPr lang="en-US" dirty="0" err="1" smtClean="0">
-                <a:solidFill>
-                  <a:srgbClr val="FF0000"/>
-                </a:solidFill>
-              </a:rPr>
-              <a:t>group</a:t>
-            </a:r>
-            <a:r>
-              <a:rPr lang="en-US" dirty="0" err="1" smtClean="0"/>
-              <a:t>d</a:t>
+              <a:rPr lang="he-IL" dirty="0" smtClean="0"/>
+              <a:t>מתח</a:t>
+            </a:r>
+          </a:p>
+          <a:p>
+            <a:pPr rtl="0"/>
+            <a:r>
+              <a:rPr lang="he-IL" dirty="0" smtClean="0"/>
+              <a:t>גב</a:t>
             </a:r>
             <a:endParaRPr lang="en-US" dirty="0" smtClean="0"/>
           </a:p>
@@ -5961,19 +6635,15 @@
           <a:p>
             <a:pPr algn="r"/>
             <a:r>
-              <a:rPr lang="he-IL" dirty="0" err="1" smtClean="0"/>
-              <a:t>מיליטרי</a:t>
-            </a:r>
-            <a:r>
               <a:rPr lang="he-IL" dirty="0" smtClean="0"/>
-              <a:t> פרס</a:t>
+              <a:t>יד קדמית בישיבה</a:t>
             </a:r>
           </a:p>
           <a:p>
             <a:pPr algn="r"/>
             <a:r>
               <a:rPr lang="he-IL" dirty="0" smtClean="0"/>
-              <a:t>כתפיים</a:t>
+              <a:t>יד קדמית</a:t>
             </a:r>
             <a:endParaRPr lang="en-US" dirty="0" smtClean="0"/>
           </a:p>
@@ -5987,7 +6657,7 @@
         </p:nvSpPr>
         <p:spPr>
           <a:xfrm>
-            <a:off x="7356388" y="6254901"/>
+            <a:off x="7356388" y="5712936"/>
             <a:ext cx="465438" cy="357702"/>
           </a:xfrm>
           <a:prstGeom prst="rect">
@@ -6023,99 +6693,10 @@
           </a:p>
         </p:txBody>
       </p:sp>
-      <p:sp>
-        <p:nvSpPr>
-          <p:cNvPr id="3" name="חץ למטה 2"/>
-          <p:cNvSpPr/>
-          <p:nvPr/>
-        </p:nvSpPr>
-        <p:spPr>
-          <a:xfrm>
-            <a:off x="4687329" y="1135405"/>
-            <a:ext cx="156520" cy="149698"/>
-          </a:xfrm>
-          <a:prstGeom prst="downArrow">
-            <a:avLst/>
-          </a:prstGeom>
-        </p:spPr>
-        <p:style>
-          <a:lnRef idx="2">
-            <a:schemeClr val="accent1">
-              <a:shade val="50000"/>
-            </a:schemeClr>
-          </a:lnRef>
-          <a:fillRef idx="1">
-            <a:schemeClr val="accent1"/>
-          </a:fillRef>
-          <a:effectRef idx="0">
-            <a:schemeClr val="accent1"/>
-          </a:effectRef>
-          <a:fontRef idx="minor">
-            <a:schemeClr val="lt1"/>
-          </a:fontRef>
-        </p:style>
-        <p:txBody>
-          <a:bodyPr rtlCol="1" anchor="ctr"/>
-          <a:lstStyle/>
-          <a:p>
-            <a:pPr algn="ctr"/>
-            <a:endParaRPr lang="he-IL"/>
-          </a:p>
-        </p:txBody>
-      </p:sp>
-      <p:sp>
-        <p:nvSpPr>
-          <p:cNvPr id="11" name="מלבן מעוגל 10"/>
-          <p:cNvSpPr/>
-          <p:nvPr/>
-        </p:nvSpPr>
-        <p:spPr>
-          <a:xfrm>
-            <a:off x="4287794" y="1519236"/>
-            <a:ext cx="3904735" cy="4287797"/>
-          </a:xfrm>
-          <a:prstGeom prst="roundRect">
-            <a:avLst/>
-          </a:prstGeom>
-          <a:noFill/>
-        </p:spPr>
-        <p:style>
-          <a:lnRef idx="2">
-            <a:schemeClr val="accent1">
-              <a:shade val="50000"/>
-            </a:schemeClr>
-          </a:lnRef>
-          <a:fillRef idx="1">
-            <a:schemeClr val="accent1"/>
-          </a:fillRef>
-          <a:effectRef idx="0">
-            <a:schemeClr val="accent1"/>
-          </a:effectRef>
-          <a:fontRef idx="minor">
-            <a:schemeClr val="lt1"/>
-          </a:fontRef>
-        </p:style>
-        <p:txBody>
-          <a:bodyPr rtlCol="1" anchor="t"/>
-          <a:lstStyle/>
-          <a:p>
-            <a:pPr algn="ctr"/>
-            <a:r>
-              <a:rPr lang="he-IL" dirty="0" smtClean="0">
-                <a:solidFill>
-                  <a:srgbClr val="FF0000"/>
-                </a:solidFill>
-              </a:rPr>
-              <a:t>כל התרגילים</a:t>
-            </a:r>
-            <a:endParaRPr lang="he-IL" dirty="0" smtClean="0"/>
-          </a:p>
-        </p:txBody>
-      </p:sp>
     </p:spTree>
     <p:extLst>
       <p:ext uri="{BB962C8B-B14F-4D97-AF65-F5344CB8AC3E}">
-        <p14:creationId xmlns:p14="http://schemas.microsoft.com/office/powerpoint/2010/main" val="643279091"/>
+        <p14:creationId xmlns:p14="http://schemas.microsoft.com/office/powerpoint/2010/main" val="2668362922"/>
       </p:ext>
     </p:extLst>
   </p:cSld>

</xml_diff>

<commit_message>
ExerciseAbstract  -RecycleView of all exerciseabstract related to a specific workout  -can delete an exercise without deleting an exerciseAbstract
Signed-off-by: Tamir Mishali <Tamirmishali@gmail.com>
</commit_message>
<xml_diff>
--- a/ClassArrangments.pptx
+++ b/ClassArrangments.pptx
@@ -16,11 +16,13 @@
     <p:sldId id="262" r:id="rId10"/>
     <p:sldId id="267" r:id="rId11"/>
     <p:sldId id="266" r:id="rId12"/>
-    <p:sldId id="263" r:id="rId13"/>
-    <p:sldId id="264" r:id="rId14"/>
-    <p:sldId id="265" r:id="rId15"/>
-    <p:sldId id="269" r:id="rId16"/>
-    <p:sldId id="270" r:id="rId17"/>
+    <p:sldId id="272" r:id="rId13"/>
+    <p:sldId id="273" r:id="rId14"/>
+    <p:sldId id="263" r:id="rId15"/>
+    <p:sldId id="264" r:id="rId16"/>
+    <p:sldId id="265" r:id="rId17"/>
+    <p:sldId id="269" r:id="rId18"/>
+    <p:sldId id="270" r:id="rId19"/>
   </p:sldIdLst>
   <p:sldSz cx="12192000" cy="6858000"/>
   <p:notesSz cx="6858000" cy="9144000"/>
@@ -258,7 +260,7 @@
           <a:p>
             <a:fld id="{244BBE53-A23C-433C-8B4F-282DFA43F4D8}" type="datetimeFigureOut">
               <a:rPr lang="he-IL" smtClean="0"/>
-              <a:t>א'/אדר ב/תשע"ט</a:t>
+              <a:t>ח'/אדר ב/תשע"ט</a:t>
             </a:fld>
             <a:endParaRPr lang="he-IL"/>
           </a:p>
@@ -428,7 +430,7 @@
           <a:p>
             <a:fld id="{244BBE53-A23C-433C-8B4F-282DFA43F4D8}" type="datetimeFigureOut">
               <a:rPr lang="he-IL" smtClean="0"/>
-              <a:t>א'/אדר ב/תשע"ט</a:t>
+              <a:t>ח'/אדר ב/תשע"ט</a:t>
             </a:fld>
             <a:endParaRPr lang="he-IL"/>
           </a:p>
@@ -608,7 +610,7 @@
           <a:p>
             <a:fld id="{244BBE53-A23C-433C-8B4F-282DFA43F4D8}" type="datetimeFigureOut">
               <a:rPr lang="he-IL" smtClean="0"/>
-              <a:t>א'/אדר ב/תשע"ט</a:t>
+              <a:t>ח'/אדר ב/תשע"ט</a:t>
             </a:fld>
             <a:endParaRPr lang="he-IL"/>
           </a:p>
@@ -778,7 +780,7 @@
           <a:p>
             <a:fld id="{244BBE53-A23C-433C-8B4F-282DFA43F4D8}" type="datetimeFigureOut">
               <a:rPr lang="he-IL" smtClean="0"/>
-              <a:t>א'/אדר ב/תשע"ט</a:t>
+              <a:t>ח'/אדר ב/תשע"ט</a:t>
             </a:fld>
             <a:endParaRPr lang="he-IL"/>
           </a:p>
@@ -1024,7 +1026,7 @@
           <a:p>
             <a:fld id="{244BBE53-A23C-433C-8B4F-282DFA43F4D8}" type="datetimeFigureOut">
               <a:rPr lang="he-IL" smtClean="0"/>
-              <a:t>א'/אדר ב/תשע"ט</a:t>
+              <a:t>ח'/אדר ב/תשע"ט</a:t>
             </a:fld>
             <a:endParaRPr lang="he-IL"/>
           </a:p>
@@ -1256,7 +1258,7 @@
           <a:p>
             <a:fld id="{244BBE53-A23C-433C-8B4F-282DFA43F4D8}" type="datetimeFigureOut">
               <a:rPr lang="he-IL" smtClean="0"/>
-              <a:t>א'/אדר ב/תשע"ט</a:t>
+              <a:t>ח'/אדר ב/תשע"ט</a:t>
             </a:fld>
             <a:endParaRPr lang="he-IL"/>
           </a:p>
@@ -1623,7 +1625,7 @@
           <a:p>
             <a:fld id="{244BBE53-A23C-433C-8B4F-282DFA43F4D8}" type="datetimeFigureOut">
               <a:rPr lang="he-IL" smtClean="0"/>
-              <a:t>א'/אדר ב/תשע"ט</a:t>
+              <a:t>ח'/אדר ב/תשע"ט</a:t>
             </a:fld>
             <a:endParaRPr lang="he-IL"/>
           </a:p>
@@ -1741,7 +1743,7 @@
           <a:p>
             <a:fld id="{244BBE53-A23C-433C-8B4F-282DFA43F4D8}" type="datetimeFigureOut">
               <a:rPr lang="he-IL" smtClean="0"/>
-              <a:t>א'/אדר ב/תשע"ט</a:t>
+              <a:t>ח'/אדר ב/תשע"ט</a:t>
             </a:fld>
             <a:endParaRPr lang="he-IL"/>
           </a:p>
@@ -1836,7 +1838,7 @@
           <a:p>
             <a:fld id="{244BBE53-A23C-433C-8B4F-282DFA43F4D8}" type="datetimeFigureOut">
               <a:rPr lang="he-IL" smtClean="0"/>
-              <a:t>א'/אדר ב/תשע"ט</a:t>
+              <a:t>ח'/אדר ב/תשע"ט</a:t>
             </a:fld>
             <a:endParaRPr lang="he-IL"/>
           </a:p>
@@ -2113,7 +2115,7 @@
           <a:p>
             <a:fld id="{244BBE53-A23C-433C-8B4F-282DFA43F4D8}" type="datetimeFigureOut">
               <a:rPr lang="he-IL" smtClean="0"/>
-              <a:t>א'/אדר ב/תשע"ט</a:t>
+              <a:t>ח'/אדר ב/תשע"ט</a:t>
             </a:fld>
             <a:endParaRPr lang="he-IL"/>
           </a:p>
@@ -2366,7 +2368,7 @@
           <a:p>
             <a:fld id="{244BBE53-A23C-433C-8B4F-282DFA43F4D8}" type="datetimeFigureOut">
               <a:rPr lang="he-IL" smtClean="0"/>
-              <a:t>א'/אדר ב/תשע"ט</a:t>
+              <a:t>ח'/אדר ב/תשע"ט</a:t>
             </a:fld>
             <a:endParaRPr lang="he-IL"/>
           </a:p>
@@ -2579,7 +2581,7 @@
           <a:p>
             <a:fld id="{244BBE53-A23C-433C-8B4F-282DFA43F4D8}" type="datetimeFigureOut">
               <a:rPr lang="he-IL" smtClean="0"/>
-              <a:t>א'/אדר ב/תשע"ט</a:t>
+              <a:t>ח'/אדר ב/תשע"ט</a:t>
             </a:fld>
             <a:endParaRPr lang="he-IL"/>
           </a:p>
@@ -3063,11 +3065,7 @@
             <a:pPr algn="l" rtl="0"/>
             <a:r>
               <a:rPr lang="en-US" sz="4000" dirty="0" smtClean="0"/>
-              <a:t>Date</a:t>
-            </a:r>
-            <a:r>
-              <a:rPr lang="en-US" sz="4000" dirty="0" smtClean="0"/>
-              <a:t>			</a:t>
+              <a:t>Date			</a:t>
             </a:r>
             <a:r>
               <a:rPr lang="en-US" sz="4000" dirty="0" err="1"/>
@@ -3801,20 +3799,18 @@
         </p:nvSpPr>
         <p:spPr>
           <a:xfrm>
-            <a:off x="4384074" y="295918"/>
-            <a:ext cx="3695700" cy="849141"/>
-          </a:xfrm>
-        </p:spPr>
-        <p:txBody>
-          <a:bodyPr>
-            <a:normAutofit fontScale="90000"/>
-          </a:bodyPr>
+            <a:off x="1622854" y="-1538459"/>
+            <a:ext cx="9144000" cy="2387600"/>
+          </a:xfrm>
+        </p:spPr>
+        <p:txBody>
+          <a:bodyPr/>
           <a:lstStyle/>
           <a:p>
             <a:pPr rtl="0"/>
             <a:r>
               <a:rPr lang="en-US" dirty="0" smtClean="0"/>
-              <a:t>Database</a:t>
+              <a:t>Start</a:t>
             </a:r>
             <a:endParaRPr lang="he-IL" dirty="0"/>
           </a:p>
@@ -3822,16 +3818,16 @@
       </p:sp>
       <p:sp>
         <p:nvSpPr>
-          <p:cNvPr id="9" name="מלבן 8"/>
+          <p:cNvPr id="12" name="מלבן מעוגל 11"/>
           <p:cNvSpPr/>
           <p:nvPr/>
         </p:nvSpPr>
         <p:spPr>
           <a:xfrm>
-            <a:off x="844378" y="1425147"/>
-            <a:ext cx="4304271" cy="1276864"/>
-          </a:xfrm>
-          <a:prstGeom prst="rect">
+            <a:off x="4617306" y="1928135"/>
+            <a:ext cx="3204519" cy="3550027"/>
+          </a:xfrm>
+          <a:prstGeom prst="roundRect">
             <a:avLst/>
           </a:prstGeom>
         </p:spPr>
@@ -3852,138 +3848,131 @@
           </a:fontRef>
         </p:style>
         <p:txBody>
-          <a:bodyPr rtlCol="1" anchor="t"/>
-          <a:lstStyle/>
-          <a:p>
-            <a:pPr algn="ctr" rtl="0"/>
-            <a:r>
-              <a:rPr lang="en-US" sz="4000" dirty="0" err="1" smtClean="0"/>
-              <a:t>routine_table</a:t>
-            </a:r>
-            <a:endParaRPr lang="en-US" sz="4000" dirty="0" smtClean="0"/>
-          </a:p>
+          <a:bodyPr rtlCol="1" anchor="ctr"/>
+          <a:lstStyle/>
           <a:p>
             <a:pPr algn="l" rtl="0"/>
             <a:r>
-              <a:rPr lang="en-US" sz="2400" dirty="0" smtClean="0"/>
-              <a:t>id</a:t>
-            </a:r>
-            <a:endParaRPr lang="he-IL" sz="2400" dirty="0"/>
-          </a:p>
-        </p:txBody>
-      </p:sp>
-      <p:sp>
-        <p:nvSpPr>
-          <p:cNvPr id="11" name="מלבן 10"/>
-          <p:cNvSpPr/>
+              <a:rPr lang="en-US" dirty="0" smtClean="0"/>
+              <a:t>Routine:</a:t>
+            </a:r>
+          </a:p>
+          <a:p>
+            <a:pPr algn="l" rtl="0"/>
+            <a:endParaRPr lang="en-US" dirty="0"/>
+          </a:p>
+          <a:p>
+            <a:pPr algn="l" rtl="0"/>
+            <a:endParaRPr lang="en-US" dirty="0" smtClean="0"/>
+          </a:p>
+          <a:p>
+            <a:pPr algn="l" rtl="0"/>
+            <a:r>
+              <a:rPr lang="en-US" dirty="0" smtClean="0"/>
+              <a:t>Workout:</a:t>
+            </a:r>
+          </a:p>
+          <a:p>
+            <a:pPr algn="l" rtl="0"/>
+            <a:endParaRPr lang="en-US" dirty="0"/>
+          </a:p>
+          <a:p>
+            <a:pPr algn="l" rtl="0"/>
+            <a:endParaRPr lang="en-US" dirty="0" smtClean="0"/>
+          </a:p>
+        </p:txBody>
+      </p:sp>
+      <p:sp>
+        <p:nvSpPr>
+          <p:cNvPr id="3" name="TextBox 2"/>
+          <p:cNvSpPr txBox="1"/>
           <p:nvPr/>
         </p:nvSpPr>
         <p:spPr>
           <a:xfrm>
-            <a:off x="6044513" y="1425148"/>
-            <a:ext cx="4326925" cy="1276864"/>
+            <a:off x="4695567" y="1512347"/>
+            <a:ext cx="2059459" cy="369332"/>
           </a:xfrm>
           <a:prstGeom prst="rect">
             <a:avLst/>
           </a:prstGeom>
+          <a:noFill/>
+        </p:spPr>
+        <p:txBody>
+          <a:bodyPr wrap="square" rtlCol="1">
+            <a:spAutoFit/>
+          </a:bodyPr>
+          <a:lstStyle/>
+          <a:p>
+            <a:r>
+              <a:rPr lang="en-US" dirty="0" err="1" smtClean="0"/>
+              <a:t>DialogBox</a:t>
+            </a:r>
+            <a:r>
+              <a:rPr lang="en-US" dirty="0" smtClean="0"/>
+              <a:t> </a:t>
+            </a:r>
+            <a:endParaRPr lang="he-IL" dirty="0"/>
+          </a:p>
+        </p:txBody>
+      </p:sp>
+      <p:sp>
+        <p:nvSpPr>
+          <p:cNvPr id="5" name="מלבן 4"/>
+          <p:cNvSpPr/>
+          <p:nvPr/>
+        </p:nvSpPr>
+        <p:spPr>
+          <a:xfrm>
+            <a:off x="5725297" y="2861150"/>
+            <a:ext cx="1548713" cy="551936"/>
+          </a:xfrm>
+          <a:prstGeom prst="rect">
+            <a:avLst/>
+          </a:prstGeom>
         </p:spPr>
         <p:style>
           <a:lnRef idx="2">
-            <a:schemeClr val="accent1">
+            <a:schemeClr val="accent2">
               <a:shade val="50000"/>
             </a:schemeClr>
           </a:lnRef>
           <a:fillRef idx="1">
-            <a:schemeClr val="accent1"/>
+            <a:schemeClr val="accent2"/>
           </a:fillRef>
           <a:effectRef idx="0">
-            <a:schemeClr val="accent1"/>
+            <a:schemeClr val="accent2"/>
           </a:effectRef>
           <a:fontRef idx="minor">
             <a:schemeClr val="lt1"/>
           </a:fontRef>
         </p:style>
         <p:txBody>
-          <a:bodyPr rtlCol="1" anchor="t"/>
-          <a:lstStyle/>
-          <a:p>
-            <a:pPr algn="ctr" rtl="0"/>
-            <a:r>
-              <a:rPr lang="en-US" sz="4000" dirty="0" err="1" smtClean="0"/>
-              <a:t>workout_table</a:t>
-            </a:r>
-            <a:endParaRPr lang="en-US" sz="4000" dirty="0" smtClean="0"/>
-          </a:p>
-          <a:p>
-            <a:pPr algn="l" rtl="0"/>
-            <a:r>
-              <a:rPr lang="en-US" sz="2400" dirty="0" smtClean="0"/>
-              <a:t>id        </a:t>
-            </a:r>
-            <a:r>
-              <a:rPr lang="en-US" sz="2400" dirty="0" err="1" smtClean="0"/>
-              <a:t>Id_routine</a:t>
-            </a:r>
-            <a:endParaRPr lang="he-IL" sz="2000" dirty="0"/>
-          </a:p>
-        </p:txBody>
-      </p:sp>
-      <p:sp>
-        <p:nvSpPr>
-          <p:cNvPr id="13" name="מלבן 12"/>
-          <p:cNvSpPr/>
-          <p:nvPr/>
-        </p:nvSpPr>
-        <p:spPr>
-          <a:xfrm>
-            <a:off x="593124" y="1145059"/>
-            <a:ext cx="11277600" cy="4522573"/>
-          </a:xfrm>
-          <a:prstGeom prst="rect">
-            <a:avLst/>
-          </a:prstGeom>
-          <a:noFill/>
-        </p:spPr>
-        <p:style>
-          <a:lnRef idx="2">
-            <a:schemeClr val="accent1">
-              <a:shade val="50000"/>
-            </a:schemeClr>
-          </a:lnRef>
-          <a:fillRef idx="1">
-            <a:schemeClr val="accent1"/>
-          </a:fillRef>
-          <a:effectRef idx="0">
-            <a:schemeClr val="accent1"/>
-          </a:effectRef>
-          <a:fontRef idx="minor">
-            <a:schemeClr val="lt1"/>
-          </a:fontRef>
-        </p:style>
-        <p:txBody>
-          <a:bodyPr rtlCol="1" anchor="t"/>
-          <a:lstStyle/>
-          <a:p>
-            <a:pPr algn="l" rtl="0"/>
-            <a:endParaRPr lang="he-IL" sz="4000" dirty="0"/>
+          <a:bodyPr rtlCol="1" anchor="ctr"/>
+          <a:lstStyle/>
+          <a:p>
+            <a:pPr algn="ctr"/>
+            <a:r>
+              <a:rPr lang="en-US" dirty="0" smtClean="0"/>
+              <a:t>Default: most recent routine</a:t>
+            </a:r>
+            <a:endParaRPr lang="he-IL" dirty="0"/>
           </a:p>
         </p:txBody>
       </p:sp>
       <p:cxnSp>
         <p:nvCxnSpPr>
-          <p:cNvPr id="6" name="מחבר מרפקי 5"/>
+          <p:cNvPr id="11" name="מחבר חץ ישר 10"/>
           <p:cNvCxnSpPr/>
           <p:nvPr/>
         </p:nvCxnSpPr>
         <p:spPr>
           <a:xfrm>
-            <a:off x="1079157" y="2702011"/>
-            <a:ext cx="6326659" cy="436605"/>
-          </a:xfrm>
-          <a:prstGeom prst="bentConnector3">
-            <a:avLst>
-              <a:gd name="adj1" fmla="val -391"/>
-            </a:avLst>
+            <a:off x="7158681" y="3137118"/>
+            <a:ext cx="8238" cy="207418"/>
+          </a:xfrm>
+          <a:prstGeom prst="straightConnector1">
+            <a:avLst/>
           </a:prstGeom>
           <a:ln>
             <a:tailEnd type="triangle"/>
@@ -4004,16 +3993,48 @@
           </a:fontRef>
         </p:style>
       </p:cxnSp>
+      <p:sp>
+        <p:nvSpPr>
+          <p:cNvPr id="14" name="TextBox 13"/>
+          <p:cNvSpPr txBox="1"/>
+          <p:nvPr/>
+        </p:nvSpPr>
+        <p:spPr>
+          <a:xfrm>
+            <a:off x="8040130" y="2831763"/>
+            <a:ext cx="2059459" cy="646331"/>
+          </a:xfrm>
+          <a:prstGeom prst="rect">
+            <a:avLst/>
+          </a:prstGeom>
+          <a:noFill/>
+        </p:spPr>
+        <p:txBody>
+          <a:bodyPr wrap="square" rtlCol="1">
+            <a:spAutoFit/>
+          </a:bodyPr>
+          <a:lstStyle/>
+          <a:p>
+            <a:r>
+              <a:rPr lang="en-US" dirty="0" smtClean="0"/>
+              <a:t>The arrow is to change routine</a:t>
+            </a:r>
+            <a:endParaRPr lang="he-IL" dirty="0"/>
+          </a:p>
+        </p:txBody>
+      </p:sp>
       <p:cxnSp>
         <p:nvCxnSpPr>
-          <p:cNvPr id="10" name="מחבר חץ ישר 9"/>
-          <p:cNvCxnSpPr/>
+          <p:cNvPr id="16" name="מחבר חץ ישר 15"/>
+          <p:cNvCxnSpPr>
+            <a:endCxn id="14" idx="1"/>
+          </p:cNvCxnSpPr>
           <p:nvPr/>
         </p:nvCxnSpPr>
         <p:spPr>
-          <a:xfrm flipH="1" flipV="1">
-            <a:off x="7405816" y="2702011"/>
-            <a:ext cx="8238" cy="436605"/>
+          <a:xfrm flipV="1">
+            <a:off x="7166919" y="3154929"/>
+            <a:ext cx="873211" cy="85898"/>
           </a:xfrm>
           <a:prstGeom prst="straightConnector1">
             <a:avLst/>
@@ -4024,13 +4045,210 @@
         </p:spPr>
         <p:style>
           <a:lnRef idx="1">
-            <a:schemeClr val="accent1"/>
+            <a:schemeClr val="dk1"/>
           </a:lnRef>
           <a:fillRef idx="0">
-            <a:schemeClr val="accent1"/>
+            <a:schemeClr val="dk1"/>
           </a:fillRef>
           <a:effectRef idx="0">
-            <a:schemeClr val="accent1"/>
+            <a:schemeClr val="dk1"/>
+          </a:effectRef>
+          <a:fontRef idx="minor">
+            <a:schemeClr val="tx1"/>
+          </a:fontRef>
+        </p:style>
+      </p:cxnSp>
+      <p:sp>
+        <p:nvSpPr>
+          <p:cNvPr id="17" name="מלבן מעוגל 16"/>
+          <p:cNvSpPr/>
+          <p:nvPr/>
+        </p:nvSpPr>
+        <p:spPr>
+          <a:xfrm>
+            <a:off x="4812959" y="4159038"/>
+            <a:ext cx="930876" cy="362465"/>
+          </a:xfrm>
+          <a:prstGeom prst="roundRect">
+            <a:avLst/>
+          </a:prstGeom>
+        </p:spPr>
+        <p:style>
+          <a:lnRef idx="2">
+            <a:schemeClr val="accent4">
+              <a:shade val="50000"/>
+            </a:schemeClr>
+          </a:lnRef>
+          <a:fillRef idx="1">
+            <a:schemeClr val="accent4"/>
+          </a:fillRef>
+          <a:effectRef idx="0">
+            <a:schemeClr val="accent4"/>
+          </a:effectRef>
+          <a:fontRef idx="minor">
+            <a:schemeClr val="lt1"/>
+          </a:fontRef>
+        </p:style>
+        <p:txBody>
+          <a:bodyPr rtlCol="1" anchor="ctr"/>
+          <a:lstStyle/>
+          <a:p>
+            <a:pPr algn="ctr"/>
+            <a:r>
+              <a:rPr lang="en-US" dirty="0" smtClean="0"/>
+              <a:t>A</a:t>
+            </a:r>
+            <a:endParaRPr lang="he-IL" dirty="0"/>
+          </a:p>
+        </p:txBody>
+      </p:sp>
+      <p:sp>
+        <p:nvSpPr>
+          <p:cNvPr id="18" name="מלבן מעוגל 17"/>
+          <p:cNvSpPr/>
+          <p:nvPr/>
+        </p:nvSpPr>
+        <p:spPr>
+          <a:xfrm>
+            <a:off x="5815914" y="4159037"/>
+            <a:ext cx="930876" cy="362465"/>
+          </a:xfrm>
+          <a:prstGeom prst="roundRect">
+            <a:avLst/>
+          </a:prstGeom>
+        </p:spPr>
+        <p:style>
+          <a:lnRef idx="2">
+            <a:schemeClr val="accent4">
+              <a:shade val="50000"/>
+            </a:schemeClr>
+          </a:lnRef>
+          <a:fillRef idx="1">
+            <a:schemeClr val="accent4"/>
+          </a:fillRef>
+          <a:effectRef idx="0">
+            <a:schemeClr val="accent4"/>
+          </a:effectRef>
+          <a:fontRef idx="minor">
+            <a:schemeClr val="lt1"/>
+          </a:fontRef>
+        </p:style>
+        <p:txBody>
+          <a:bodyPr rtlCol="1" anchor="ctr"/>
+          <a:lstStyle/>
+          <a:p>
+            <a:pPr algn="ctr"/>
+            <a:r>
+              <a:rPr lang="en-US" dirty="0" smtClean="0"/>
+              <a:t>B</a:t>
+            </a:r>
+            <a:endParaRPr lang="he-IL" dirty="0"/>
+          </a:p>
+        </p:txBody>
+      </p:sp>
+      <p:sp>
+        <p:nvSpPr>
+          <p:cNvPr id="19" name="מלבן מעוגל 18"/>
+          <p:cNvSpPr/>
+          <p:nvPr/>
+        </p:nvSpPr>
+        <p:spPr>
+          <a:xfrm>
+            <a:off x="6818869" y="4159036"/>
+            <a:ext cx="930876" cy="362465"/>
+          </a:xfrm>
+          <a:prstGeom prst="roundRect">
+            <a:avLst/>
+          </a:prstGeom>
+        </p:spPr>
+        <p:style>
+          <a:lnRef idx="2">
+            <a:schemeClr val="accent6">
+              <a:shade val="50000"/>
+            </a:schemeClr>
+          </a:lnRef>
+          <a:fillRef idx="1">
+            <a:schemeClr val="accent6"/>
+          </a:fillRef>
+          <a:effectRef idx="0">
+            <a:schemeClr val="accent6"/>
+          </a:effectRef>
+          <a:fontRef idx="minor">
+            <a:schemeClr val="lt1"/>
+          </a:fontRef>
+        </p:style>
+        <p:txBody>
+          <a:bodyPr rtlCol="1" anchor="ctr"/>
+          <a:lstStyle/>
+          <a:p>
+            <a:pPr algn="ctr"/>
+            <a:r>
+              <a:rPr lang="en-US" dirty="0" smtClean="0"/>
+              <a:t>C</a:t>
+            </a:r>
+            <a:endParaRPr lang="he-IL" dirty="0"/>
+          </a:p>
+        </p:txBody>
+      </p:sp>
+      <p:sp>
+        <p:nvSpPr>
+          <p:cNvPr id="20" name="TextBox 19"/>
+          <p:cNvSpPr txBox="1"/>
+          <p:nvPr/>
+        </p:nvSpPr>
+        <p:spPr>
+          <a:xfrm>
+            <a:off x="8622956" y="3918979"/>
+            <a:ext cx="2059459" cy="923330"/>
+          </a:xfrm>
+          <a:prstGeom prst="rect">
+            <a:avLst/>
+          </a:prstGeom>
+          <a:noFill/>
+        </p:spPr>
+        <p:txBody>
+          <a:bodyPr wrap="square" rtlCol="1">
+            <a:spAutoFit/>
+          </a:bodyPr>
+          <a:lstStyle/>
+          <a:p>
+            <a:r>
+              <a:rPr lang="en-US" dirty="0" smtClean="0"/>
+              <a:t>Least updated workout in selected routine is marked</a:t>
+            </a:r>
+            <a:endParaRPr lang="he-IL" dirty="0"/>
+          </a:p>
+        </p:txBody>
+      </p:sp>
+      <p:cxnSp>
+        <p:nvCxnSpPr>
+          <p:cNvPr id="21" name="מחבר חץ ישר 20"/>
+          <p:cNvCxnSpPr>
+            <a:endCxn id="20" idx="1"/>
+          </p:cNvCxnSpPr>
+          <p:nvPr/>
+        </p:nvCxnSpPr>
+        <p:spPr>
+          <a:xfrm>
+            <a:off x="7749745" y="4328043"/>
+            <a:ext cx="873211" cy="52601"/>
+          </a:xfrm>
+          <a:prstGeom prst="straightConnector1">
+            <a:avLst/>
+          </a:prstGeom>
+          <a:ln>
+            <a:tailEnd type="triangle"/>
+          </a:ln>
+        </p:spPr>
+        <p:style>
+          <a:lnRef idx="1">
+            <a:schemeClr val="dk1"/>
+          </a:lnRef>
+          <a:fillRef idx="0">
+            <a:schemeClr val="dk1"/>
+          </a:fillRef>
+          <a:effectRef idx="0">
+            <a:schemeClr val="dk1"/>
           </a:effectRef>
           <a:fontRef idx="minor">
             <a:schemeClr val="tx1"/>
@@ -4040,7 +4258,7 @@
     </p:spTree>
     <p:extLst>
       <p:ext uri="{BB962C8B-B14F-4D97-AF65-F5344CB8AC3E}">
-        <p14:creationId xmlns:p14="http://schemas.microsoft.com/office/powerpoint/2010/main" val="777559622"/>
+        <p14:creationId xmlns:p14="http://schemas.microsoft.com/office/powerpoint/2010/main" val="3174635760"/>
       </p:ext>
     </p:extLst>
   </p:cSld>
@@ -4086,20 +4304,18 @@
         </p:nvSpPr>
         <p:spPr>
           <a:xfrm>
-            <a:off x="3915804" y="0"/>
-            <a:ext cx="5077083" cy="849141"/>
-          </a:xfrm>
-        </p:spPr>
-        <p:txBody>
-          <a:bodyPr>
-            <a:normAutofit fontScale="90000"/>
-          </a:bodyPr>
+            <a:off x="1622854" y="-1538459"/>
+            <a:ext cx="9144000" cy="2387600"/>
+          </a:xfrm>
+        </p:spPr>
+        <p:txBody>
+          <a:bodyPr/>
           <a:lstStyle/>
           <a:p>
             <a:pPr rtl="0"/>
             <a:r>
-              <a:rPr lang="en-US" dirty="0" err="1" smtClean="0"/>
-              <a:t>routine_table</a:t>
+              <a:rPr lang="en-US" dirty="0" smtClean="0"/>
+              <a:t>Start</a:t>
             </a:r>
             <a:endParaRPr lang="he-IL" dirty="0"/>
           </a:p>
@@ -4107,16 +4323,16 @@
       </p:sp>
       <p:sp>
         <p:nvSpPr>
-          <p:cNvPr id="9" name="מלבן 8"/>
+          <p:cNvPr id="12" name="מלבן מעוגל 11"/>
           <p:cNvSpPr/>
           <p:nvPr/>
         </p:nvSpPr>
         <p:spPr>
           <a:xfrm>
-            <a:off x="1820562" y="1326292"/>
-            <a:ext cx="9267568" cy="5000367"/>
-          </a:xfrm>
-          <a:prstGeom prst="rect">
+            <a:off x="4617306" y="1928135"/>
+            <a:ext cx="3204519" cy="3550027"/>
+          </a:xfrm>
+          <a:prstGeom prst="roundRect">
             <a:avLst/>
           </a:prstGeom>
         </p:spPr>
@@ -4137,30 +4353,417 @@
           </a:fontRef>
         </p:style>
         <p:txBody>
-          <a:bodyPr rtlCol="1" anchor="t"/>
+          <a:bodyPr rtlCol="1" anchor="ctr"/>
           <a:lstStyle/>
           <a:p>
             <a:pPr algn="l" rtl="0"/>
             <a:r>
-              <a:rPr lang="en-US" sz="4000" dirty="0" smtClean="0"/>
-              <a:t>		    Id		</a:t>
-            </a:r>
-            <a:r>
-              <a:rPr lang="en-US" sz="4000" dirty="0" smtClean="0"/>
-              <a:t>name	date</a:t>
-            </a:r>
-            <a:r>
-              <a:rPr lang="en-US" sz="4000" dirty="0" smtClean="0"/>
-              <a:t>			</a:t>
-            </a:r>
-            <a:endParaRPr lang="he-IL" sz="4000" dirty="0"/>
-          </a:p>
-        </p:txBody>
-      </p:sp>
+              <a:rPr lang="en-US" dirty="0" smtClean="0"/>
+              <a:t>Routine:</a:t>
+            </a:r>
+          </a:p>
+          <a:p>
+            <a:pPr algn="l" rtl="0"/>
+            <a:endParaRPr lang="en-US" dirty="0"/>
+          </a:p>
+          <a:p>
+            <a:pPr algn="l" rtl="0"/>
+            <a:endParaRPr lang="en-US" dirty="0" smtClean="0"/>
+          </a:p>
+          <a:p>
+            <a:pPr algn="l" rtl="0"/>
+            <a:r>
+              <a:rPr lang="en-US" dirty="0" smtClean="0"/>
+              <a:t>Workout:</a:t>
+            </a:r>
+          </a:p>
+          <a:p>
+            <a:pPr algn="l" rtl="0"/>
+            <a:endParaRPr lang="en-US" dirty="0"/>
+          </a:p>
+          <a:p>
+            <a:pPr algn="l" rtl="0"/>
+            <a:endParaRPr lang="en-US" dirty="0" smtClean="0"/>
+          </a:p>
+        </p:txBody>
+      </p:sp>
+      <p:sp>
+        <p:nvSpPr>
+          <p:cNvPr id="3" name="TextBox 2"/>
+          <p:cNvSpPr txBox="1"/>
+          <p:nvPr/>
+        </p:nvSpPr>
+        <p:spPr>
+          <a:xfrm>
+            <a:off x="4695567" y="1512347"/>
+            <a:ext cx="2059459" cy="369332"/>
+          </a:xfrm>
+          <a:prstGeom prst="rect">
+            <a:avLst/>
+          </a:prstGeom>
+          <a:noFill/>
+        </p:spPr>
+        <p:txBody>
+          <a:bodyPr wrap="square" rtlCol="1">
+            <a:spAutoFit/>
+          </a:bodyPr>
+          <a:lstStyle/>
+          <a:p>
+            <a:r>
+              <a:rPr lang="en-US" dirty="0" err="1" smtClean="0"/>
+              <a:t>DialogBox</a:t>
+            </a:r>
+            <a:r>
+              <a:rPr lang="en-US" dirty="0" smtClean="0"/>
+              <a:t> </a:t>
+            </a:r>
+            <a:endParaRPr lang="he-IL" dirty="0"/>
+          </a:p>
+        </p:txBody>
+      </p:sp>
+      <p:sp>
+        <p:nvSpPr>
+          <p:cNvPr id="5" name="מלבן 4"/>
+          <p:cNvSpPr/>
+          <p:nvPr/>
+        </p:nvSpPr>
+        <p:spPr>
+          <a:xfrm>
+            <a:off x="5725297" y="2861150"/>
+            <a:ext cx="1548713" cy="551936"/>
+          </a:xfrm>
+          <a:prstGeom prst="rect">
+            <a:avLst/>
+          </a:prstGeom>
+        </p:spPr>
+        <p:style>
+          <a:lnRef idx="2">
+            <a:schemeClr val="accent2">
+              <a:shade val="50000"/>
+            </a:schemeClr>
+          </a:lnRef>
+          <a:fillRef idx="1">
+            <a:schemeClr val="accent2"/>
+          </a:fillRef>
+          <a:effectRef idx="0">
+            <a:schemeClr val="accent2"/>
+          </a:effectRef>
+          <a:fontRef idx="minor">
+            <a:schemeClr val="lt1"/>
+          </a:fontRef>
+        </p:style>
+        <p:txBody>
+          <a:bodyPr rtlCol="1" anchor="ctr"/>
+          <a:lstStyle/>
+          <a:p>
+            <a:pPr algn="ctr"/>
+            <a:r>
+              <a:rPr lang="en-US" dirty="0" smtClean="0"/>
+              <a:t>Default: most recent routine</a:t>
+            </a:r>
+            <a:endParaRPr lang="he-IL" dirty="0"/>
+          </a:p>
+        </p:txBody>
+      </p:sp>
+      <p:cxnSp>
+        <p:nvCxnSpPr>
+          <p:cNvPr id="11" name="מחבר חץ ישר 10"/>
+          <p:cNvCxnSpPr/>
+          <p:nvPr/>
+        </p:nvCxnSpPr>
+        <p:spPr>
+          <a:xfrm>
+            <a:off x="7158681" y="3137118"/>
+            <a:ext cx="8238" cy="207418"/>
+          </a:xfrm>
+          <a:prstGeom prst="straightConnector1">
+            <a:avLst/>
+          </a:prstGeom>
+          <a:ln>
+            <a:tailEnd type="triangle"/>
+          </a:ln>
+        </p:spPr>
+        <p:style>
+          <a:lnRef idx="1">
+            <a:schemeClr val="accent1"/>
+          </a:lnRef>
+          <a:fillRef idx="0">
+            <a:schemeClr val="accent1"/>
+          </a:fillRef>
+          <a:effectRef idx="0">
+            <a:schemeClr val="accent1"/>
+          </a:effectRef>
+          <a:fontRef idx="minor">
+            <a:schemeClr val="tx1"/>
+          </a:fontRef>
+        </p:style>
+      </p:cxnSp>
+      <p:sp>
+        <p:nvSpPr>
+          <p:cNvPr id="14" name="TextBox 13"/>
+          <p:cNvSpPr txBox="1"/>
+          <p:nvPr/>
+        </p:nvSpPr>
+        <p:spPr>
+          <a:xfrm>
+            <a:off x="8040130" y="2831763"/>
+            <a:ext cx="2059459" cy="646331"/>
+          </a:xfrm>
+          <a:prstGeom prst="rect">
+            <a:avLst/>
+          </a:prstGeom>
+          <a:noFill/>
+        </p:spPr>
+        <p:txBody>
+          <a:bodyPr wrap="square" rtlCol="1">
+            <a:spAutoFit/>
+          </a:bodyPr>
+          <a:lstStyle/>
+          <a:p>
+            <a:r>
+              <a:rPr lang="en-US" dirty="0" smtClean="0"/>
+              <a:t>The arrow is to change routine</a:t>
+            </a:r>
+            <a:endParaRPr lang="he-IL" dirty="0"/>
+          </a:p>
+        </p:txBody>
+      </p:sp>
+      <p:cxnSp>
+        <p:nvCxnSpPr>
+          <p:cNvPr id="16" name="מחבר חץ ישר 15"/>
+          <p:cNvCxnSpPr>
+            <a:endCxn id="14" idx="1"/>
+          </p:cNvCxnSpPr>
+          <p:nvPr/>
+        </p:nvCxnSpPr>
+        <p:spPr>
+          <a:xfrm flipV="1">
+            <a:off x="7166919" y="3154929"/>
+            <a:ext cx="873211" cy="85898"/>
+          </a:xfrm>
+          <a:prstGeom prst="straightConnector1">
+            <a:avLst/>
+          </a:prstGeom>
+          <a:ln>
+            <a:tailEnd type="triangle"/>
+          </a:ln>
+        </p:spPr>
+        <p:style>
+          <a:lnRef idx="1">
+            <a:schemeClr val="dk1"/>
+          </a:lnRef>
+          <a:fillRef idx="0">
+            <a:schemeClr val="dk1"/>
+          </a:fillRef>
+          <a:effectRef idx="0">
+            <a:schemeClr val="dk1"/>
+          </a:effectRef>
+          <a:fontRef idx="minor">
+            <a:schemeClr val="tx1"/>
+          </a:fontRef>
+        </p:style>
+      </p:cxnSp>
+      <p:sp>
+        <p:nvSpPr>
+          <p:cNvPr id="17" name="מלבן מעוגל 16"/>
+          <p:cNvSpPr/>
+          <p:nvPr/>
+        </p:nvSpPr>
+        <p:spPr>
+          <a:xfrm>
+            <a:off x="4812959" y="4159038"/>
+            <a:ext cx="930876" cy="362465"/>
+          </a:xfrm>
+          <a:prstGeom prst="roundRect">
+            <a:avLst/>
+          </a:prstGeom>
+        </p:spPr>
+        <p:style>
+          <a:lnRef idx="2">
+            <a:schemeClr val="accent4">
+              <a:shade val="50000"/>
+            </a:schemeClr>
+          </a:lnRef>
+          <a:fillRef idx="1">
+            <a:schemeClr val="accent4"/>
+          </a:fillRef>
+          <a:effectRef idx="0">
+            <a:schemeClr val="accent4"/>
+          </a:effectRef>
+          <a:fontRef idx="minor">
+            <a:schemeClr val="lt1"/>
+          </a:fontRef>
+        </p:style>
+        <p:txBody>
+          <a:bodyPr rtlCol="1" anchor="ctr"/>
+          <a:lstStyle/>
+          <a:p>
+            <a:pPr algn="ctr"/>
+            <a:r>
+              <a:rPr lang="en-US" dirty="0" smtClean="0"/>
+              <a:t>A</a:t>
+            </a:r>
+            <a:endParaRPr lang="he-IL" dirty="0"/>
+          </a:p>
+        </p:txBody>
+      </p:sp>
+      <p:sp>
+        <p:nvSpPr>
+          <p:cNvPr id="18" name="מלבן מעוגל 17"/>
+          <p:cNvSpPr/>
+          <p:nvPr/>
+        </p:nvSpPr>
+        <p:spPr>
+          <a:xfrm>
+            <a:off x="5815914" y="4159037"/>
+            <a:ext cx="930876" cy="362465"/>
+          </a:xfrm>
+          <a:prstGeom prst="roundRect">
+            <a:avLst/>
+          </a:prstGeom>
+        </p:spPr>
+        <p:style>
+          <a:lnRef idx="2">
+            <a:schemeClr val="accent4">
+              <a:shade val="50000"/>
+            </a:schemeClr>
+          </a:lnRef>
+          <a:fillRef idx="1">
+            <a:schemeClr val="accent4"/>
+          </a:fillRef>
+          <a:effectRef idx="0">
+            <a:schemeClr val="accent4"/>
+          </a:effectRef>
+          <a:fontRef idx="minor">
+            <a:schemeClr val="lt1"/>
+          </a:fontRef>
+        </p:style>
+        <p:txBody>
+          <a:bodyPr rtlCol="1" anchor="ctr"/>
+          <a:lstStyle/>
+          <a:p>
+            <a:pPr algn="ctr"/>
+            <a:r>
+              <a:rPr lang="en-US" dirty="0" smtClean="0"/>
+              <a:t>B</a:t>
+            </a:r>
+            <a:endParaRPr lang="he-IL" dirty="0"/>
+          </a:p>
+        </p:txBody>
+      </p:sp>
+      <p:sp>
+        <p:nvSpPr>
+          <p:cNvPr id="19" name="מלבן מעוגל 18"/>
+          <p:cNvSpPr/>
+          <p:nvPr/>
+        </p:nvSpPr>
+        <p:spPr>
+          <a:xfrm>
+            <a:off x="6818869" y="4159036"/>
+            <a:ext cx="930876" cy="362465"/>
+          </a:xfrm>
+          <a:prstGeom prst="roundRect">
+            <a:avLst/>
+          </a:prstGeom>
+        </p:spPr>
+        <p:style>
+          <a:lnRef idx="2">
+            <a:schemeClr val="accent6">
+              <a:shade val="50000"/>
+            </a:schemeClr>
+          </a:lnRef>
+          <a:fillRef idx="1">
+            <a:schemeClr val="accent6"/>
+          </a:fillRef>
+          <a:effectRef idx="0">
+            <a:schemeClr val="accent6"/>
+          </a:effectRef>
+          <a:fontRef idx="minor">
+            <a:schemeClr val="lt1"/>
+          </a:fontRef>
+        </p:style>
+        <p:txBody>
+          <a:bodyPr rtlCol="1" anchor="ctr"/>
+          <a:lstStyle/>
+          <a:p>
+            <a:pPr algn="ctr"/>
+            <a:r>
+              <a:rPr lang="en-US" dirty="0" smtClean="0"/>
+              <a:t>C</a:t>
+            </a:r>
+            <a:endParaRPr lang="he-IL" dirty="0"/>
+          </a:p>
+        </p:txBody>
+      </p:sp>
+      <p:sp>
+        <p:nvSpPr>
+          <p:cNvPr id="20" name="TextBox 19"/>
+          <p:cNvSpPr txBox="1"/>
+          <p:nvPr/>
+        </p:nvSpPr>
+        <p:spPr>
+          <a:xfrm>
+            <a:off x="8622956" y="3918979"/>
+            <a:ext cx="2059459" cy="923330"/>
+          </a:xfrm>
+          <a:prstGeom prst="rect">
+            <a:avLst/>
+          </a:prstGeom>
+          <a:noFill/>
+        </p:spPr>
+        <p:txBody>
+          <a:bodyPr wrap="square" rtlCol="1">
+            <a:spAutoFit/>
+          </a:bodyPr>
+          <a:lstStyle/>
+          <a:p>
+            <a:r>
+              <a:rPr lang="en-US" dirty="0" smtClean="0"/>
+              <a:t>Least updated workout in selected routine is marked</a:t>
+            </a:r>
+            <a:endParaRPr lang="he-IL" dirty="0"/>
+          </a:p>
+        </p:txBody>
+      </p:sp>
+      <p:cxnSp>
+        <p:nvCxnSpPr>
+          <p:cNvPr id="21" name="מחבר חץ ישר 20"/>
+          <p:cNvCxnSpPr>
+            <a:endCxn id="20" idx="1"/>
+          </p:cNvCxnSpPr>
+          <p:nvPr/>
+        </p:nvCxnSpPr>
+        <p:spPr>
+          <a:xfrm>
+            <a:off x="7749745" y="4328043"/>
+            <a:ext cx="873211" cy="52601"/>
+          </a:xfrm>
+          <a:prstGeom prst="straightConnector1">
+            <a:avLst/>
+          </a:prstGeom>
+          <a:ln>
+            <a:tailEnd type="triangle"/>
+          </a:ln>
+        </p:spPr>
+        <p:style>
+          <a:lnRef idx="1">
+            <a:schemeClr val="dk1"/>
+          </a:lnRef>
+          <a:fillRef idx="0">
+            <a:schemeClr val="dk1"/>
+          </a:fillRef>
+          <a:effectRef idx="0">
+            <a:schemeClr val="dk1"/>
+          </a:effectRef>
+          <a:fontRef idx="minor">
+            <a:schemeClr val="tx1"/>
+          </a:fontRef>
+        </p:style>
+      </p:cxnSp>
     </p:spTree>
     <p:extLst>
       <p:ext uri="{BB962C8B-B14F-4D97-AF65-F5344CB8AC3E}">
-        <p14:creationId xmlns:p14="http://schemas.microsoft.com/office/powerpoint/2010/main" val="763200124"/>
+        <p14:creationId xmlns:p14="http://schemas.microsoft.com/office/powerpoint/2010/main" val="2658677774"/>
       </p:ext>
     </p:extLst>
   </p:cSld>
@@ -4206,8 +4809,8 @@
         </p:nvSpPr>
         <p:spPr>
           <a:xfrm>
-            <a:off x="3899329" y="57665"/>
-            <a:ext cx="5110033" cy="849141"/>
+            <a:off x="4384074" y="295918"/>
+            <a:ext cx="3695700" cy="849141"/>
           </a:xfrm>
         </p:spPr>
         <p:txBody>
@@ -4218,12 +4821,8 @@
           <a:p>
             <a:pPr rtl="0"/>
             <a:r>
-              <a:rPr lang="en-US" dirty="0" err="1"/>
-              <a:t>w</a:t>
-            </a:r>
-            <a:r>
-              <a:rPr lang="en-US" dirty="0" err="1" smtClean="0"/>
-              <a:t>orkout_history</a:t>
+              <a:rPr lang="en-US" dirty="0" smtClean="0"/>
+              <a:t>Database</a:t>
             </a:r>
             <a:endParaRPr lang="he-IL" dirty="0"/>
           </a:p>
@@ -4237,8 +4836,8 @@
         </p:nvSpPr>
         <p:spPr>
           <a:xfrm>
-            <a:off x="1820562" y="1326292"/>
-            <a:ext cx="9267568" cy="5000367"/>
+            <a:off x="844378" y="1425147"/>
+            <a:ext cx="4304271" cy="1276864"/>
           </a:xfrm>
           <a:prstGeom prst="rect">
             <a:avLst/>
@@ -4264,42 +4863,192 @@
           <a:bodyPr rtlCol="1" anchor="t"/>
           <a:lstStyle/>
           <a:p>
+            <a:pPr algn="ctr" rtl="0"/>
+            <a:r>
+              <a:rPr lang="en-US" sz="4000" dirty="0" err="1" smtClean="0"/>
+              <a:t>routine_table</a:t>
+            </a:r>
+            <a:endParaRPr lang="en-US" sz="4000" dirty="0" smtClean="0"/>
+          </a:p>
+          <a:p>
             <a:pPr algn="l" rtl="0"/>
             <a:r>
-              <a:rPr lang="en-US" sz="4000" dirty="0" smtClean="0"/>
-              <a:t>Id	</a:t>
-            </a:r>
+              <a:rPr lang="en-US" sz="2400" dirty="0" smtClean="0"/>
+              <a:t>id</a:t>
+            </a:r>
+            <a:endParaRPr lang="he-IL" sz="2400" dirty="0"/>
+          </a:p>
+        </p:txBody>
+      </p:sp>
+      <p:sp>
+        <p:nvSpPr>
+          <p:cNvPr id="11" name="מלבן 10"/>
+          <p:cNvSpPr/>
+          <p:nvPr/>
+        </p:nvSpPr>
+        <p:spPr>
+          <a:xfrm>
+            <a:off x="6044513" y="1425148"/>
+            <a:ext cx="4326925" cy="1276864"/>
+          </a:xfrm>
+          <a:prstGeom prst="rect">
+            <a:avLst/>
+          </a:prstGeom>
+        </p:spPr>
+        <p:style>
+          <a:lnRef idx="2">
+            <a:schemeClr val="accent1">
+              <a:shade val="50000"/>
+            </a:schemeClr>
+          </a:lnRef>
+          <a:fillRef idx="1">
+            <a:schemeClr val="accent1"/>
+          </a:fillRef>
+          <a:effectRef idx="0">
+            <a:schemeClr val="accent1"/>
+          </a:effectRef>
+          <a:fontRef idx="minor">
+            <a:schemeClr val="lt1"/>
+          </a:fontRef>
+        </p:style>
+        <p:txBody>
+          <a:bodyPr rtlCol="1" anchor="t"/>
+          <a:lstStyle/>
+          <a:p>
+            <a:pPr algn="ctr" rtl="0"/>
             <a:r>
               <a:rPr lang="en-US" sz="4000" dirty="0" err="1" smtClean="0"/>
-              <a:t>id_routine</a:t>
-            </a:r>
-            <a:r>
-              <a:rPr lang="en-US" sz="4000" dirty="0" smtClean="0"/>
-              <a:t>	</a:t>
-            </a:r>
-            <a:r>
-              <a:rPr lang="en-US" sz="4000" dirty="0" smtClean="0"/>
-              <a:t>name</a:t>
-            </a:r>
-            <a:r>
-              <a:rPr lang="en-US" sz="4000" dirty="0" smtClean="0"/>
-              <a:t>	date	workout</a:t>
-            </a:r>
+              <a:t>workout_table</a:t>
+            </a:r>
+            <a:endParaRPr lang="en-US" sz="4000" dirty="0" smtClean="0"/>
           </a:p>
           <a:p>
             <a:pPr algn="l" rtl="0"/>
             <a:r>
-              <a:rPr lang="en-US" sz="4000" dirty="0" smtClean="0"/>
-              <a:t>		</a:t>
-            </a:r>
+              <a:rPr lang="en-US" sz="2400" dirty="0" smtClean="0"/>
+              <a:t>id        </a:t>
+            </a:r>
+            <a:r>
+              <a:rPr lang="en-US" sz="2400" dirty="0" err="1" smtClean="0"/>
+              <a:t>Id_routine</a:t>
+            </a:r>
+            <a:endParaRPr lang="he-IL" sz="2000" dirty="0"/>
+          </a:p>
+        </p:txBody>
+      </p:sp>
+      <p:sp>
+        <p:nvSpPr>
+          <p:cNvPr id="13" name="מלבן 12"/>
+          <p:cNvSpPr/>
+          <p:nvPr/>
+        </p:nvSpPr>
+        <p:spPr>
+          <a:xfrm>
+            <a:off x="593124" y="1145059"/>
+            <a:ext cx="11277600" cy="4522573"/>
+          </a:xfrm>
+          <a:prstGeom prst="rect">
+            <a:avLst/>
+          </a:prstGeom>
+          <a:noFill/>
+        </p:spPr>
+        <p:style>
+          <a:lnRef idx="2">
+            <a:schemeClr val="accent1">
+              <a:shade val="50000"/>
+            </a:schemeClr>
+          </a:lnRef>
+          <a:fillRef idx="1">
+            <a:schemeClr val="accent1"/>
+          </a:fillRef>
+          <a:effectRef idx="0">
+            <a:schemeClr val="accent1"/>
+          </a:effectRef>
+          <a:fontRef idx="minor">
+            <a:schemeClr val="lt1"/>
+          </a:fontRef>
+        </p:style>
+        <p:txBody>
+          <a:bodyPr rtlCol="1" anchor="t"/>
+          <a:lstStyle/>
+          <a:p>
+            <a:pPr algn="l" rtl="0"/>
             <a:endParaRPr lang="he-IL" sz="4000" dirty="0"/>
           </a:p>
         </p:txBody>
       </p:sp>
+      <p:cxnSp>
+        <p:nvCxnSpPr>
+          <p:cNvPr id="6" name="מחבר מרפקי 5"/>
+          <p:cNvCxnSpPr/>
+          <p:nvPr/>
+        </p:nvCxnSpPr>
+        <p:spPr>
+          <a:xfrm>
+            <a:off x="1079157" y="2702011"/>
+            <a:ext cx="6326659" cy="436605"/>
+          </a:xfrm>
+          <a:prstGeom prst="bentConnector3">
+            <a:avLst>
+              <a:gd name="adj1" fmla="val -391"/>
+            </a:avLst>
+          </a:prstGeom>
+          <a:ln>
+            <a:tailEnd type="triangle"/>
+          </a:ln>
+        </p:spPr>
+        <p:style>
+          <a:lnRef idx="1">
+            <a:schemeClr val="accent1"/>
+          </a:lnRef>
+          <a:fillRef idx="0">
+            <a:schemeClr val="accent1"/>
+          </a:fillRef>
+          <a:effectRef idx="0">
+            <a:schemeClr val="accent1"/>
+          </a:effectRef>
+          <a:fontRef idx="minor">
+            <a:schemeClr val="tx1"/>
+          </a:fontRef>
+        </p:style>
+      </p:cxnSp>
+      <p:cxnSp>
+        <p:nvCxnSpPr>
+          <p:cNvPr id="10" name="מחבר חץ ישר 9"/>
+          <p:cNvCxnSpPr/>
+          <p:nvPr/>
+        </p:nvCxnSpPr>
+        <p:spPr>
+          <a:xfrm flipH="1" flipV="1">
+            <a:off x="7405816" y="2702011"/>
+            <a:ext cx="8238" cy="436605"/>
+          </a:xfrm>
+          <a:prstGeom prst="straightConnector1">
+            <a:avLst/>
+          </a:prstGeom>
+          <a:ln>
+            <a:tailEnd type="triangle"/>
+          </a:ln>
+        </p:spPr>
+        <p:style>
+          <a:lnRef idx="1">
+            <a:schemeClr val="accent1"/>
+          </a:lnRef>
+          <a:fillRef idx="0">
+            <a:schemeClr val="accent1"/>
+          </a:fillRef>
+          <a:effectRef idx="0">
+            <a:schemeClr val="accent1"/>
+          </a:effectRef>
+          <a:fontRef idx="minor">
+            <a:schemeClr val="tx1"/>
+          </a:fontRef>
+        </p:style>
+      </p:cxnSp>
     </p:spTree>
     <p:extLst>
       <p:ext uri="{BB962C8B-B14F-4D97-AF65-F5344CB8AC3E}">
-        <p14:creationId xmlns:p14="http://schemas.microsoft.com/office/powerpoint/2010/main" val="1696149671"/>
+        <p14:creationId xmlns:p14="http://schemas.microsoft.com/office/powerpoint/2010/main" val="777559622"/>
       </p:ext>
     </p:extLst>
   </p:cSld>
@@ -4345,8 +5094,8 @@
         </p:nvSpPr>
         <p:spPr>
           <a:xfrm>
-            <a:off x="2487827" y="57665"/>
-            <a:ext cx="8007178" cy="849141"/>
+            <a:off x="3915804" y="0"/>
+            <a:ext cx="5077083" cy="849141"/>
           </a:xfrm>
         </p:spPr>
         <p:txBody>
@@ -4358,7 +5107,7 @@
             <a:pPr rtl="0"/>
             <a:r>
               <a:rPr lang="en-US" dirty="0" err="1" smtClean="0"/>
-              <a:t>ExerciseAbstruct_Table</a:t>
+              <a:t>routine_table</a:t>
             </a:r>
             <a:endParaRPr lang="he-IL" dirty="0"/>
           </a:p>
@@ -4372,8 +5121,8 @@
         </p:nvSpPr>
         <p:spPr>
           <a:xfrm>
-            <a:off x="576649" y="1326292"/>
-            <a:ext cx="11458832" cy="5000367"/>
+            <a:off x="1820562" y="1326292"/>
+            <a:ext cx="9267568" cy="5000367"/>
           </a:xfrm>
           <a:prstGeom prst="rect">
             <a:avLst/>
@@ -4402,6 +5151,249 @@
             <a:pPr algn="l" rtl="0"/>
             <a:r>
               <a:rPr lang="en-US" sz="4000" dirty="0" smtClean="0"/>
+              <a:t>		    Id		name	date			</a:t>
+            </a:r>
+            <a:endParaRPr lang="he-IL" sz="4000" dirty="0"/>
+          </a:p>
+        </p:txBody>
+      </p:sp>
+    </p:spTree>
+    <p:extLst>
+      <p:ext uri="{BB962C8B-B14F-4D97-AF65-F5344CB8AC3E}">
+        <p14:creationId xmlns:p14="http://schemas.microsoft.com/office/powerpoint/2010/main" val="763200124"/>
+      </p:ext>
+    </p:extLst>
+  </p:cSld>
+  <p:clrMapOvr>
+    <a:masterClrMapping/>
+  </p:clrMapOvr>
+  <p:timing>
+    <p:tnLst>
+      <p:par>
+        <p:cTn id="1" dur="indefinite" restart="never" nodeType="tmRoot"/>
+      </p:par>
+    </p:tnLst>
+  </p:timing>
+</p:sld>
+</file>
+
+<file path=ppt/slides/slide16.xml><?xml version="1.0" encoding="utf-8"?>
+<p:sld xmlns:a="http://schemas.openxmlformats.org/drawingml/2006/main" xmlns:r="http://schemas.openxmlformats.org/officeDocument/2006/relationships" xmlns:p="http://schemas.openxmlformats.org/presentationml/2006/main">
+  <p:cSld>
+    <p:spTree>
+      <p:nvGrpSpPr>
+        <p:cNvPr id="1" name=""/>
+        <p:cNvGrpSpPr/>
+        <p:nvPr/>
+      </p:nvGrpSpPr>
+      <p:grpSpPr>
+        <a:xfrm>
+          <a:off x="0" y="0"/>
+          <a:ext cx="0" cy="0"/>
+          <a:chOff x="0" y="0"/>
+          <a:chExt cx="0" cy="0"/>
+        </a:xfrm>
+      </p:grpSpPr>
+      <p:sp>
+        <p:nvSpPr>
+          <p:cNvPr id="2" name="כותרת 1"/>
+          <p:cNvSpPr>
+            <a:spLocks noGrp="1"/>
+          </p:cNvSpPr>
+          <p:nvPr>
+            <p:ph type="ctrTitle"/>
+          </p:nvPr>
+        </p:nvSpPr>
+        <p:spPr>
+          <a:xfrm>
+            <a:off x="3899329" y="57665"/>
+            <a:ext cx="5110033" cy="849141"/>
+          </a:xfrm>
+        </p:spPr>
+        <p:txBody>
+          <a:bodyPr>
+            <a:normAutofit fontScale="90000"/>
+          </a:bodyPr>
+          <a:lstStyle/>
+          <a:p>
+            <a:pPr rtl="0"/>
+            <a:r>
+              <a:rPr lang="en-US" dirty="0" err="1"/>
+              <a:t>w</a:t>
+            </a:r>
+            <a:r>
+              <a:rPr lang="en-US" dirty="0" err="1" smtClean="0"/>
+              <a:t>orkout_history</a:t>
+            </a:r>
+            <a:endParaRPr lang="he-IL" dirty="0"/>
+          </a:p>
+        </p:txBody>
+      </p:sp>
+      <p:sp>
+        <p:nvSpPr>
+          <p:cNvPr id="9" name="מלבן 8"/>
+          <p:cNvSpPr/>
+          <p:nvPr/>
+        </p:nvSpPr>
+        <p:spPr>
+          <a:xfrm>
+            <a:off x="1820562" y="1326292"/>
+            <a:ext cx="9267568" cy="5000367"/>
+          </a:xfrm>
+          <a:prstGeom prst="rect">
+            <a:avLst/>
+          </a:prstGeom>
+        </p:spPr>
+        <p:style>
+          <a:lnRef idx="2">
+            <a:schemeClr val="accent1">
+              <a:shade val="50000"/>
+            </a:schemeClr>
+          </a:lnRef>
+          <a:fillRef idx="1">
+            <a:schemeClr val="accent1"/>
+          </a:fillRef>
+          <a:effectRef idx="0">
+            <a:schemeClr val="accent1"/>
+          </a:effectRef>
+          <a:fontRef idx="minor">
+            <a:schemeClr val="lt1"/>
+          </a:fontRef>
+        </p:style>
+        <p:txBody>
+          <a:bodyPr rtlCol="1" anchor="t"/>
+          <a:lstStyle/>
+          <a:p>
+            <a:pPr algn="l" rtl="0"/>
+            <a:r>
+              <a:rPr lang="en-US" sz="4000" dirty="0" smtClean="0"/>
+              <a:t>Id	</a:t>
+            </a:r>
+            <a:r>
+              <a:rPr lang="en-US" sz="4000" dirty="0" err="1" smtClean="0"/>
+              <a:t>id_routine</a:t>
+            </a:r>
+            <a:r>
+              <a:rPr lang="en-US" sz="4000" dirty="0" smtClean="0"/>
+              <a:t>	name	date	workout</a:t>
+            </a:r>
+          </a:p>
+          <a:p>
+            <a:pPr algn="l" rtl="0"/>
+            <a:r>
+              <a:rPr lang="en-US" sz="4000" dirty="0" smtClean="0"/>
+              <a:t>		</a:t>
+            </a:r>
+            <a:endParaRPr lang="he-IL" sz="4000" dirty="0"/>
+          </a:p>
+        </p:txBody>
+      </p:sp>
+    </p:spTree>
+    <p:extLst>
+      <p:ext uri="{BB962C8B-B14F-4D97-AF65-F5344CB8AC3E}">
+        <p14:creationId xmlns:p14="http://schemas.microsoft.com/office/powerpoint/2010/main" val="1696149671"/>
+      </p:ext>
+    </p:extLst>
+  </p:cSld>
+  <p:clrMapOvr>
+    <a:masterClrMapping/>
+  </p:clrMapOvr>
+  <p:timing>
+    <p:tnLst>
+      <p:par>
+        <p:cTn id="1" dur="indefinite" restart="never" nodeType="tmRoot"/>
+      </p:par>
+    </p:tnLst>
+  </p:timing>
+</p:sld>
+</file>
+
+<file path=ppt/slides/slide17.xml><?xml version="1.0" encoding="utf-8"?>
+<p:sld xmlns:a="http://schemas.openxmlformats.org/drawingml/2006/main" xmlns:r="http://schemas.openxmlformats.org/officeDocument/2006/relationships" xmlns:p="http://schemas.openxmlformats.org/presentationml/2006/main">
+  <p:cSld>
+    <p:spTree>
+      <p:nvGrpSpPr>
+        <p:cNvPr id="1" name=""/>
+        <p:cNvGrpSpPr/>
+        <p:nvPr/>
+      </p:nvGrpSpPr>
+      <p:grpSpPr>
+        <a:xfrm>
+          <a:off x="0" y="0"/>
+          <a:ext cx="0" cy="0"/>
+          <a:chOff x="0" y="0"/>
+          <a:chExt cx="0" cy="0"/>
+        </a:xfrm>
+      </p:grpSpPr>
+      <p:sp>
+        <p:nvSpPr>
+          <p:cNvPr id="2" name="כותרת 1"/>
+          <p:cNvSpPr>
+            <a:spLocks noGrp="1"/>
+          </p:cNvSpPr>
+          <p:nvPr>
+            <p:ph type="ctrTitle"/>
+          </p:nvPr>
+        </p:nvSpPr>
+        <p:spPr>
+          <a:xfrm>
+            <a:off x="2487827" y="57665"/>
+            <a:ext cx="8007178" cy="849141"/>
+          </a:xfrm>
+        </p:spPr>
+        <p:txBody>
+          <a:bodyPr>
+            <a:normAutofit fontScale="90000"/>
+          </a:bodyPr>
+          <a:lstStyle/>
+          <a:p>
+            <a:pPr rtl="0"/>
+            <a:r>
+              <a:rPr lang="en-US" dirty="0" err="1" smtClean="0"/>
+              <a:t>ExerciseAbstruct_Table</a:t>
+            </a:r>
+            <a:endParaRPr lang="he-IL" dirty="0"/>
+          </a:p>
+        </p:txBody>
+      </p:sp>
+      <p:sp>
+        <p:nvSpPr>
+          <p:cNvPr id="9" name="מלבן 8"/>
+          <p:cNvSpPr/>
+          <p:nvPr/>
+        </p:nvSpPr>
+        <p:spPr>
+          <a:xfrm>
+            <a:off x="576649" y="1326292"/>
+            <a:ext cx="11458832" cy="5000367"/>
+          </a:xfrm>
+          <a:prstGeom prst="rect">
+            <a:avLst/>
+          </a:prstGeom>
+        </p:spPr>
+        <p:style>
+          <a:lnRef idx="2">
+            <a:schemeClr val="accent1">
+              <a:shade val="50000"/>
+            </a:schemeClr>
+          </a:lnRef>
+          <a:fillRef idx="1">
+            <a:schemeClr val="accent1"/>
+          </a:fillRef>
+          <a:effectRef idx="0">
+            <a:schemeClr val="accent1"/>
+          </a:effectRef>
+          <a:fontRef idx="minor">
+            <a:schemeClr val="lt1"/>
+          </a:fontRef>
+        </p:style>
+        <p:txBody>
+          <a:bodyPr rtlCol="1" anchor="t"/>
+          <a:lstStyle/>
+          <a:p>
+            <a:pPr algn="l" rtl="0"/>
+            <a:r>
+              <a:rPr lang="en-US" sz="4000" dirty="0" smtClean="0"/>
               <a:t>Id			</a:t>
             </a:r>
             <a:r>
@@ -4414,32 +5406,15 @@
             <a:pPr algn="l" rtl="0"/>
             <a:r>
               <a:rPr lang="en-US" sz="4000" dirty="0" smtClean="0"/>
-              <a:t>name</a:t>
-            </a:r>
+              <a:t>name		string</a:t>
+            </a:r>
+          </a:p>
+          <a:p>
+            <a:pPr algn="l" rtl="0"/>
             <a:r>
               <a:rPr lang="en-US" sz="4000" dirty="0" smtClean="0"/>
-              <a:t>	</a:t>
-            </a:r>
-            <a:r>
-              <a:rPr lang="en-US" sz="4000" dirty="0" smtClean="0"/>
-              <a:t>	string</a:t>
-            </a:r>
-          </a:p>
-          <a:p>
-            <a:pPr algn="l" rtl="0"/>
-            <a:r>
-              <a:rPr lang="en-US" sz="4000" dirty="0" smtClean="0"/>
-              <a:t>description </a:t>
-            </a:r>
-            <a:r>
-              <a:rPr lang="en-US" sz="4000" dirty="0" smtClean="0"/>
-              <a:t>	</a:t>
-            </a:r>
-            <a:r>
-              <a:rPr lang="en-US" sz="4000" dirty="0" smtClean="0"/>
-              <a:t>string</a:t>
-            </a:r>
-            <a:endParaRPr lang="en-US" sz="4000" dirty="0" smtClean="0"/>
+              <a:t>description 	string</a:t>
+            </a:r>
           </a:p>
           <a:p>
             <a:pPr algn="l" rtl="0"/>
@@ -4498,7 +5473,7 @@
 </p:sld>
 </file>
 
-<file path=ppt/slides/slide16.xml><?xml version="1.0" encoding="utf-8"?>
+<file path=ppt/slides/slide18.xml><?xml version="1.0" encoding="utf-8"?>
 <p:sld xmlns:a="http://schemas.openxmlformats.org/drawingml/2006/main" xmlns:r="http://schemas.openxmlformats.org/officeDocument/2006/relationships" xmlns:p="http://schemas.openxmlformats.org/presentationml/2006/main">
   <p:cSld>
     <p:spTree>
@@ -4806,11 +5781,7 @@
             <a:pPr algn="l" rtl="0"/>
             <a:r>
               <a:rPr lang="en-US" sz="4000" dirty="0" smtClean="0"/>
-              <a:t>String</a:t>
-            </a:r>
-            <a:r>
-              <a:rPr lang="en-US" sz="4000" dirty="0" smtClean="0"/>
-              <a:t>				name=</a:t>
+              <a:t>String				name=</a:t>
             </a:r>
             <a:r>
               <a:rPr lang="en-US" sz="4000" dirty="0" err="1" smtClean="0"/>
@@ -4995,26 +5966,14 @@
             </a:r>
             <a:r>
               <a:rPr lang="en-US" sz="4000" dirty="0" smtClean="0"/>
-              <a:t>	</a:t>
-            </a:r>
+              <a:t>	String</a:t>
+            </a:r>
+          </a:p>
+          <a:p>
+            <a:pPr algn="l" rtl="0"/>
             <a:r>
               <a:rPr lang="en-US" sz="4000" dirty="0" smtClean="0"/>
-              <a:t>String</a:t>
-            </a:r>
-          </a:p>
-          <a:p>
-            <a:pPr algn="l" rtl="0"/>
-            <a:r>
-              <a:rPr lang="en-US" sz="4000" dirty="0" smtClean="0"/>
-              <a:t>Array&lt;float</a:t>
-            </a:r>
-            <a:r>
-              <a:rPr lang="en-US" sz="4000" dirty="0" smtClean="0"/>
-              <a:t>&gt;[5]			</a:t>
-            </a:r>
-            <a:r>
-              <a:rPr lang="en-US" sz="4000" dirty="0" smtClean="0"/>
-              <a:t>reps</a:t>
+              <a:t>Array&lt;float&gt;[5]			reps</a:t>
             </a:r>
           </a:p>
           <a:p>
@@ -5159,11 +6118,7 @@
             <a:pPr algn="l" rtl="0"/>
             <a:r>
               <a:rPr lang="en-US" sz="4000" dirty="0" smtClean="0"/>
-              <a:t>String</a:t>
-            </a:r>
-            <a:r>
-              <a:rPr lang="en-US" sz="4000" dirty="0" smtClean="0"/>
-              <a:t>					name</a:t>
+              <a:t>String					name</a:t>
             </a:r>
           </a:p>
           <a:p>
@@ -5177,11 +6132,7 @@
             <a:pPr algn="l" rtl="0"/>
             <a:r>
               <a:rPr lang="en-US" sz="4000" dirty="0" smtClean="0"/>
-              <a:t>String</a:t>
-            </a:r>
-            <a:r>
-              <a:rPr lang="en-US" sz="4000" dirty="0" smtClean="0"/>
-              <a:t>					</a:t>
+              <a:t>String					</a:t>
             </a:r>
             <a:r>
               <a:rPr lang="en-US" sz="4000" dirty="0" err="1" smtClean="0"/>
@@ -5329,7 +6280,7 @@
         </p:nvSpPr>
         <p:spPr>
           <a:xfrm>
-            <a:off x="8377881" y="2837935"/>
+            <a:off x="8443784" y="2780270"/>
             <a:ext cx="3204519" cy="1005016"/>
           </a:xfrm>
           <a:prstGeom prst="roundRect">
@@ -5359,7 +6310,7 @@
             <a:pPr algn="ctr"/>
             <a:r>
               <a:rPr lang="en-US" dirty="0" smtClean="0"/>
-              <a:t>Workout</a:t>
+              <a:t>Start</a:t>
             </a:r>
             <a:endParaRPr lang="he-IL" dirty="0"/>
           </a:p>
@@ -5417,7 +6368,7 @@
         </p:nvSpPr>
         <p:spPr>
           <a:xfrm>
-            <a:off x="807307" y="2780270"/>
+            <a:off x="741404" y="2780270"/>
             <a:ext cx="3204519" cy="1005016"/>
           </a:xfrm>
           <a:prstGeom prst="roundRect">
@@ -5447,7 +6398,7 @@
             <a:pPr algn="ctr"/>
             <a:r>
               <a:rPr lang="en-US" dirty="0" smtClean="0"/>
-              <a:t>Edit</a:t>
+              <a:t>Manage</a:t>
             </a:r>
             <a:endParaRPr lang="he-IL" dirty="0"/>
           </a:p>
@@ -5465,7 +6416,7 @@
         <p:spPr>
           <a:xfrm>
             <a:off x="6194854" y="2034746"/>
-            <a:ext cx="3785287" cy="803189"/>
+            <a:ext cx="3851190" cy="745524"/>
           </a:xfrm>
           <a:prstGeom prst="straightConnector1">
             <a:avLst/>
@@ -5536,8 +6487,8 @@
         </p:nvCxnSpPr>
         <p:spPr>
           <a:xfrm flipH="1">
-            <a:off x="2409567" y="2034746"/>
-            <a:ext cx="3785287" cy="745524"/>
+            <a:off x="2343664" y="2034746"/>
+            <a:ext cx="3851190" cy="745524"/>
           </a:xfrm>
           <a:prstGeom prst="straightConnector1">
             <a:avLst/>
@@ -5621,7 +6572,7 @@
             <a:pPr rtl="0"/>
             <a:r>
               <a:rPr lang="en-US" dirty="0" smtClean="0"/>
-              <a:t>Edit</a:t>
+              <a:t>Manage</a:t>
             </a:r>
             <a:endParaRPr lang="he-IL" dirty="0"/>
           </a:p>

</xml_diff>